<commit_message>
Änderungen in meiner "AUFGABE 5 - SHOPAUSWERTUNG_Hyun_Lee Datei gemacht"--> Pie Chart
</commit_message>
<xml_diff>
--- a/Shopauswertung.pptx
+++ b/Shopauswertung.pptx
@@ -5,20 +5,24 @@
     <p:sldMasterId id="2147483660" r:id="rId4"/>
   </p:sldMasterIdLst>
   <p:notesMasterIdLst>
-    <p:notesMasterId r:id="rId16"/>
+    <p:notesMasterId r:id="rId20"/>
   </p:notesMasterIdLst>
   <p:sldIdLst>
     <p:sldId id="256" r:id="rId5"/>
     <p:sldId id="257" r:id="rId6"/>
-    <p:sldId id="259" r:id="rId7"/>
-    <p:sldId id="274" r:id="rId8"/>
-    <p:sldId id="272" r:id="rId9"/>
-    <p:sldId id="273" r:id="rId10"/>
-    <p:sldId id="275" r:id="rId11"/>
-    <p:sldId id="263" r:id="rId12"/>
-    <p:sldId id="264" r:id="rId13"/>
-    <p:sldId id="266" r:id="rId14"/>
-    <p:sldId id="271" r:id="rId15"/>
+    <p:sldId id="278" r:id="rId7"/>
+    <p:sldId id="259" r:id="rId8"/>
+    <p:sldId id="274" r:id="rId9"/>
+    <p:sldId id="272" r:id="rId10"/>
+    <p:sldId id="273" r:id="rId11"/>
+    <p:sldId id="275" r:id="rId12"/>
+    <p:sldId id="276" r:id="rId13"/>
+    <p:sldId id="279" r:id="rId14"/>
+    <p:sldId id="277" r:id="rId15"/>
+    <p:sldId id="263" r:id="rId16"/>
+    <p:sldId id="264" r:id="rId17"/>
+    <p:sldId id="266" r:id="rId18"/>
+    <p:sldId id="271" r:id="rId19"/>
   </p:sldIdLst>
   <p:sldSz cx="9144000" cy="6858000" type="screen4x3"/>
   <p:notesSz cx="6858000" cy="9144000"/>
@@ -4135,753 +4139,6 @@
 </dgm:colorsDef>
 </file>
 
-<file path=ppt/diagrams/colors6.xml><?xml version="1.0" encoding="utf-8"?>
-<dgm:colorsDef xmlns:dgm="http://schemas.openxmlformats.org/drawingml/2006/diagram" xmlns:a="http://schemas.openxmlformats.org/drawingml/2006/main" uniqueId="urn:microsoft.com/office/officeart/2005/8/colors/accent1_2">
-  <dgm:title val=""/>
-  <dgm:desc val=""/>
-  <dgm:catLst>
-    <dgm:cat type="accent1" pri="11200"/>
-  </dgm:catLst>
-  <dgm:styleLbl name="node0">
-    <dgm:fillClrLst meth="repeat">
-      <a:schemeClr val="accent1"/>
-    </dgm:fillClrLst>
-    <dgm:linClrLst meth="repeat">
-      <a:schemeClr val="lt1"/>
-    </dgm:linClrLst>
-    <dgm:effectClrLst/>
-    <dgm:txLinClrLst/>
-    <dgm:txFillClrLst/>
-    <dgm:txEffectClrLst/>
-  </dgm:styleLbl>
-  <dgm:styleLbl name="alignNode1">
-    <dgm:fillClrLst meth="repeat">
-      <a:schemeClr val="accent1"/>
-    </dgm:fillClrLst>
-    <dgm:linClrLst meth="repeat">
-      <a:schemeClr val="accent1"/>
-    </dgm:linClrLst>
-    <dgm:effectClrLst/>
-    <dgm:txLinClrLst/>
-    <dgm:txFillClrLst/>
-    <dgm:txEffectClrLst/>
-  </dgm:styleLbl>
-  <dgm:styleLbl name="node1">
-    <dgm:fillClrLst meth="repeat">
-      <a:schemeClr val="accent1"/>
-    </dgm:fillClrLst>
-    <dgm:linClrLst meth="repeat">
-      <a:schemeClr val="lt1"/>
-    </dgm:linClrLst>
-    <dgm:effectClrLst/>
-    <dgm:txLinClrLst/>
-    <dgm:txFillClrLst/>
-    <dgm:txEffectClrLst/>
-  </dgm:styleLbl>
-  <dgm:styleLbl name="lnNode1">
-    <dgm:fillClrLst meth="repeat">
-      <a:schemeClr val="accent1"/>
-    </dgm:fillClrLst>
-    <dgm:linClrLst meth="repeat">
-      <a:schemeClr val="lt1"/>
-    </dgm:linClrLst>
-    <dgm:effectClrLst/>
-    <dgm:txLinClrLst/>
-    <dgm:txFillClrLst/>
-    <dgm:txEffectClrLst/>
-  </dgm:styleLbl>
-  <dgm:styleLbl name="vennNode1">
-    <dgm:fillClrLst meth="repeat">
-      <a:schemeClr val="accent1">
-        <a:alpha val="50000"/>
-      </a:schemeClr>
-    </dgm:fillClrLst>
-    <dgm:linClrLst meth="repeat">
-      <a:schemeClr val="lt1"/>
-    </dgm:linClrLst>
-    <dgm:effectClrLst/>
-    <dgm:txLinClrLst/>
-    <dgm:txFillClrLst/>
-    <dgm:txEffectClrLst/>
-  </dgm:styleLbl>
-  <dgm:styleLbl name="node2">
-    <dgm:fillClrLst meth="repeat">
-      <a:schemeClr val="accent1"/>
-    </dgm:fillClrLst>
-    <dgm:linClrLst meth="repeat">
-      <a:schemeClr val="lt1"/>
-    </dgm:linClrLst>
-    <dgm:effectClrLst/>
-    <dgm:txLinClrLst/>
-    <dgm:txFillClrLst/>
-    <dgm:txEffectClrLst/>
-  </dgm:styleLbl>
-  <dgm:styleLbl name="node3">
-    <dgm:fillClrLst meth="repeat">
-      <a:schemeClr val="accent1"/>
-    </dgm:fillClrLst>
-    <dgm:linClrLst meth="repeat">
-      <a:schemeClr val="lt1"/>
-    </dgm:linClrLst>
-    <dgm:effectClrLst/>
-    <dgm:txLinClrLst/>
-    <dgm:txFillClrLst/>
-    <dgm:txEffectClrLst/>
-  </dgm:styleLbl>
-  <dgm:styleLbl name="node4">
-    <dgm:fillClrLst meth="repeat">
-      <a:schemeClr val="accent1"/>
-    </dgm:fillClrLst>
-    <dgm:linClrLst meth="repeat">
-      <a:schemeClr val="lt1"/>
-    </dgm:linClrLst>
-    <dgm:effectClrLst/>
-    <dgm:txLinClrLst/>
-    <dgm:txFillClrLst/>
-    <dgm:txEffectClrLst/>
-  </dgm:styleLbl>
-  <dgm:styleLbl name="fgImgPlace1">
-    <dgm:fillClrLst meth="repeat">
-      <a:schemeClr val="accent1">
-        <a:tint val="50000"/>
-      </a:schemeClr>
-    </dgm:fillClrLst>
-    <dgm:linClrLst meth="repeat">
-      <a:schemeClr val="lt1"/>
-    </dgm:linClrLst>
-    <dgm:effectClrLst/>
-    <dgm:txLinClrLst/>
-    <dgm:txFillClrLst meth="repeat">
-      <a:schemeClr val="lt1"/>
-    </dgm:txFillClrLst>
-    <dgm:txEffectClrLst/>
-  </dgm:styleLbl>
-  <dgm:styleLbl name="alignImgPlace1">
-    <dgm:fillClrLst meth="repeat">
-      <a:schemeClr val="accent1">
-        <a:tint val="50000"/>
-      </a:schemeClr>
-    </dgm:fillClrLst>
-    <dgm:linClrLst meth="repeat">
-      <a:schemeClr val="lt1"/>
-    </dgm:linClrLst>
-    <dgm:effectClrLst/>
-    <dgm:txLinClrLst/>
-    <dgm:txFillClrLst meth="repeat">
-      <a:schemeClr val="lt1"/>
-    </dgm:txFillClrLst>
-    <dgm:txEffectClrLst/>
-  </dgm:styleLbl>
-  <dgm:styleLbl name="bgImgPlace1">
-    <dgm:fillClrLst meth="repeat">
-      <a:schemeClr val="accent1">
-        <a:tint val="50000"/>
-      </a:schemeClr>
-    </dgm:fillClrLst>
-    <dgm:linClrLst meth="repeat">
-      <a:schemeClr val="lt1"/>
-    </dgm:linClrLst>
-    <dgm:effectClrLst/>
-    <dgm:txLinClrLst/>
-    <dgm:txFillClrLst meth="repeat">
-      <a:schemeClr val="lt1"/>
-    </dgm:txFillClrLst>
-    <dgm:txEffectClrLst/>
-  </dgm:styleLbl>
-  <dgm:styleLbl name="sibTrans2D1">
-    <dgm:fillClrLst meth="repeat">
-      <a:schemeClr val="accent1">
-        <a:tint val="60000"/>
-      </a:schemeClr>
-    </dgm:fillClrLst>
-    <dgm:linClrLst meth="repeat">
-      <a:schemeClr val="accent1">
-        <a:tint val="60000"/>
-      </a:schemeClr>
-    </dgm:linClrLst>
-    <dgm:effectClrLst/>
-    <dgm:txLinClrLst/>
-    <dgm:txFillClrLst/>
-    <dgm:txEffectClrLst/>
-  </dgm:styleLbl>
-  <dgm:styleLbl name="fgSibTrans2D1">
-    <dgm:fillClrLst meth="repeat">
-      <a:schemeClr val="accent1">
-        <a:tint val="60000"/>
-      </a:schemeClr>
-    </dgm:fillClrLst>
-    <dgm:linClrLst meth="repeat">
-      <a:schemeClr val="accent1">
-        <a:tint val="60000"/>
-      </a:schemeClr>
-    </dgm:linClrLst>
-    <dgm:effectClrLst/>
-    <dgm:txLinClrLst/>
-    <dgm:txFillClrLst/>
-    <dgm:txEffectClrLst/>
-  </dgm:styleLbl>
-  <dgm:styleLbl name="bgSibTrans2D1">
-    <dgm:fillClrLst meth="repeat">
-      <a:schemeClr val="accent1">
-        <a:tint val="60000"/>
-      </a:schemeClr>
-    </dgm:fillClrLst>
-    <dgm:linClrLst meth="repeat">
-      <a:schemeClr val="accent1">
-        <a:tint val="60000"/>
-      </a:schemeClr>
-    </dgm:linClrLst>
-    <dgm:effectClrLst/>
-    <dgm:txLinClrLst/>
-    <dgm:txFillClrLst/>
-    <dgm:txEffectClrLst/>
-  </dgm:styleLbl>
-  <dgm:styleLbl name="sibTrans1D1">
-    <dgm:fillClrLst meth="repeat">
-      <a:schemeClr val="accent1"/>
-    </dgm:fillClrLst>
-    <dgm:linClrLst meth="repeat">
-      <a:schemeClr val="accent1"/>
-    </dgm:linClrLst>
-    <dgm:effectClrLst/>
-    <dgm:txLinClrLst/>
-    <dgm:txFillClrLst meth="repeat">
-      <a:schemeClr val="tx1"/>
-    </dgm:txFillClrLst>
-    <dgm:txEffectClrLst/>
-  </dgm:styleLbl>
-  <dgm:styleLbl name="callout">
-    <dgm:fillClrLst meth="repeat">
-      <a:schemeClr val="accent1"/>
-    </dgm:fillClrLst>
-    <dgm:linClrLst meth="repeat">
-      <a:schemeClr val="accent1">
-        <a:tint val="50000"/>
-      </a:schemeClr>
-    </dgm:linClrLst>
-    <dgm:effectClrLst/>
-    <dgm:txLinClrLst/>
-    <dgm:txFillClrLst meth="repeat">
-      <a:schemeClr val="tx1"/>
-    </dgm:txFillClrLst>
-    <dgm:txEffectClrLst/>
-  </dgm:styleLbl>
-  <dgm:styleLbl name="asst0">
-    <dgm:fillClrLst meth="repeat">
-      <a:schemeClr val="accent1"/>
-    </dgm:fillClrLst>
-    <dgm:linClrLst meth="repeat">
-      <a:schemeClr val="lt1"/>
-    </dgm:linClrLst>
-    <dgm:effectClrLst/>
-    <dgm:txLinClrLst/>
-    <dgm:txFillClrLst/>
-    <dgm:txEffectClrLst/>
-  </dgm:styleLbl>
-  <dgm:styleLbl name="asst1">
-    <dgm:fillClrLst meth="repeat">
-      <a:schemeClr val="accent1"/>
-    </dgm:fillClrLst>
-    <dgm:linClrLst meth="repeat">
-      <a:schemeClr val="lt1"/>
-    </dgm:linClrLst>
-    <dgm:effectClrLst/>
-    <dgm:txLinClrLst/>
-    <dgm:txFillClrLst/>
-    <dgm:txEffectClrLst/>
-  </dgm:styleLbl>
-  <dgm:styleLbl name="asst2">
-    <dgm:fillClrLst meth="repeat">
-      <a:schemeClr val="accent1"/>
-    </dgm:fillClrLst>
-    <dgm:linClrLst meth="repeat">
-      <a:schemeClr val="lt1"/>
-    </dgm:linClrLst>
-    <dgm:effectClrLst/>
-    <dgm:txLinClrLst/>
-    <dgm:txFillClrLst/>
-    <dgm:txEffectClrLst/>
-  </dgm:styleLbl>
-  <dgm:styleLbl name="asst3">
-    <dgm:fillClrLst meth="repeat">
-      <a:schemeClr val="accent1"/>
-    </dgm:fillClrLst>
-    <dgm:linClrLst meth="repeat">
-      <a:schemeClr val="lt1"/>
-    </dgm:linClrLst>
-    <dgm:effectClrLst/>
-    <dgm:txLinClrLst/>
-    <dgm:txFillClrLst/>
-    <dgm:txEffectClrLst/>
-  </dgm:styleLbl>
-  <dgm:styleLbl name="asst4">
-    <dgm:fillClrLst meth="repeat">
-      <a:schemeClr val="accent1"/>
-    </dgm:fillClrLst>
-    <dgm:linClrLst meth="repeat">
-      <a:schemeClr val="lt1"/>
-    </dgm:linClrLst>
-    <dgm:effectClrLst/>
-    <dgm:txLinClrLst/>
-    <dgm:txFillClrLst/>
-    <dgm:txEffectClrLst/>
-  </dgm:styleLbl>
-  <dgm:styleLbl name="parChTrans2D1">
-    <dgm:fillClrLst meth="repeat">
-      <a:schemeClr val="accent1">
-        <a:tint val="60000"/>
-      </a:schemeClr>
-    </dgm:fillClrLst>
-    <dgm:linClrLst meth="repeat">
-      <a:schemeClr val="accent1">
-        <a:tint val="60000"/>
-      </a:schemeClr>
-    </dgm:linClrLst>
-    <dgm:effectClrLst/>
-    <dgm:txLinClrLst/>
-    <dgm:txFillClrLst meth="repeat">
-      <a:schemeClr val="lt1"/>
-    </dgm:txFillClrLst>
-    <dgm:txEffectClrLst/>
-  </dgm:styleLbl>
-  <dgm:styleLbl name="parChTrans2D2">
-    <dgm:fillClrLst meth="repeat">
-      <a:schemeClr val="accent1"/>
-    </dgm:fillClrLst>
-    <dgm:linClrLst meth="repeat">
-      <a:schemeClr val="accent1"/>
-    </dgm:linClrLst>
-    <dgm:effectClrLst/>
-    <dgm:txLinClrLst/>
-    <dgm:txFillClrLst meth="repeat">
-      <a:schemeClr val="lt1"/>
-    </dgm:txFillClrLst>
-    <dgm:txEffectClrLst/>
-  </dgm:styleLbl>
-  <dgm:styleLbl name="parChTrans2D3">
-    <dgm:fillClrLst meth="repeat">
-      <a:schemeClr val="accent1"/>
-    </dgm:fillClrLst>
-    <dgm:linClrLst meth="repeat">
-      <a:schemeClr val="accent1"/>
-    </dgm:linClrLst>
-    <dgm:effectClrLst/>
-    <dgm:txLinClrLst/>
-    <dgm:txFillClrLst meth="repeat">
-      <a:schemeClr val="lt1"/>
-    </dgm:txFillClrLst>
-    <dgm:txEffectClrLst/>
-  </dgm:styleLbl>
-  <dgm:styleLbl name="parChTrans2D4">
-    <dgm:fillClrLst meth="repeat">
-      <a:schemeClr val="accent1"/>
-    </dgm:fillClrLst>
-    <dgm:linClrLst meth="repeat">
-      <a:schemeClr val="accent1"/>
-    </dgm:linClrLst>
-    <dgm:effectClrLst/>
-    <dgm:txLinClrLst/>
-    <dgm:txFillClrLst meth="repeat">
-      <a:schemeClr val="lt1"/>
-    </dgm:txFillClrLst>
-    <dgm:txEffectClrLst/>
-  </dgm:styleLbl>
-  <dgm:styleLbl name="parChTrans1D1">
-    <dgm:fillClrLst meth="repeat">
-      <a:schemeClr val="accent1"/>
-    </dgm:fillClrLst>
-    <dgm:linClrLst meth="repeat">
-      <a:schemeClr val="accent1">
-        <a:shade val="60000"/>
-      </a:schemeClr>
-    </dgm:linClrLst>
-    <dgm:effectClrLst/>
-    <dgm:txLinClrLst/>
-    <dgm:txFillClrLst meth="repeat">
-      <a:schemeClr val="tx1"/>
-    </dgm:txFillClrLst>
-    <dgm:txEffectClrLst/>
-  </dgm:styleLbl>
-  <dgm:styleLbl name="parChTrans1D2">
-    <dgm:fillClrLst meth="repeat">
-      <a:schemeClr val="accent1"/>
-    </dgm:fillClrLst>
-    <dgm:linClrLst meth="repeat">
-      <a:schemeClr val="accent1">
-        <a:shade val="60000"/>
-      </a:schemeClr>
-    </dgm:linClrLst>
-    <dgm:effectClrLst/>
-    <dgm:txLinClrLst/>
-    <dgm:txFillClrLst meth="repeat">
-      <a:schemeClr val="tx1"/>
-    </dgm:txFillClrLst>
-    <dgm:txEffectClrLst/>
-  </dgm:styleLbl>
-  <dgm:styleLbl name="parChTrans1D3">
-    <dgm:fillClrLst meth="repeat">
-      <a:schemeClr val="accent1"/>
-    </dgm:fillClrLst>
-    <dgm:linClrLst meth="repeat">
-      <a:schemeClr val="accent1">
-        <a:shade val="80000"/>
-      </a:schemeClr>
-    </dgm:linClrLst>
-    <dgm:effectClrLst/>
-    <dgm:txLinClrLst/>
-    <dgm:txFillClrLst meth="repeat">
-      <a:schemeClr val="tx1"/>
-    </dgm:txFillClrLst>
-    <dgm:txEffectClrLst/>
-  </dgm:styleLbl>
-  <dgm:styleLbl name="parChTrans1D4">
-    <dgm:fillClrLst meth="repeat">
-      <a:schemeClr val="accent1"/>
-    </dgm:fillClrLst>
-    <dgm:linClrLst meth="repeat">
-      <a:schemeClr val="accent1">
-        <a:shade val="80000"/>
-      </a:schemeClr>
-    </dgm:linClrLst>
-    <dgm:effectClrLst/>
-    <dgm:txLinClrLst/>
-    <dgm:txFillClrLst meth="repeat">
-      <a:schemeClr val="tx1"/>
-    </dgm:txFillClrLst>
-    <dgm:txEffectClrLst/>
-  </dgm:styleLbl>
-  <dgm:styleLbl name="fgAcc1">
-    <dgm:fillClrLst meth="repeat">
-      <a:schemeClr val="lt1">
-        <a:alpha val="90000"/>
-      </a:schemeClr>
-    </dgm:fillClrLst>
-    <dgm:linClrLst meth="repeat">
-      <a:schemeClr val="accent1"/>
-    </dgm:linClrLst>
-    <dgm:effectClrLst/>
-    <dgm:txLinClrLst/>
-    <dgm:txFillClrLst meth="repeat">
-      <a:schemeClr val="dk1"/>
-    </dgm:txFillClrLst>
-    <dgm:txEffectClrLst/>
-  </dgm:styleLbl>
-  <dgm:styleLbl name="conFgAcc1">
-    <dgm:fillClrLst meth="repeat">
-      <a:schemeClr val="lt1">
-        <a:alpha val="90000"/>
-      </a:schemeClr>
-    </dgm:fillClrLst>
-    <dgm:linClrLst meth="repeat">
-      <a:schemeClr val="accent1"/>
-    </dgm:linClrLst>
-    <dgm:effectClrLst/>
-    <dgm:txLinClrLst/>
-    <dgm:txFillClrLst meth="repeat">
-      <a:schemeClr val="dk1"/>
-    </dgm:txFillClrLst>
-    <dgm:txEffectClrLst/>
-  </dgm:styleLbl>
-  <dgm:styleLbl name="alignAcc1">
-    <dgm:fillClrLst meth="repeat">
-      <a:schemeClr val="lt1">
-        <a:alpha val="90000"/>
-      </a:schemeClr>
-    </dgm:fillClrLst>
-    <dgm:linClrLst meth="repeat">
-      <a:schemeClr val="accent1"/>
-    </dgm:linClrLst>
-    <dgm:effectClrLst/>
-    <dgm:txLinClrLst/>
-    <dgm:txFillClrLst meth="repeat">
-      <a:schemeClr val="dk1"/>
-    </dgm:txFillClrLst>
-    <dgm:txEffectClrLst/>
-  </dgm:styleLbl>
-  <dgm:styleLbl name="trAlignAcc1">
-    <dgm:fillClrLst meth="repeat">
-      <a:schemeClr val="lt1">
-        <a:alpha val="40000"/>
-      </a:schemeClr>
-    </dgm:fillClrLst>
-    <dgm:linClrLst meth="repeat">
-      <a:schemeClr val="accent1"/>
-    </dgm:linClrLst>
-    <dgm:effectClrLst/>
-    <dgm:txLinClrLst/>
-    <dgm:txFillClrLst meth="repeat">
-      <a:schemeClr val="dk1"/>
-    </dgm:txFillClrLst>
-    <dgm:txEffectClrLst/>
-  </dgm:styleLbl>
-  <dgm:styleLbl name="bgAcc1">
-    <dgm:fillClrLst meth="repeat">
-      <a:schemeClr val="lt1">
-        <a:alpha val="90000"/>
-      </a:schemeClr>
-    </dgm:fillClrLst>
-    <dgm:linClrLst meth="repeat">
-      <a:schemeClr val="accent1"/>
-    </dgm:linClrLst>
-    <dgm:effectClrLst/>
-    <dgm:txLinClrLst/>
-    <dgm:txFillClrLst meth="repeat">
-      <a:schemeClr val="dk1"/>
-    </dgm:txFillClrLst>
-    <dgm:txEffectClrLst/>
-  </dgm:styleLbl>
-  <dgm:styleLbl name="solidFgAcc1">
-    <dgm:fillClrLst meth="repeat">
-      <a:schemeClr val="lt1"/>
-    </dgm:fillClrLst>
-    <dgm:linClrLst meth="repeat">
-      <a:schemeClr val="accent1"/>
-    </dgm:linClrLst>
-    <dgm:effectClrLst/>
-    <dgm:txLinClrLst/>
-    <dgm:txFillClrLst meth="repeat">
-      <a:schemeClr val="dk1"/>
-    </dgm:txFillClrLst>
-    <dgm:txEffectClrLst/>
-  </dgm:styleLbl>
-  <dgm:styleLbl name="solidAlignAcc1">
-    <dgm:fillClrLst meth="repeat">
-      <a:schemeClr val="lt1"/>
-    </dgm:fillClrLst>
-    <dgm:linClrLst meth="repeat">
-      <a:schemeClr val="accent1"/>
-    </dgm:linClrLst>
-    <dgm:effectClrLst/>
-    <dgm:txLinClrLst/>
-    <dgm:txFillClrLst meth="repeat">
-      <a:schemeClr val="dk1"/>
-    </dgm:txFillClrLst>
-    <dgm:txEffectClrLst/>
-  </dgm:styleLbl>
-  <dgm:styleLbl name="solidBgAcc1">
-    <dgm:fillClrLst meth="repeat">
-      <a:schemeClr val="lt1"/>
-    </dgm:fillClrLst>
-    <dgm:linClrLst meth="repeat">
-      <a:schemeClr val="accent1"/>
-    </dgm:linClrLst>
-    <dgm:effectClrLst/>
-    <dgm:txLinClrLst/>
-    <dgm:txFillClrLst meth="repeat">
-      <a:schemeClr val="dk1"/>
-    </dgm:txFillClrLst>
-    <dgm:txEffectClrLst/>
-  </dgm:styleLbl>
-  <dgm:styleLbl name="fgAccFollowNode1">
-    <dgm:fillClrLst meth="repeat">
-      <a:schemeClr val="accent1">
-        <a:alpha val="90000"/>
-        <a:tint val="40000"/>
-      </a:schemeClr>
-    </dgm:fillClrLst>
-    <dgm:linClrLst meth="repeat">
-      <a:schemeClr val="accent1">
-        <a:alpha val="90000"/>
-        <a:tint val="40000"/>
-      </a:schemeClr>
-    </dgm:linClrLst>
-    <dgm:effectClrLst/>
-    <dgm:txLinClrLst/>
-    <dgm:txFillClrLst meth="repeat">
-      <a:schemeClr val="dk1"/>
-    </dgm:txFillClrLst>
-    <dgm:txEffectClrLst/>
-  </dgm:styleLbl>
-  <dgm:styleLbl name="alignAccFollowNode1">
-    <dgm:fillClrLst meth="repeat">
-      <a:schemeClr val="accent1">
-        <a:alpha val="90000"/>
-        <a:tint val="40000"/>
-      </a:schemeClr>
-    </dgm:fillClrLst>
-    <dgm:linClrLst meth="repeat">
-      <a:schemeClr val="accent1">
-        <a:alpha val="90000"/>
-        <a:tint val="40000"/>
-      </a:schemeClr>
-    </dgm:linClrLst>
-    <dgm:effectClrLst/>
-    <dgm:txLinClrLst/>
-    <dgm:txFillClrLst meth="repeat">
-      <a:schemeClr val="dk1"/>
-    </dgm:txFillClrLst>
-    <dgm:txEffectClrLst/>
-  </dgm:styleLbl>
-  <dgm:styleLbl name="bgAccFollowNode1">
-    <dgm:fillClrLst meth="repeat">
-      <a:schemeClr val="accent1">
-        <a:alpha val="90000"/>
-        <a:tint val="40000"/>
-      </a:schemeClr>
-    </dgm:fillClrLst>
-    <dgm:linClrLst meth="repeat">
-      <a:schemeClr val="accent1">
-        <a:alpha val="90000"/>
-        <a:tint val="40000"/>
-      </a:schemeClr>
-    </dgm:linClrLst>
-    <dgm:effectClrLst/>
-    <dgm:txLinClrLst/>
-    <dgm:txFillClrLst meth="repeat">
-      <a:schemeClr val="dk1"/>
-    </dgm:txFillClrLst>
-    <dgm:txEffectClrLst/>
-  </dgm:styleLbl>
-  <dgm:styleLbl name="fgAcc0">
-    <dgm:fillClrLst meth="repeat">
-      <a:schemeClr val="lt1">
-        <a:alpha val="90000"/>
-      </a:schemeClr>
-    </dgm:fillClrLst>
-    <dgm:linClrLst meth="repeat">
-      <a:schemeClr val="accent1"/>
-    </dgm:linClrLst>
-    <dgm:effectClrLst/>
-    <dgm:txLinClrLst/>
-    <dgm:txFillClrLst meth="repeat">
-      <a:schemeClr val="dk1"/>
-    </dgm:txFillClrLst>
-    <dgm:txEffectClrLst/>
-  </dgm:styleLbl>
-  <dgm:styleLbl name="fgAcc2">
-    <dgm:fillClrLst meth="repeat">
-      <a:schemeClr val="lt1">
-        <a:alpha val="90000"/>
-      </a:schemeClr>
-    </dgm:fillClrLst>
-    <dgm:linClrLst meth="repeat">
-      <a:schemeClr val="accent1"/>
-    </dgm:linClrLst>
-    <dgm:effectClrLst/>
-    <dgm:txLinClrLst/>
-    <dgm:txFillClrLst meth="repeat">
-      <a:schemeClr val="dk1"/>
-    </dgm:txFillClrLst>
-    <dgm:txEffectClrLst/>
-  </dgm:styleLbl>
-  <dgm:styleLbl name="fgAcc3">
-    <dgm:fillClrLst meth="repeat">
-      <a:schemeClr val="lt1">
-        <a:alpha val="90000"/>
-      </a:schemeClr>
-    </dgm:fillClrLst>
-    <dgm:linClrLst meth="repeat">
-      <a:schemeClr val="accent1"/>
-    </dgm:linClrLst>
-    <dgm:effectClrLst/>
-    <dgm:txLinClrLst/>
-    <dgm:txFillClrLst meth="repeat">
-      <a:schemeClr val="dk1"/>
-    </dgm:txFillClrLst>
-    <dgm:txEffectClrLst/>
-  </dgm:styleLbl>
-  <dgm:styleLbl name="fgAcc4">
-    <dgm:fillClrLst meth="repeat">
-      <a:schemeClr val="lt1">
-        <a:alpha val="90000"/>
-      </a:schemeClr>
-    </dgm:fillClrLst>
-    <dgm:linClrLst meth="repeat">
-      <a:schemeClr val="accent1"/>
-    </dgm:linClrLst>
-    <dgm:effectClrLst/>
-    <dgm:txLinClrLst/>
-    <dgm:txFillClrLst meth="repeat">
-      <a:schemeClr val="dk1"/>
-    </dgm:txFillClrLst>
-    <dgm:txEffectClrLst/>
-  </dgm:styleLbl>
-  <dgm:styleLbl name="bgShp">
-    <dgm:fillClrLst meth="repeat">
-      <a:schemeClr val="accent1">
-        <a:tint val="40000"/>
-      </a:schemeClr>
-    </dgm:fillClrLst>
-    <dgm:linClrLst meth="repeat">
-      <a:schemeClr val="accent1"/>
-    </dgm:linClrLst>
-    <dgm:effectClrLst/>
-    <dgm:txLinClrLst/>
-    <dgm:txFillClrLst meth="repeat">
-      <a:schemeClr val="dk1"/>
-    </dgm:txFillClrLst>
-    <dgm:txEffectClrLst/>
-  </dgm:styleLbl>
-  <dgm:styleLbl name="dkBgShp">
-    <dgm:fillClrLst meth="repeat">
-      <a:schemeClr val="accent1">
-        <a:shade val="80000"/>
-      </a:schemeClr>
-    </dgm:fillClrLst>
-    <dgm:linClrLst meth="repeat">
-      <a:schemeClr val="accent1"/>
-    </dgm:linClrLst>
-    <dgm:effectClrLst/>
-    <dgm:txLinClrLst/>
-    <dgm:txFillClrLst meth="repeat">
-      <a:schemeClr val="lt1"/>
-    </dgm:txFillClrLst>
-    <dgm:txEffectClrLst/>
-  </dgm:styleLbl>
-  <dgm:styleLbl name="trBgShp">
-    <dgm:fillClrLst meth="repeat">
-      <a:schemeClr val="accent1">
-        <a:tint val="50000"/>
-        <a:alpha val="40000"/>
-      </a:schemeClr>
-    </dgm:fillClrLst>
-    <dgm:linClrLst meth="repeat">
-      <a:schemeClr val="accent1"/>
-    </dgm:linClrLst>
-    <dgm:effectClrLst/>
-    <dgm:txLinClrLst/>
-    <dgm:txFillClrLst meth="repeat">
-      <a:schemeClr val="lt1"/>
-    </dgm:txFillClrLst>
-    <dgm:txEffectClrLst/>
-  </dgm:styleLbl>
-  <dgm:styleLbl name="fgShp">
-    <dgm:fillClrLst meth="repeat">
-      <a:schemeClr val="accent1">
-        <a:tint val="60000"/>
-      </a:schemeClr>
-    </dgm:fillClrLst>
-    <dgm:linClrLst meth="repeat">
-      <a:schemeClr val="lt1"/>
-    </dgm:linClrLst>
-    <dgm:effectClrLst/>
-    <dgm:txLinClrLst/>
-    <dgm:txFillClrLst meth="repeat">
-      <a:schemeClr val="dk1"/>
-    </dgm:txFillClrLst>
-    <dgm:txEffectClrLst/>
-  </dgm:styleLbl>
-  <dgm:styleLbl name="revTx">
-    <dgm:fillClrLst meth="repeat">
-      <a:schemeClr val="lt1">
-        <a:alpha val="0"/>
-      </a:schemeClr>
-    </dgm:fillClrLst>
-    <dgm:linClrLst meth="repeat">
-      <a:schemeClr val="dk1">
-        <a:alpha val="0"/>
-      </a:schemeClr>
-    </dgm:linClrLst>
-    <dgm:effectClrLst/>
-    <dgm:txLinClrLst/>
-    <dgm:txFillClrLst meth="repeat">
-      <a:schemeClr val="tx1"/>
-    </dgm:txFillClrLst>
-    <dgm:txEffectClrLst/>
-  </dgm:styleLbl>
-</dgm:colorsDef>
-</file>
-
 <file path=ppt/diagrams/data1.xml><?xml version="1.0" encoding="utf-8"?>
 <dgm:dataModel xmlns:dgm="http://schemas.openxmlformats.org/drawingml/2006/diagram" xmlns:a="http://schemas.openxmlformats.org/drawingml/2006/main">
   <dgm:ptLst>
@@ -4903,10 +4160,7 @@
         <a:bodyPr/>
         <a:lstStyle/>
         <a:p>
-          <a:r>
-            <a:rPr lang="de-DE" noProof="0" dirty="0"/>
-            <a:t>Produkten</a:t>
-          </a:r>
+          <a:endParaRPr lang="de-DE" noProof="0" dirty="0"/>
         </a:p>
       </dgm:t>
     </dgm:pt>
@@ -6550,687 +5804,6 @@
 <file path=ppt/diagrams/data4.xml><?xml version="1.0" encoding="utf-8"?>
 <dgm:dataModel xmlns:dgm="http://schemas.openxmlformats.org/drawingml/2006/diagram" xmlns:a="http://schemas.openxmlformats.org/drawingml/2006/main">
   <dgm:ptLst>
-    <dgm:pt modelId="{1E0A9EEC-A1F3-4021-B282-84BE9DACC00E}" type="doc">
-      <dgm:prSet loTypeId="urn:microsoft.com/office/officeart/2005/8/layout/vList3" loCatId="list" qsTypeId="urn:microsoft.com/office/officeart/2005/8/quickstyle/simple3" qsCatId="simple" csTypeId="urn:microsoft.com/office/officeart/2005/8/colors/accent1_2" csCatId="accent1" phldr="1"/>
-      <dgm:spPr/>
-    </dgm:pt>
-    <dgm:pt modelId="{7FD2CFB3-6BBB-48E8-A19F-50DAD7A3CAD1}">
-      <dgm:prSet phldrT="[Text]"/>
-      <dgm:spPr/>
-      <dgm:t>
-        <a:bodyPr/>
-        <a:lstStyle/>
-        <a:p>
-          <a:r>
-            <a:rPr lang="de-DE" noProof="0" dirty="0"/>
-            <a:t>Camping	</a:t>
-          </a:r>
-        </a:p>
-      </dgm:t>
-    </dgm:pt>
-    <dgm:pt modelId="{138052AC-7CF3-4C5C-A9FA-E969EA70EE78}" type="parTrans" cxnId="{7F288708-7F26-485D-9FCD-2D9F8F2C8C79}">
-      <dgm:prSet/>
-      <dgm:spPr/>
-      <dgm:t>
-        <a:bodyPr/>
-        <a:lstStyle/>
-        <a:p>
-          <a:endParaRPr lang="en-US"/>
-        </a:p>
-      </dgm:t>
-    </dgm:pt>
-    <dgm:pt modelId="{465AA3D7-2839-4551-A6D1-E61178C55C66}" type="sibTrans" cxnId="{7F288708-7F26-485D-9FCD-2D9F8F2C8C79}">
-      <dgm:prSet/>
-      <dgm:spPr/>
-      <dgm:t>
-        <a:bodyPr/>
-        <a:lstStyle/>
-        <a:p>
-          <a:endParaRPr lang="en-US"/>
-        </a:p>
-      </dgm:t>
-    </dgm:pt>
-    <dgm:pt modelId="{8678B091-1039-41A5-BD39-33102113BA66}">
-      <dgm:prSet phldrT="[Text]"/>
-      <dgm:spPr/>
-      <dgm:t>
-        <a:bodyPr/>
-        <a:lstStyle/>
-        <a:p>
-          <a:r>
-            <a:rPr lang="de-DE" noProof="0"/>
-            <a:t>Klettern</a:t>
-          </a:r>
-        </a:p>
-      </dgm:t>
-    </dgm:pt>
-    <dgm:pt modelId="{33FB1652-2331-4266-8EB8-C5279B2D9F8B}" type="parTrans" cxnId="{40572262-7538-4943-9AE1-E3E255120383}">
-      <dgm:prSet/>
-      <dgm:spPr/>
-      <dgm:t>
-        <a:bodyPr/>
-        <a:lstStyle/>
-        <a:p>
-          <a:endParaRPr lang="en-US"/>
-        </a:p>
-      </dgm:t>
-    </dgm:pt>
-    <dgm:pt modelId="{1339A8AE-0EE3-4533-B08B-AE389DB8399F}" type="sibTrans" cxnId="{40572262-7538-4943-9AE1-E3E255120383}">
-      <dgm:prSet/>
-      <dgm:spPr/>
-      <dgm:t>
-        <a:bodyPr/>
-        <a:lstStyle/>
-        <a:p>
-          <a:endParaRPr lang="en-US"/>
-        </a:p>
-      </dgm:t>
-    </dgm:pt>
-    <dgm:pt modelId="{BA50CEE2-C292-4705-AB0E-33D680F080D3}">
-      <dgm:prSet phldrT="[Text]"/>
-      <dgm:spPr/>
-      <dgm:t>
-        <a:bodyPr/>
-        <a:lstStyle/>
-        <a:p>
-          <a:r>
-            <a:rPr lang="de-DE" noProof="0"/>
-            <a:t>Schlafsäcke</a:t>
-          </a:r>
-        </a:p>
-      </dgm:t>
-    </dgm:pt>
-    <dgm:pt modelId="{AC4A0E10-CB76-42A9-9F60-94BA99258952}" type="parTrans" cxnId="{31D954BE-9A5B-4F33-8224-0D7CEDE794F9}">
-      <dgm:prSet/>
-      <dgm:spPr/>
-      <dgm:t>
-        <a:bodyPr/>
-        <a:lstStyle/>
-        <a:p>
-          <a:endParaRPr lang="en-US"/>
-        </a:p>
-      </dgm:t>
-    </dgm:pt>
-    <dgm:pt modelId="{612018B0-3F07-49C1-9BE0-FD1C23E7D5C8}" type="sibTrans" cxnId="{31D954BE-9A5B-4F33-8224-0D7CEDE794F9}">
-      <dgm:prSet/>
-      <dgm:spPr/>
-      <dgm:t>
-        <a:bodyPr/>
-        <a:lstStyle/>
-        <a:p>
-          <a:endParaRPr lang="en-US"/>
-        </a:p>
-      </dgm:t>
-    </dgm:pt>
-    <dgm:pt modelId="{6869E6AD-8C90-4F21-BEA9-734BF8A72C95}">
-      <dgm:prSet phldrT="[Text]"/>
-      <dgm:spPr/>
-      <dgm:t>
-        <a:bodyPr/>
-        <a:lstStyle/>
-        <a:p>
-          <a:r>
-            <a:rPr lang="de-DE" noProof="0"/>
-            <a:t>Rucksäcke</a:t>
-          </a:r>
-        </a:p>
-      </dgm:t>
-    </dgm:pt>
-    <dgm:pt modelId="{4C127B45-4902-4460-865F-000A853E5738}" type="parTrans" cxnId="{749DD84E-5576-45AA-B099-A7A8C2677C80}">
-      <dgm:prSet/>
-      <dgm:spPr/>
-      <dgm:t>
-        <a:bodyPr/>
-        <a:lstStyle/>
-        <a:p>
-          <a:endParaRPr lang="en-US"/>
-        </a:p>
-      </dgm:t>
-    </dgm:pt>
-    <dgm:pt modelId="{56C2DC52-8D99-4C92-81FA-BBA36F8D5C20}" type="sibTrans" cxnId="{749DD84E-5576-45AA-B099-A7A8C2677C80}">
-      <dgm:prSet/>
-      <dgm:spPr/>
-      <dgm:t>
-        <a:bodyPr/>
-        <a:lstStyle/>
-        <a:p>
-          <a:endParaRPr lang="en-US"/>
-        </a:p>
-      </dgm:t>
-    </dgm:pt>
-    <dgm:pt modelId="{48F8D795-17DC-4FDA-B995-2265CEFF5124}">
-      <dgm:prSet phldrT="[Text]"/>
-      <dgm:spPr/>
-      <dgm:t>
-        <a:bodyPr/>
-        <a:lstStyle/>
-        <a:p>
-          <a:r>
-            <a:rPr lang="de-DE" noProof="0"/>
-            <a:t>Familienzelte</a:t>
-          </a:r>
-        </a:p>
-      </dgm:t>
-    </dgm:pt>
-    <dgm:pt modelId="{75358A58-6A0A-42B7-8632-F10270DED0FF}" type="parTrans" cxnId="{BEA6D506-D716-44E0-B012-281B76379E35}">
-      <dgm:prSet/>
-      <dgm:spPr/>
-      <dgm:t>
-        <a:bodyPr/>
-        <a:lstStyle/>
-        <a:p>
-          <a:endParaRPr lang="en-US"/>
-        </a:p>
-      </dgm:t>
-    </dgm:pt>
-    <dgm:pt modelId="{25737AE1-B100-4F68-A727-8EA495043B7E}" type="sibTrans" cxnId="{BEA6D506-D716-44E0-B012-281B76379E35}">
-      <dgm:prSet/>
-      <dgm:spPr/>
-      <dgm:t>
-        <a:bodyPr/>
-        <a:lstStyle/>
-        <a:p>
-          <a:endParaRPr lang="en-US"/>
-        </a:p>
-      </dgm:t>
-    </dgm:pt>
-    <dgm:pt modelId="{42972CCA-44F0-45AE-968E-2E4AC0C92DA1}">
-      <dgm:prSet phldrT="[Text]"/>
-      <dgm:spPr/>
-      <dgm:t>
-        <a:bodyPr/>
-        <a:lstStyle/>
-        <a:p>
-          <a:r>
-            <a:rPr lang="de-DE" noProof="0"/>
-            <a:t>Isomatten</a:t>
-          </a:r>
-        </a:p>
-      </dgm:t>
-    </dgm:pt>
-    <dgm:pt modelId="{5F4B010B-3DC1-46DE-8DFB-6638D1B30ED6}" type="parTrans" cxnId="{13E985E1-2B8B-4669-9197-F512F01C1800}">
-      <dgm:prSet/>
-      <dgm:spPr/>
-      <dgm:t>
-        <a:bodyPr/>
-        <a:lstStyle/>
-        <a:p>
-          <a:endParaRPr lang="en-US"/>
-        </a:p>
-      </dgm:t>
-    </dgm:pt>
-    <dgm:pt modelId="{7E98FFBB-89E2-42A3-B425-D15C3F17D21A}" type="sibTrans" cxnId="{13E985E1-2B8B-4669-9197-F512F01C1800}">
-      <dgm:prSet/>
-      <dgm:spPr/>
-      <dgm:t>
-        <a:bodyPr/>
-        <a:lstStyle/>
-        <a:p>
-          <a:endParaRPr lang="en-US"/>
-        </a:p>
-      </dgm:t>
-    </dgm:pt>
-    <dgm:pt modelId="{751D1385-6C54-4FEC-B26F-2DFB732DC40E}">
-      <dgm:prSet phldrT="[Text]"/>
-      <dgm:spPr/>
-      <dgm:t>
-        <a:bodyPr/>
-        <a:lstStyle/>
-        <a:p>
-          <a:r>
-            <a:rPr lang="de-DE" noProof="0"/>
-            <a:t>Innengestellrucksäcke</a:t>
-          </a:r>
-        </a:p>
-      </dgm:t>
-    </dgm:pt>
-    <dgm:pt modelId="{96682407-31A0-40A9-A535-D535D4DD8FF8}" type="parTrans" cxnId="{38247E66-321D-4C49-8881-CD4C132CFE1A}">
-      <dgm:prSet/>
-      <dgm:spPr/>
-      <dgm:t>
-        <a:bodyPr/>
-        <a:lstStyle/>
-        <a:p>
-          <a:endParaRPr lang="en-US"/>
-        </a:p>
-      </dgm:t>
-    </dgm:pt>
-    <dgm:pt modelId="{3627AF4B-EADE-4EC5-A027-9E23049404A0}" type="sibTrans" cxnId="{38247E66-321D-4C49-8881-CD4C132CFE1A}">
-      <dgm:prSet/>
-      <dgm:spPr/>
-      <dgm:t>
-        <a:bodyPr/>
-        <a:lstStyle/>
-        <a:p>
-          <a:endParaRPr lang="en-US"/>
-        </a:p>
-      </dgm:t>
-    </dgm:pt>
-    <dgm:pt modelId="{CF5E2CFA-7382-4C31-A540-DB09165C26C8}">
-      <dgm:prSet phldrT="[Text]"/>
-      <dgm:spPr/>
-      <dgm:t>
-        <a:bodyPr/>
-        <a:lstStyle/>
-        <a:p>
-          <a:r>
-            <a:rPr lang="de-DE" noProof="0" dirty="0"/>
-            <a:t>Kochzubehör</a:t>
-          </a:r>
-        </a:p>
-      </dgm:t>
-    </dgm:pt>
-    <dgm:pt modelId="{08913989-1E5F-4952-80E5-7C2A1B98D8AA}" type="parTrans" cxnId="{67701E72-215F-4B25-BBCD-49019B9F0314}">
-      <dgm:prSet/>
-      <dgm:spPr/>
-      <dgm:t>
-        <a:bodyPr/>
-        <a:lstStyle/>
-        <a:p>
-          <a:endParaRPr lang="en-US"/>
-        </a:p>
-      </dgm:t>
-    </dgm:pt>
-    <dgm:pt modelId="{640E3DF5-5C83-4F54-B477-8FB49926C987}" type="sibTrans" cxnId="{67701E72-215F-4B25-BBCD-49019B9F0314}">
-      <dgm:prSet/>
-      <dgm:spPr/>
-      <dgm:t>
-        <a:bodyPr/>
-        <a:lstStyle/>
-        <a:p>
-          <a:endParaRPr lang="en-US"/>
-        </a:p>
-      </dgm:t>
-    </dgm:pt>
-    <dgm:pt modelId="{0A03AF9D-274D-43EC-9DE7-0F35446476B8}">
-      <dgm:prSet phldrT="[Text]"/>
-      <dgm:spPr/>
-      <dgm:t>
-        <a:bodyPr/>
-        <a:lstStyle/>
-        <a:p>
-          <a:r>
-            <a:rPr lang="de-DE" noProof="0" dirty="0"/>
-            <a:t>Trockennahrung</a:t>
-          </a:r>
-        </a:p>
-      </dgm:t>
-    </dgm:pt>
-    <dgm:pt modelId="{FE5669F5-CCBA-41F5-BFD5-88AD04A1F4AD}" type="parTrans" cxnId="{9AD370AF-6608-41E4-86DB-7DBBDC1626F4}">
-      <dgm:prSet/>
-      <dgm:spPr/>
-      <dgm:t>
-        <a:bodyPr/>
-        <a:lstStyle/>
-        <a:p>
-          <a:endParaRPr lang="en-US"/>
-        </a:p>
-      </dgm:t>
-    </dgm:pt>
-    <dgm:pt modelId="{4CD8A9EB-653A-4B3D-A913-E6AF3687FC94}" type="sibTrans" cxnId="{9AD370AF-6608-41E4-86DB-7DBBDC1626F4}">
-      <dgm:prSet/>
-      <dgm:spPr/>
-      <dgm:t>
-        <a:bodyPr/>
-        <a:lstStyle/>
-        <a:p>
-          <a:endParaRPr lang="en-US"/>
-        </a:p>
-      </dgm:t>
-    </dgm:pt>
-    <dgm:pt modelId="{47F06EE3-532D-4302-A24D-1356C4919F9A}">
-      <dgm:prSet phldrT="[Text]"/>
-      <dgm:spPr/>
-      <dgm:t>
-        <a:bodyPr/>
-        <a:lstStyle/>
-        <a:p>
-          <a:r>
-            <a:rPr lang="de-DE" noProof="0"/>
-            <a:t>Klettergurte</a:t>
-          </a:r>
-        </a:p>
-      </dgm:t>
-    </dgm:pt>
-    <dgm:pt modelId="{B9A182F4-F9EA-448D-9733-7B6A8481D548}" type="parTrans" cxnId="{74FEE3D8-14E8-45D2-A327-1C28101AC64B}">
-      <dgm:prSet/>
-      <dgm:spPr/>
-      <dgm:t>
-        <a:bodyPr/>
-        <a:lstStyle/>
-        <a:p>
-          <a:endParaRPr lang="en-US"/>
-        </a:p>
-      </dgm:t>
-    </dgm:pt>
-    <dgm:pt modelId="{9CC303E4-51DC-4655-9B78-E213A8F7952D}" type="sibTrans" cxnId="{74FEE3D8-14E8-45D2-A327-1C28101AC64B}">
-      <dgm:prSet/>
-      <dgm:spPr/>
-      <dgm:t>
-        <a:bodyPr/>
-        <a:lstStyle/>
-        <a:p>
-          <a:endParaRPr lang="en-US"/>
-        </a:p>
-      </dgm:t>
-    </dgm:pt>
-    <dgm:pt modelId="{D746EDC1-D2E1-4316-A6BC-76371569FA5B}">
-      <dgm:prSet phldrT="[Text]"/>
-      <dgm:spPr/>
-      <dgm:t>
-        <a:bodyPr/>
-        <a:lstStyle/>
-        <a:p>
-          <a:r>
-            <a:rPr lang="de-DE" noProof="0"/>
-            <a:t>Kletterschuhe</a:t>
-          </a:r>
-        </a:p>
-      </dgm:t>
-    </dgm:pt>
-    <dgm:pt modelId="{B03A1AC9-1E9A-4881-81E9-D13385C745F0}" type="parTrans" cxnId="{18E54FD5-A680-43EE-9170-A437FFF855E9}">
-      <dgm:prSet/>
-      <dgm:spPr/>
-      <dgm:t>
-        <a:bodyPr/>
-        <a:lstStyle/>
-        <a:p>
-          <a:endParaRPr lang="en-US"/>
-        </a:p>
-      </dgm:t>
-    </dgm:pt>
-    <dgm:pt modelId="{EC2BA8BA-D383-4389-9F82-494CC7B522D9}" type="sibTrans" cxnId="{18E54FD5-A680-43EE-9170-A437FFF855E9}">
-      <dgm:prSet/>
-      <dgm:spPr/>
-      <dgm:t>
-        <a:bodyPr/>
-        <a:lstStyle/>
-        <a:p>
-          <a:endParaRPr lang="en-US"/>
-        </a:p>
-      </dgm:t>
-    </dgm:pt>
-    <dgm:pt modelId="{E86B83D7-CAD1-401B-9DBE-295B68B04246}">
-      <dgm:prSet phldrT="[Text]"/>
-      <dgm:spPr/>
-      <dgm:t>
-        <a:bodyPr/>
-        <a:lstStyle/>
-        <a:p>
-          <a:r>
-            <a:rPr lang="de-DE" noProof="0"/>
-            <a:t>Helme</a:t>
-          </a:r>
-        </a:p>
-      </dgm:t>
-    </dgm:pt>
-    <dgm:pt modelId="{0B2326DF-2C5C-4252-B422-8CE619A6B614}" type="parTrans" cxnId="{DCBCEF08-EAC0-442C-9D05-AF7AB70B7987}">
-      <dgm:prSet/>
-      <dgm:spPr/>
-      <dgm:t>
-        <a:bodyPr/>
-        <a:lstStyle/>
-        <a:p>
-          <a:endParaRPr lang="en-US"/>
-        </a:p>
-      </dgm:t>
-    </dgm:pt>
-    <dgm:pt modelId="{D927EF45-3A10-4571-A646-A4F5B3B179DA}" type="sibTrans" cxnId="{DCBCEF08-EAC0-442C-9D05-AF7AB70B7987}">
-      <dgm:prSet/>
-      <dgm:spPr/>
-      <dgm:t>
-        <a:bodyPr/>
-        <a:lstStyle/>
-        <a:p>
-          <a:endParaRPr lang="en-US"/>
-        </a:p>
-      </dgm:t>
-    </dgm:pt>
-    <dgm:pt modelId="{201F74C4-E621-4411-A10B-0119B461E60D}">
-      <dgm:prSet phldrT="[Text]"/>
-      <dgm:spPr/>
-      <dgm:t>
-        <a:bodyPr/>
-        <a:lstStyle/>
-        <a:p>
-          <a:r>
-            <a:rPr lang="de-DE" noProof="0"/>
-            <a:t>Handschuhe</a:t>
-          </a:r>
-        </a:p>
-      </dgm:t>
-    </dgm:pt>
-    <dgm:pt modelId="{F5404525-A261-4A12-BC1D-F1AD45BC396E}" type="parTrans" cxnId="{FECECC34-98AB-4616-B3DA-F297D716DEFA}">
-      <dgm:prSet/>
-      <dgm:spPr/>
-      <dgm:t>
-        <a:bodyPr/>
-        <a:lstStyle/>
-        <a:p>
-          <a:endParaRPr lang="en-US"/>
-        </a:p>
-      </dgm:t>
-    </dgm:pt>
-    <dgm:pt modelId="{C301BB22-1595-4679-B483-5CECCBFBDD2B}" type="sibTrans" cxnId="{FECECC34-98AB-4616-B3DA-F297D716DEFA}">
-      <dgm:prSet/>
-      <dgm:spPr/>
-      <dgm:t>
-        <a:bodyPr/>
-        <a:lstStyle/>
-        <a:p>
-          <a:endParaRPr lang="en-US"/>
-        </a:p>
-      </dgm:t>
-    </dgm:pt>
-    <dgm:pt modelId="{DB47FFE7-4A40-4C3D-819A-8A71FFAD6DBD}">
-      <dgm:prSet phldrT="[Text]"/>
-      <dgm:spPr/>
-      <dgm:t>
-        <a:bodyPr/>
-        <a:lstStyle/>
-        <a:p>
-          <a:r>
-            <a:rPr lang="de-DE" noProof="0"/>
-            <a:t>Seiltaschen	</a:t>
-          </a:r>
-        </a:p>
-      </dgm:t>
-    </dgm:pt>
-    <dgm:pt modelId="{7CDBAC8E-E6A1-4EB0-8BC2-AE9EC16E38ED}" type="parTrans" cxnId="{55DBF440-C682-4CE0-8504-C4C9040F0CB8}">
-      <dgm:prSet/>
-      <dgm:spPr/>
-      <dgm:t>
-        <a:bodyPr/>
-        <a:lstStyle/>
-        <a:p>
-          <a:endParaRPr lang="en-US"/>
-        </a:p>
-      </dgm:t>
-    </dgm:pt>
-    <dgm:pt modelId="{BCB6A4C3-EC97-4CE1-8183-161DAA609C3A}" type="sibTrans" cxnId="{55DBF440-C682-4CE0-8504-C4C9040F0CB8}">
-      <dgm:prSet/>
-      <dgm:spPr/>
-      <dgm:t>
-        <a:bodyPr/>
-        <a:lstStyle/>
-        <a:p>
-          <a:endParaRPr lang="en-US"/>
-        </a:p>
-      </dgm:t>
-    </dgm:pt>
-    <dgm:pt modelId="{0737DB7A-303C-4539-BD68-86B83D6494AA}">
-      <dgm:prSet phldrT="[Text]"/>
-      <dgm:spPr/>
-      <dgm:t>
-        <a:bodyPr/>
-        <a:lstStyle/>
-        <a:p>
-          <a:r>
-            <a:rPr lang="de-DE" noProof="0"/>
-            <a:t>Karabinerhaken</a:t>
-          </a:r>
-        </a:p>
-      </dgm:t>
-    </dgm:pt>
-    <dgm:pt modelId="{40518A63-A4F8-4E74-A73A-8078D13300AA}" type="parTrans" cxnId="{FC78CDCF-AF9B-4E38-8D1F-0D995147113E}">
-      <dgm:prSet/>
-      <dgm:spPr/>
-      <dgm:t>
-        <a:bodyPr/>
-        <a:lstStyle/>
-        <a:p>
-          <a:endParaRPr lang="en-US"/>
-        </a:p>
-      </dgm:t>
-    </dgm:pt>
-    <dgm:pt modelId="{B949DB7D-2B4E-4F98-A79A-29E712FC551C}" type="sibTrans" cxnId="{FC78CDCF-AF9B-4E38-8D1F-0D995147113E}">
-      <dgm:prSet/>
-      <dgm:spPr/>
-      <dgm:t>
-        <a:bodyPr/>
-        <a:lstStyle/>
-        <a:p>
-          <a:endParaRPr lang="en-US"/>
-        </a:p>
-      </dgm:t>
-    </dgm:pt>
-    <dgm:pt modelId="{F15BAEF5-EAC5-4DF6-BE98-C238332C80CA}">
-      <dgm:prSet phldrT="[Text]"/>
-      <dgm:spPr/>
-      <dgm:t>
-        <a:bodyPr/>
-        <a:lstStyle/>
-        <a:p>
-          <a:r>
-            <a:rPr lang="de-DE" noProof="0" dirty="0"/>
-            <a:t>Gamaschen</a:t>
-          </a:r>
-        </a:p>
-      </dgm:t>
-    </dgm:pt>
-    <dgm:pt modelId="{A1611F49-77EC-4EA5-BC28-EB7E3E718CC9}" type="parTrans" cxnId="{ECF7F816-7973-4EEF-83FC-BDC33407F24F}">
-      <dgm:prSet/>
-      <dgm:spPr/>
-      <dgm:t>
-        <a:bodyPr/>
-        <a:lstStyle/>
-        <a:p>
-          <a:endParaRPr lang="en-US"/>
-        </a:p>
-      </dgm:t>
-    </dgm:pt>
-    <dgm:pt modelId="{F9CF595B-68AA-470E-90CF-33F88CF440C9}" type="sibTrans" cxnId="{ECF7F816-7973-4EEF-83FC-BDC33407F24F}">
-      <dgm:prSet/>
-      <dgm:spPr/>
-      <dgm:t>
-        <a:bodyPr/>
-        <a:lstStyle/>
-        <a:p>
-          <a:endParaRPr lang="en-US"/>
-        </a:p>
-      </dgm:t>
-    </dgm:pt>
-    <dgm:pt modelId="{1BA5EF50-916E-406C-BBFC-185075569AAF}" type="pres">
-      <dgm:prSet presAssocID="{1E0A9EEC-A1F3-4021-B282-84BE9DACC00E}" presName="linearFlow" presStyleCnt="0">
-        <dgm:presLayoutVars>
-          <dgm:dir/>
-          <dgm:resizeHandles val="exact"/>
-        </dgm:presLayoutVars>
-      </dgm:prSet>
-      <dgm:spPr/>
-    </dgm:pt>
-    <dgm:pt modelId="{B0D61B46-CDAB-4426-8DD2-AAA1C4963565}" type="pres">
-      <dgm:prSet presAssocID="{7FD2CFB3-6BBB-48E8-A19F-50DAD7A3CAD1}" presName="composite" presStyleCnt="0"/>
-      <dgm:spPr/>
-    </dgm:pt>
-    <dgm:pt modelId="{84EF41A3-CB03-44D6-B8CD-5D406F609E67}" type="pres">
-      <dgm:prSet presAssocID="{7FD2CFB3-6BBB-48E8-A19F-50DAD7A3CAD1}" presName="imgShp" presStyleLbl="fgImgPlace1" presStyleIdx="0" presStyleCnt="2"/>
-      <dgm:spPr/>
-    </dgm:pt>
-    <dgm:pt modelId="{70E086EE-326A-4119-A981-C734C709883A}" type="pres">
-      <dgm:prSet presAssocID="{7FD2CFB3-6BBB-48E8-A19F-50DAD7A3CAD1}" presName="txShp" presStyleLbl="node1" presStyleIdx="0" presStyleCnt="2" custLinFactNeighborX="-1763" custLinFactNeighborY="3197">
-        <dgm:presLayoutVars>
-          <dgm:bulletEnabled val="1"/>
-        </dgm:presLayoutVars>
-      </dgm:prSet>
-      <dgm:spPr/>
-    </dgm:pt>
-    <dgm:pt modelId="{2075A8C6-9BF6-4090-AB95-0B31FBD13DCD}" type="pres">
-      <dgm:prSet presAssocID="{465AA3D7-2839-4551-A6D1-E61178C55C66}" presName="spacing" presStyleCnt="0"/>
-      <dgm:spPr/>
-    </dgm:pt>
-    <dgm:pt modelId="{3ADAF34E-558F-4006-B821-A79FDB41E24D}" type="pres">
-      <dgm:prSet presAssocID="{8678B091-1039-41A5-BD39-33102113BA66}" presName="composite" presStyleCnt="0"/>
-      <dgm:spPr/>
-    </dgm:pt>
-    <dgm:pt modelId="{26064293-6726-495D-A37B-FE80A76B44D8}" type="pres">
-      <dgm:prSet presAssocID="{8678B091-1039-41A5-BD39-33102113BA66}" presName="imgShp" presStyleLbl="fgImgPlace1" presStyleIdx="1" presStyleCnt="2"/>
-      <dgm:spPr/>
-    </dgm:pt>
-    <dgm:pt modelId="{A7EEEB32-D687-4AB5-9D2E-5880536332F1}" type="pres">
-      <dgm:prSet presAssocID="{8678B091-1039-41A5-BD39-33102113BA66}" presName="txShp" presStyleLbl="node1" presStyleIdx="1" presStyleCnt="2">
-        <dgm:presLayoutVars>
-          <dgm:bulletEnabled val="1"/>
-        </dgm:presLayoutVars>
-      </dgm:prSet>
-      <dgm:spPr/>
-    </dgm:pt>
-  </dgm:ptLst>
-  <dgm:cxnLst>
-    <dgm:cxn modelId="{BEA6D506-D716-44E0-B012-281B76379E35}" srcId="{7FD2CFB3-6BBB-48E8-A19F-50DAD7A3CAD1}" destId="{48F8D795-17DC-4FDA-B995-2265CEFF5124}" srcOrd="2" destOrd="0" parTransId="{75358A58-6A0A-42B7-8632-F10270DED0FF}" sibTransId="{25737AE1-B100-4F68-A727-8EA495043B7E}"/>
-    <dgm:cxn modelId="{7F288708-7F26-485D-9FCD-2D9F8F2C8C79}" srcId="{1E0A9EEC-A1F3-4021-B282-84BE9DACC00E}" destId="{7FD2CFB3-6BBB-48E8-A19F-50DAD7A3CAD1}" srcOrd="0" destOrd="0" parTransId="{138052AC-7CF3-4C5C-A9FA-E969EA70EE78}" sibTransId="{465AA3D7-2839-4551-A6D1-E61178C55C66}"/>
-    <dgm:cxn modelId="{DCBCEF08-EAC0-442C-9D05-AF7AB70B7987}" srcId="{8678B091-1039-41A5-BD39-33102113BA66}" destId="{E86B83D7-CAD1-401B-9DBE-295B68B04246}" srcOrd="2" destOrd="0" parTransId="{0B2326DF-2C5C-4252-B422-8CE619A6B614}" sibTransId="{D927EF45-3A10-4571-A646-A4F5B3B179DA}"/>
-    <dgm:cxn modelId="{ECF7F816-7973-4EEF-83FC-BDC33407F24F}" srcId="{8678B091-1039-41A5-BD39-33102113BA66}" destId="{F15BAEF5-EAC5-4DF6-BE98-C238332C80CA}" srcOrd="6" destOrd="0" parTransId="{A1611F49-77EC-4EA5-BC28-EB7E3E718CC9}" sibTransId="{F9CF595B-68AA-470E-90CF-33F88CF440C9}"/>
-    <dgm:cxn modelId="{FECECC34-98AB-4616-B3DA-F297D716DEFA}" srcId="{8678B091-1039-41A5-BD39-33102113BA66}" destId="{201F74C4-E621-4411-A10B-0119B461E60D}" srcOrd="3" destOrd="0" parTransId="{F5404525-A261-4A12-BC1D-F1AD45BC396E}" sibTransId="{C301BB22-1595-4679-B483-5CECCBFBDD2B}"/>
-    <dgm:cxn modelId="{55DBF440-C682-4CE0-8504-C4C9040F0CB8}" srcId="{8678B091-1039-41A5-BD39-33102113BA66}" destId="{DB47FFE7-4A40-4C3D-819A-8A71FFAD6DBD}" srcOrd="4" destOrd="0" parTransId="{7CDBAC8E-E6A1-4EB0-8BC2-AE9EC16E38ED}" sibTransId="{BCB6A4C3-EC97-4CE1-8183-161DAA609C3A}"/>
-    <dgm:cxn modelId="{2CE3335B-2446-4B20-849D-8EA073C9BEFF}" type="presOf" srcId="{BA50CEE2-C292-4705-AB0E-33D680F080D3}" destId="{70E086EE-326A-4119-A981-C734C709883A}" srcOrd="0" destOrd="1" presId="urn:microsoft.com/office/officeart/2005/8/layout/vList3"/>
-    <dgm:cxn modelId="{FB1E5061-D048-433B-B965-FE80C2E8FF64}" type="presOf" srcId="{F15BAEF5-EAC5-4DF6-BE98-C238332C80CA}" destId="{A7EEEB32-D687-4AB5-9D2E-5880536332F1}" srcOrd="0" destOrd="7" presId="urn:microsoft.com/office/officeart/2005/8/layout/vList3"/>
-    <dgm:cxn modelId="{40572262-7538-4943-9AE1-E3E255120383}" srcId="{1E0A9EEC-A1F3-4021-B282-84BE9DACC00E}" destId="{8678B091-1039-41A5-BD39-33102113BA66}" srcOrd="1" destOrd="0" parTransId="{33FB1652-2331-4266-8EB8-C5279B2D9F8B}" sibTransId="{1339A8AE-0EE3-4533-B08B-AE389DB8399F}"/>
-    <dgm:cxn modelId="{7D706262-47C8-46AD-9903-08242B3B048B}" type="presOf" srcId="{751D1385-6C54-4FEC-B26F-2DFB732DC40E}" destId="{70E086EE-326A-4119-A981-C734C709883A}" srcOrd="0" destOrd="5" presId="urn:microsoft.com/office/officeart/2005/8/layout/vList3"/>
-    <dgm:cxn modelId="{38247E66-321D-4C49-8881-CD4C132CFE1A}" srcId="{7FD2CFB3-6BBB-48E8-A19F-50DAD7A3CAD1}" destId="{751D1385-6C54-4FEC-B26F-2DFB732DC40E}" srcOrd="4" destOrd="0" parTransId="{96682407-31A0-40A9-A535-D535D4DD8FF8}" sibTransId="{3627AF4B-EADE-4EC5-A027-9E23049404A0}"/>
-    <dgm:cxn modelId="{EACCDF48-7447-4B79-8485-4FDB182D3253}" type="presOf" srcId="{201F74C4-E621-4411-A10B-0119B461E60D}" destId="{A7EEEB32-D687-4AB5-9D2E-5880536332F1}" srcOrd="0" destOrd="4" presId="urn:microsoft.com/office/officeart/2005/8/layout/vList3"/>
-    <dgm:cxn modelId="{42E3C34E-4552-4342-BB58-0248FFC16223}" type="presOf" srcId="{47F06EE3-532D-4302-A24D-1356C4919F9A}" destId="{A7EEEB32-D687-4AB5-9D2E-5880536332F1}" srcOrd="0" destOrd="1" presId="urn:microsoft.com/office/officeart/2005/8/layout/vList3"/>
-    <dgm:cxn modelId="{749DD84E-5576-45AA-B099-A7A8C2677C80}" srcId="{7FD2CFB3-6BBB-48E8-A19F-50DAD7A3CAD1}" destId="{6869E6AD-8C90-4F21-BEA9-734BF8A72C95}" srcOrd="1" destOrd="0" parTransId="{4C127B45-4902-4460-865F-000A853E5738}" sibTransId="{56C2DC52-8D99-4C92-81FA-BBA36F8D5C20}"/>
-    <dgm:cxn modelId="{67701E72-215F-4B25-BBCD-49019B9F0314}" srcId="{7FD2CFB3-6BBB-48E8-A19F-50DAD7A3CAD1}" destId="{CF5E2CFA-7382-4C31-A540-DB09165C26C8}" srcOrd="5" destOrd="0" parTransId="{08913989-1E5F-4952-80E5-7C2A1B98D8AA}" sibTransId="{640E3DF5-5C83-4F54-B477-8FB49926C987}"/>
-    <dgm:cxn modelId="{871F6E74-D7CB-4819-A7D2-66BE36D5072A}" type="presOf" srcId="{7FD2CFB3-6BBB-48E8-A19F-50DAD7A3CAD1}" destId="{70E086EE-326A-4119-A981-C734C709883A}" srcOrd="0" destOrd="0" presId="urn:microsoft.com/office/officeart/2005/8/layout/vList3"/>
-    <dgm:cxn modelId="{09644989-8F1D-4AAF-8105-436366AE6624}" type="presOf" srcId="{1E0A9EEC-A1F3-4021-B282-84BE9DACC00E}" destId="{1BA5EF50-916E-406C-BBFC-185075569AAF}" srcOrd="0" destOrd="0" presId="urn:microsoft.com/office/officeart/2005/8/layout/vList3"/>
-    <dgm:cxn modelId="{8F9A70A6-580A-4994-89DD-35B68B28B734}" type="presOf" srcId="{D746EDC1-D2E1-4316-A6BC-76371569FA5B}" destId="{A7EEEB32-D687-4AB5-9D2E-5880536332F1}" srcOrd="0" destOrd="2" presId="urn:microsoft.com/office/officeart/2005/8/layout/vList3"/>
-    <dgm:cxn modelId="{EA1EC2A8-5165-4AC3-8F24-2B061F40DC69}" type="presOf" srcId="{42972CCA-44F0-45AE-968E-2E4AC0C92DA1}" destId="{70E086EE-326A-4119-A981-C734C709883A}" srcOrd="0" destOrd="4" presId="urn:microsoft.com/office/officeart/2005/8/layout/vList3"/>
-    <dgm:cxn modelId="{9AD370AF-6608-41E4-86DB-7DBBDC1626F4}" srcId="{7FD2CFB3-6BBB-48E8-A19F-50DAD7A3CAD1}" destId="{0A03AF9D-274D-43EC-9DE7-0F35446476B8}" srcOrd="6" destOrd="0" parTransId="{FE5669F5-CCBA-41F5-BFD5-88AD04A1F4AD}" sibTransId="{4CD8A9EB-653A-4B3D-A913-E6AF3687FC94}"/>
-    <dgm:cxn modelId="{B6B836B5-38F1-4077-BFAD-B47470D11220}" type="presOf" srcId="{CF5E2CFA-7382-4C31-A540-DB09165C26C8}" destId="{70E086EE-326A-4119-A981-C734C709883A}" srcOrd="0" destOrd="6" presId="urn:microsoft.com/office/officeart/2005/8/layout/vList3"/>
-    <dgm:cxn modelId="{84A1F4B7-7159-47F9-8145-72D2EF2F70BD}" type="presOf" srcId="{DB47FFE7-4A40-4C3D-819A-8A71FFAD6DBD}" destId="{A7EEEB32-D687-4AB5-9D2E-5880536332F1}" srcOrd="0" destOrd="5" presId="urn:microsoft.com/office/officeart/2005/8/layout/vList3"/>
-    <dgm:cxn modelId="{31D954BE-9A5B-4F33-8224-0D7CEDE794F9}" srcId="{7FD2CFB3-6BBB-48E8-A19F-50DAD7A3CAD1}" destId="{BA50CEE2-C292-4705-AB0E-33D680F080D3}" srcOrd="0" destOrd="0" parTransId="{AC4A0E10-CB76-42A9-9F60-94BA99258952}" sibTransId="{612018B0-3F07-49C1-9BE0-FD1C23E7D5C8}"/>
-    <dgm:cxn modelId="{FC78CDCF-AF9B-4E38-8D1F-0D995147113E}" srcId="{8678B091-1039-41A5-BD39-33102113BA66}" destId="{0737DB7A-303C-4539-BD68-86B83D6494AA}" srcOrd="5" destOrd="0" parTransId="{40518A63-A4F8-4E74-A73A-8078D13300AA}" sibTransId="{B949DB7D-2B4E-4F98-A79A-29E712FC551C}"/>
-    <dgm:cxn modelId="{18E54FD5-A680-43EE-9170-A437FFF855E9}" srcId="{8678B091-1039-41A5-BD39-33102113BA66}" destId="{D746EDC1-D2E1-4316-A6BC-76371569FA5B}" srcOrd="1" destOrd="0" parTransId="{B03A1AC9-1E9A-4881-81E9-D13385C745F0}" sibTransId="{EC2BA8BA-D383-4389-9F82-494CC7B522D9}"/>
-    <dgm:cxn modelId="{74FEE3D8-14E8-45D2-A327-1C28101AC64B}" srcId="{8678B091-1039-41A5-BD39-33102113BA66}" destId="{47F06EE3-532D-4302-A24D-1356C4919F9A}" srcOrd="0" destOrd="0" parTransId="{B9A182F4-F9EA-448D-9733-7B6A8481D548}" sibTransId="{9CC303E4-51DC-4655-9B78-E213A8F7952D}"/>
-    <dgm:cxn modelId="{D5300EE1-6116-4E49-8B60-229A03FBEFE4}" type="presOf" srcId="{48F8D795-17DC-4FDA-B995-2265CEFF5124}" destId="{70E086EE-326A-4119-A981-C734C709883A}" srcOrd="0" destOrd="3" presId="urn:microsoft.com/office/officeart/2005/8/layout/vList3"/>
-    <dgm:cxn modelId="{13E985E1-2B8B-4669-9197-F512F01C1800}" srcId="{7FD2CFB3-6BBB-48E8-A19F-50DAD7A3CAD1}" destId="{42972CCA-44F0-45AE-968E-2E4AC0C92DA1}" srcOrd="3" destOrd="0" parTransId="{5F4B010B-3DC1-46DE-8DFB-6638D1B30ED6}" sibTransId="{7E98FFBB-89E2-42A3-B425-D15C3F17D21A}"/>
-    <dgm:cxn modelId="{78216AE3-9DD4-455F-9DC3-89C82F7A3333}" type="presOf" srcId="{8678B091-1039-41A5-BD39-33102113BA66}" destId="{A7EEEB32-D687-4AB5-9D2E-5880536332F1}" srcOrd="0" destOrd="0" presId="urn:microsoft.com/office/officeart/2005/8/layout/vList3"/>
-    <dgm:cxn modelId="{3F5A17F3-759F-42B5-ABCA-34A82D1E3618}" type="presOf" srcId="{0737DB7A-303C-4539-BD68-86B83D6494AA}" destId="{A7EEEB32-D687-4AB5-9D2E-5880536332F1}" srcOrd="0" destOrd="6" presId="urn:microsoft.com/office/officeart/2005/8/layout/vList3"/>
-    <dgm:cxn modelId="{C36F60F7-E1E1-4917-AC44-7348851E46B5}" type="presOf" srcId="{E86B83D7-CAD1-401B-9DBE-295B68B04246}" destId="{A7EEEB32-D687-4AB5-9D2E-5880536332F1}" srcOrd="0" destOrd="3" presId="urn:microsoft.com/office/officeart/2005/8/layout/vList3"/>
-    <dgm:cxn modelId="{50F67CFA-1F90-4EF3-9D9B-90F7A16AFA7F}" type="presOf" srcId="{6869E6AD-8C90-4F21-BEA9-734BF8A72C95}" destId="{70E086EE-326A-4119-A981-C734C709883A}" srcOrd="0" destOrd="2" presId="urn:microsoft.com/office/officeart/2005/8/layout/vList3"/>
-    <dgm:cxn modelId="{7475C5FD-4568-4D9A-A31F-1E87927DFAC4}" type="presOf" srcId="{0A03AF9D-274D-43EC-9DE7-0F35446476B8}" destId="{70E086EE-326A-4119-A981-C734C709883A}" srcOrd="0" destOrd="7" presId="urn:microsoft.com/office/officeart/2005/8/layout/vList3"/>
-    <dgm:cxn modelId="{B774BE95-8AEC-4DD6-9108-E3BD549A42A2}" type="presParOf" srcId="{1BA5EF50-916E-406C-BBFC-185075569AAF}" destId="{B0D61B46-CDAB-4426-8DD2-AAA1C4963565}" srcOrd="0" destOrd="0" presId="urn:microsoft.com/office/officeart/2005/8/layout/vList3"/>
-    <dgm:cxn modelId="{71C8CE55-1896-43A3-8123-8BF71C0CE671}" type="presParOf" srcId="{B0D61B46-CDAB-4426-8DD2-AAA1C4963565}" destId="{84EF41A3-CB03-44D6-B8CD-5D406F609E67}" srcOrd="0" destOrd="0" presId="urn:microsoft.com/office/officeart/2005/8/layout/vList3"/>
-    <dgm:cxn modelId="{5D88439D-03F4-4D76-8160-71698589C416}" type="presParOf" srcId="{B0D61B46-CDAB-4426-8DD2-AAA1C4963565}" destId="{70E086EE-326A-4119-A981-C734C709883A}" srcOrd="1" destOrd="0" presId="urn:microsoft.com/office/officeart/2005/8/layout/vList3"/>
-    <dgm:cxn modelId="{84D388EB-6CA0-4F7E-9139-34CDD8EA3475}" type="presParOf" srcId="{1BA5EF50-916E-406C-BBFC-185075569AAF}" destId="{2075A8C6-9BF6-4090-AB95-0B31FBD13DCD}" srcOrd="1" destOrd="0" presId="urn:microsoft.com/office/officeart/2005/8/layout/vList3"/>
-    <dgm:cxn modelId="{3A9A7B90-D0D3-439B-B62E-F038AFCA0327}" type="presParOf" srcId="{1BA5EF50-916E-406C-BBFC-185075569AAF}" destId="{3ADAF34E-558F-4006-B821-A79FDB41E24D}" srcOrd="2" destOrd="0" presId="urn:microsoft.com/office/officeart/2005/8/layout/vList3"/>
-    <dgm:cxn modelId="{40D14107-D876-437F-BE63-12EE0351F2C1}" type="presParOf" srcId="{3ADAF34E-558F-4006-B821-A79FDB41E24D}" destId="{26064293-6726-495D-A37B-FE80A76B44D8}" srcOrd="0" destOrd="0" presId="urn:microsoft.com/office/officeart/2005/8/layout/vList3"/>
-    <dgm:cxn modelId="{B5BA41BB-7765-462A-B464-71B6B5C3384E}" type="presParOf" srcId="{3ADAF34E-558F-4006-B821-A79FDB41E24D}" destId="{A7EEEB32-D687-4AB5-9D2E-5880536332F1}" srcOrd="1" destOrd="0" presId="urn:microsoft.com/office/officeart/2005/8/layout/vList3"/>
-  </dgm:cxnLst>
-  <dgm:bg/>
-  <dgm:whole/>
-  <dgm:extLst>
-    <a:ext uri="http://schemas.microsoft.com/office/drawing/2008/diagram">
-      <dsp:dataModelExt xmlns:dsp="http://schemas.microsoft.com/office/drawing/2008/diagram" relId="rId6" minVer="http://schemas.openxmlformats.org/drawingml/2006/diagram"/>
-    </a:ext>
-  </dgm:extLst>
-</dgm:dataModel>
-</file>
-
-<file path=ppt/diagrams/data5.xml><?xml version="1.0" encoding="utf-8"?>
-<dgm:dataModel xmlns:dgm="http://schemas.openxmlformats.org/drawingml/2006/diagram" xmlns:a="http://schemas.openxmlformats.org/drawingml/2006/main">
-  <dgm:ptLst>
     <dgm:pt modelId="{2529C388-56D3-4F9B-803E-A844A308A8D8}" type="doc">
       <dgm:prSet loTypeId="urn:microsoft.com/office/officeart/2005/8/layout/default" loCatId="list" qsTypeId="urn:microsoft.com/office/officeart/2005/8/quickstyle/simple3" qsCatId="simple" csTypeId="urn:microsoft.com/office/officeart/2005/8/colors/accent1_2" csCatId="accent1" phldr="1"/>
       <dgm:spPr/>
@@ -7540,7 +6113,7 @@
 </dgm:dataModel>
 </file>
 
-<file path=ppt/diagrams/data6.xml><?xml version="1.0" encoding="utf-8"?>
+<file path=ppt/diagrams/data5.xml><?xml version="1.0" encoding="utf-8"?>
 <dgm:dataModel xmlns:dgm="http://schemas.openxmlformats.org/drawingml/2006/diagram" xmlns:a="http://schemas.openxmlformats.org/drawingml/2006/main">
   <dgm:ptLst>
     <dgm:pt modelId="{177B4DFB-67FC-4DF7-832F-55CCF897D9C1}" type="doc">
@@ -7942,10 +6515,7 @@
             </a:spcAft>
             <a:buNone/>
           </a:pPr>
-          <a:r>
-            <a:rPr lang="de-DE" sz="1800" kern="1200" noProof="0" dirty="0"/>
-            <a:t>Produkten</a:t>
-          </a:r>
+          <a:endParaRPr lang="de-DE" sz="1800" kern="1200" noProof="0" dirty="0"/>
         </a:p>
       </dsp:txBody>
       <dsp:txXfrm>
@@ -9546,600 +8116,6 @@
       <dsp:cNvGrpSpPr/>
     </dsp:nvGrpSpPr>
     <dsp:grpSpPr/>
-    <dsp:sp modelId="{70E086EE-326A-4119-A981-C734C709883A}">
-      <dsp:nvSpPr>
-        <dsp:cNvPr id="0" name=""/>
-        <dsp:cNvSpPr/>
-      </dsp:nvSpPr>
-      <dsp:spPr>
-        <a:xfrm rot="10800000">
-          <a:off x="1444220" y="52119"/>
-          <a:ext cx="4431810" cy="1624279"/>
-        </a:xfrm>
-        <a:prstGeom prst="homePlate">
-          <a:avLst/>
-        </a:prstGeom>
-        <a:gradFill rotWithShape="0">
-          <a:gsLst>
-            <a:gs pos="0">
-              <a:schemeClr val="accent1">
-                <a:hueOff val="0"/>
-                <a:satOff val="0"/>
-                <a:lumOff val="0"/>
-                <a:alphaOff val="0"/>
-                <a:tint val="10000"/>
-                <a:satMod val="300000"/>
-              </a:schemeClr>
-            </a:gs>
-            <a:gs pos="34000">
-              <a:schemeClr val="accent1">
-                <a:hueOff val="0"/>
-                <a:satOff val="0"/>
-                <a:lumOff val="0"/>
-                <a:alphaOff val="0"/>
-                <a:tint val="13500"/>
-                <a:satMod val="250000"/>
-              </a:schemeClr>
-            </a:gs>
-            <a:gs pos="100000">
-              <a:schemeClr val="accent1">
-                <a:hueOff val="0"/>
-                <a:satOff val="0"/>
-                <a:lumOff val="0"/>
-                <a:alphaOff val="0"/>
-                <a:tint val="60000"/>
-                <a:satMod val="200000"/>
-              </a:schemeClr>
-            </a:gs>
-          </a:gsLst>
-          <a:path path="circle">
-            <a:fillToRect l="50000" t="155000" r="50000" b="-55000"/>
-          </a:path>
-        </a:gradFill>
-        <a:ln>
-          <a:noFill/>
-        </a:ln>
-        <a:effectLst>
-          <a:outerShdw blurRad="63500" dist="25400" dir="14700000" algn="t" rotWithShape="0">
-            <a:srgbClr val="000000">
-              <a:alpha val="50000"/>
-            </a:srgbClr>
-          </a:outerShdw>
-        </a:effectLst>
-        <a:scene3d>
-          <a:camera prst="orthographicFront"/>
-          <a:lightRig rig="flat" dir="t"/>
-        </a:scene3d>
-        <a:sp3d prstMaterial="dkEdge">
-          <a:bevelT w="8200" h="38100"/>
-        </a:sp3d>
-      </dsp:spPr>
-      <dsp:style>
-        <a:lnRef idx="0">
-          <a:scrgbClr r="0" g="0" b="0"/>
-        </a:lnRef>
-        <a:fillRef idx="2">
-          <a:scrgbClr r="0" g="0" b="0"/>
-        </a:fillRef>
-        <a:effectRef idx="1">
-          <a:scrgbClr r="0" g="0" b="0"/>
-        </a:effectRef>
-        <a:fontRef idx="minor">
-          <a:schemeClr val="dk1"/>
-        </a:fontRef>
-      </dsp:style>
-      <dsp:txBody>
-        <a:bodyPr spcFirstLastPara="0" vert="horz" wrap="square" lIns="716262" tIns="53340" rIns="99568" bIns="53340" numCol="1" spcCol="1270" anchor="t" anchorCtr="0">
-          <a:noAutofit/>
-        </a:bodyPr>
-        <a:lstStyle/>
-        <a:p>
-          <a:pPr marL="0" lvl="0" indent="0" algn="l" defTabSz="622300">
-            <a:lnSpc>
-              <a:spcPct val="90000"/>
-            </a:lnSpc>
-            <a:spcBef>
-              <a:spcPct val="0"/>
-            </a:spcBef>
-            <a:spcAft>
-              <a:spcPct val="35000"/>
-            </a:spcAft>
-            <a:buNone/>
-          </a:pPr>
-          <a:r>
-            <a:rPr lang="de-DE" sz="1400" kern="1200" noProof="0" dirty="0"/>
-            <a:t>Camping	</a:t>
-          </a:r>
-        </a:p>
-        <a:p>
-          <a:pPr marL="57150" lvl="1" indent="-57150" algn="l" defTabSz="488950">
-            <a:lnSpc>
-              <a:spcPct val="90000"/>
-            </a:lnSpc>
-            <a:spcBef>
-              <a:spcPct val="0"/>
-            </a:spcBef>
-            <a:spcAft>
-              <a:spcPct val="15000"/>
-            </a:spcAft>
-            <a:buChar char="•"/>
-          </a:pPr>
-          <a:r>
-            <a:rPr lang="de-DE" sz="1100" kern="1200" noProof="0"/>
-            <a:t>Schlafsäcke</a:t>
-          </a:r>
-        </a:p>
-        <a:p>
-          <a:pPr marL="57150" lvl="1" indent="-57150" algn="l" defTabSz="488950">
-            <a:lnSpc>
-              <a:spcPct val="90000"/>
-            </a:lnSpc>
-            <a:spcBef>
-              <a:spcPct val="0"/>
-            </a:spcBef>
-            <a:spcAft>
-              <a:spcPct val="15000"/>
-            </a:spcAft>
-            <a:buChar char="•"/>
-          </a:pPr>
-          <a:r>
-            <a:rPr lang="de-DE" sz="1100" kern="1200" noProof="0"/>
-            <a:t>Rucksäcke</a:t>
-          </a:r>
-        </a:p>
-        <a:p>
-          <a:pPr marL="57150" lvl="1" indent="-57150" algn="l" defTabSz="488950">
-            <a:lnSpc>
-              <a:spcPct val="90000"/>
-            </a:lnSpc>
-            <a:spcBef>
-              <a:spcPct val="0"/>
-            </a:spcBef>
-            <a:spcAft>
-              <a:spcPct val="15000"/>
-            </a:spcAft>
-            <a:buChar char="•"/>
-          </a:pPr>
-          <a:r>
-            <a:rPr lang="de-DE" sz="1100" kern="1200" noProof="0"/>
-            <a:t>Familienzelte</a:t>
-          </a:r>
-        </a:p>
-        <a:p>
-          <a:pPr marL="57150" lvl="1" indent="-57150" algn="l" defTabSz="488950">
-            <a:lnSpc>
-              <a:spcPct val="90000"/>
-            </a:lnSpc>
-            <a:spcBef>
-              <a:spcPct val="0"/>
-            </a:spcBef>
-            <a:spcAft>
-              <a:spcPct val="15000"/>
-            </a:spcAft>
-            <a:buChar char="•"/>
-          </a:pPr>
-          <a:r>
-            <a:rPr lang="de-DE" sz="1100" kern="1200" noProof="0"/>
-            <a:t>Isomatten</a:t>
-          </a:r>
-        </a:p>
-        <a:p>
-          <a:pPr marL="57150" lvl="1" indent="-57150" algn="l" defTabSz="488950">
-            <a:lnSpc>
-              <a:spcPct val="90000"/>
-            </a:lnSpc>
-            <a:spcBef>
-              <a:spcPct val="0"/>
-            </a:spcBef>
-            <a:spcAft>
-              <a:spcPct val="15000"/>
-            </a:spcAft>
-            <a:buChar char="•"/>
-          </a:pPr>
-          <a:r>
-            <a:rPr lang="de-DE" sz="1100" kern="1200" noProof="0"/>
-            <a:t>Innengestellrucksäcke</a:t>
-          </a:r>
-        </a:p>
-        <a:p>
-          <a:pPr marL="57150" lvl="1" indent="-57150" algn="l" defTabSz="488950">
-            <a:lnSpc>
-              <a:spcPct val="90000"/>
-            </a:lnSpc>
-            <a:spcBef>
-              <a:spcPct val="0"/>
-            </a:spcBef>
-            <a:spcAft>
-              <a:spcPct val="15000"/>
-            </a:spcAft>
-            <a:buChar char="•"/>
-          </a:pPr>
-          <a:r>
-            <a:rPr lang="de-DE" sz="1100" kern="1200" noProof="0" dirty="0"/>
-            <a:t>Kochzubehör</a:t>
-          </a:r>
-        </a:p>
-        <a:p>
-          <a:pPr marL="57150" lvl="1" indent="-57150" algn="l" defTabSz="488950">
-            <a:lnSpc>
-              <a:spcPct val="90000"/>
-            </a:lnSpc>
-            <a:spcBef>
-              <a:spcPct val="0"/>
-            </a:spcBef>
-            <a:spcAft>
-              <a:spcPct val="15000"/>
-            </a:spcAft>
-            <a:buChar char="•"/>
-          </a:pPr>
-          <a:r>
-            <a:rPr lang="de-DE" sz="1100" kern="1200" noProof="0" dirty="0"/>
-            <a:t>Trockennahrung</a:t>
-          </a:r>
-        </a:p>
-      </dsp:txBody>
-      <dsp:txXfrm rot="10800000">
-        <a:off x="1850290" y="52119"/>
-        <a:ext cx="4025740" cy="1624279"/>
-      </dsp:txXfrm>
-    </dsp:sp>
-    <dsp:sp modelId="{84EF41A3-CB03-44D6-B8CD-5D406F609E67}">
-      <dsp:nvSpPr>
-        <dsp:cNvPr id="0" name=""/>
-        <dsp:cNvSpPr/>
-      </dsp:nvSpPr>
-      <dsp:spPr>
-        <a:xfrm>
-          <a:off x="710213" y="191"/>
-          <a:ext cx="1624279" cy="1624279"/>
-        </a:xfrm>
-        <a:prstGeom prst="ellipse">
-          <a:avLst/>
-        </a:prstGeom>
-        <a:solidFill>
-          <a:schemeClr val="accent1">
-            <a:tint val="50000"/>
-            <a:hueOff val="0"/>
-            <a:satOff val="0"/>
-            <a:lumOff val="0"/>
-            <a:alphaOff val="0"/>
-          </a:schemeClr>
-        </a:solidFill>
-        <a:ln w="9525" cap="flat" cmpd="sng" algn="ctr">
-          <a:solidFill>
-            <a:schemeClr val="lt1">
-              <a:hueOff val="0"/>
-              <a:satOff val="0"/>
-              <a:lumOff val="0"/>
-              <a:alphaOff val="0"/>
-            </a:schemeClr>
-          </a:solidFill>
-          <a:prstDash val="solid"/>
-        </a:ln>
-        <a:effectLst>
-          <a:outerShdw blurRad="63500" dist="25400" dir="14700000" algn="t" rotWithShape="0">
-            <a:srgbClr val="000000">
-              <a:alpha val="50000"/>
-            </a:srgbClr>
-          </a:outerShdw>
-        </a:effectLst>
-      </dsp:spPr>
-      <dsp:style>
-        <a:lnRef idx="1">
-          <a:scrgbClr r="0" g="0" b="0"/>
-        </a:lnRef>
-        <a:fillRef idx="1">
-          <a:scrgbClr r="0" g="0" b="0"/>
-        </a:fillRef>
-        <a:effectRef idx="1">
-          <a:scrgbClr r="0" g="0" b="0"/>
-        </a:effectRef>
-        <a:fontRef idx="minor"/>
-      </dsp:style>
-    </dsp:sp>
-    <dsp:sp modelId="{A7EEEB32-D687-4AB5-9D2E-5880536332F1}">
-      <dsp:nvSpPr>
-        <dsp:cNvPr id="0" name=""/>
-        <dsp:cNvSpPr/>
-      </dsp:nvSpPr>
-      <dsp:spPr>
-        <a:xfrm rot="10800000">
-          <a:off x="1522352" y="2109329"/>
-          <a:ext cx="4431810" cy="1624279"/>
-        </a:xfrm>
-        <a:prstGeom prst="homePlate">
-          <a:avLst/>
-        </a:prstGeom>
-        <a:gradFill rotWithShape="0">
-          <a:gsLst>
-            <a:gs pos="0">
-              <a:schemeClr val="accent1">
-                <a:hueOff val="0"/>
-                <a:satOff val="0"/>
-                <a:lumOff val="0"/>
-                <a:alphaOff val="0"/>
-                <a:tint val="10000"/>
-                <a:satMod val="300000"/>
-              </a:schemeClr>
-            </a:gs>
-            <a:gs pos="34000">
-              <a:schemeClr val="accent1">
-                <a:hueOff val="0"/>
-                <a:satOff val="0"/>
-                <a:lumOff val="0"/>
-                <a:alphaOff val="0"/>
-                <a:tint val="13500"/>
-                <a:satMod val="250000"/>
-              </a:schemeClr>
-            </a:gs>
-            <a:gs pos="100000">
-              <a:schemeClr val="accent1">
-                <a:hueOff val="0"/>
-                <a:satOff val="0"/>
-                <a:lumOff val="0"/>
-                <a:alphaOff val="0"/>
-                <a:tint val="60000"/>
-                <a:satMod val="200000"/>
-              </a:schemeClr>
-            </a:gs>
-          </a:gsLst>
-          <a:path path="circle">
-            <a:fillToRect l="50000" t="155000" r="50000" b="-55000"/>
-          </a:path>
-        </a:gradFill>
-        <a:ln>
-          <a:noFill/>
-        </a:ln>
-        <a:effectLst>
-          <a:outerShdw blurRad="63500" dist="25400" dir="14700000" algn="t" rotWithShape="0">
-            <a:srgbClr val="000000">
-              <a:alpha val="50000"/>
-            </a:srgbClr>
-          </a:outerShdw>
-        </a:effectLst>
-        <a:scene3d>
-          <a:camera prst="orthographicFront"/>
-          <a:lightRig rig="flat" dir="t"/>
-        </a:scene3d>
-        <a:sp3d prstMaterial="dkEdge">
-          <a:bevelT w="8200" h="38100"/>
-        </a:sp3d>
-      </dsp:spPr>
-      <dsp:style>
-        <a:lnRef idx="0">
-          <a:scrgbClr r="0" g="0" b="0"/>
-        </a:lnRef>
-        <a:fillRef idx="2">
-          <a:scrgbClr r="0" g="0" b="0"/>
-        </a:fillRef>
-        <a:effectRef idx="1">
-          <a:scrgbClr r="0" g="0" b="0"/>
-        </a:effectRef>
-        <a:fontRef idx="minor">
-          <a:schemeClr val="dk1"/>
-        </a:fontRef>
-      </dsp:style>
-      <dsp:txBody>
-        <a:bodyPr spcFirstLastPara="0" vert="horz" wrap="square" lIns="716262" tIns="53340" rIns="99568" bIns="53340" numCol="1" spcCol="1270" anchor="t" anchorCtr="0">
-          <a:noAutofit/>
-        </a:bodyPr>
-        <a:lstStyle/>
-        <a:p>
-          <a:pPr marL="0" lvl="0" indent="0" algn="l" defTabSz="622300">
-            <a:lnSpc>
-              <a:spcPct val="90000"/>
-            </a:lnSpc>
-            <a:spcBef>
-              <a:spcPct val="0"/>
-            </a:spcBef>
-            <a:spcAft>
-              <a:spcPct val="35000"/>
-            </a:spcAft>
-            <a:buNone/>
-          </a:pPr>
-          <a:r>
-            <a:rPr lang="de-DE" sz="1400" kern="1200" noProof="0"/>
-            <a:t>Klettern</a:t>
-          </a:r>
-        </a:p>
-        <a:p>
-          <a:pPr marL="57150" lvl="1" indent="-57150" algn="l" defTabSz="488950">
-            <a:lnSpc>
-              <a:spcPct val="90000"/>
-            </a:lnSpc>
-            <a:spcBef>
-              <a:spcPct val="0"/>
-            </a:spcBef>
-            <a:spcAft>
-              <a:spcPct val="15000"/>
-            </a:spcAft>
-            <a:buChar char="•"/>
-          </a:pPr>
-          <a:r>
-            <a:rPr lang="de-DE" sz="1100" kern="1200" noProof="0"/>
-            <a:t>Klettergurte</a:t>
-          </a:r>
-        </a:p>
-        <a:p>
-          <a:pPr marL="57150" lvl="1" indent="-57150" algn="l" defTabSz="488950">
-            <a:lnSpc>
-              <a:spcPct val="90000"/>
-            </a:lnSpc>
-            <a:spcBef>
-              <a:spcPct val="0"/>
-            </a:spcBef>
-            <a:spcAft>
-              <a:spcPct val="15000"/>
-            </a:spcAft>
-            <a:buChar char="•"/>
-          </a:pPr>
-          <a:r>
-            <a:rPr lang="de-DE" sz="1100" kern="1200" noProof="0"/>
-            <a:t>Kletterschuhe</a:t>
-          </a:r>
-        </a:p>
-        <a:p>
-          <a:pPr marL="57150" lvl="1" indent="-57150" algn="l" defTabSz="488950">
-            <a:lnSpc>
-              <a:spcPct val="90000"/>
-            </a:lnSpc>
-            <a:spcBef>
-              <a:spcPct val="0"/>
-            </a:spcBef>
-            <a:spcAft>
-              <a:spcPct val="15000"/>
-            </a:spcAft>
-            <a:buChar char="•"/>
-          </a:pPr>
-          <a:r>
-            <a:rPr lang="de-DE" sz="1100" kern="1200" noProof="0"/>
-            <a:t>Helme</a:t>
-          </a:r>
-        </a:p>
-        <a:p>
-          <a:pPr marL="57150" lvl="1" indent="-57150" algn="l" defTabSz="488950">
-            <a:lnSpc>
-              <a:spcPct val="90000"/>
-            </a:lnSpc>
-            <a:spcBef>
-              <a:spcPct val="0"/>
-            </a:spcBef>
-            <a:spcAft>
-              <a:spcPct val="15000"/>
-            </a:spcAft>
-            <a:buChar char="•"/>
-          </a:pPr>
-          <a:r>
-            <a:rPr lang="de-DE" sz="1100" kern="1200" noProof="0"/>
-            <a:t>Handschuhe</a:t>
-          </a:r>
-        </a:p>
-        <a:p>
-          <a:pPr marL="57150" lvl="1" indent="-57150" algn="l" defTabSz="488950">
-            <a:lnSpc>
-              <a:spcPct val="90000"/>
-            </a:lnSpc>
-            <a:spcBef>
-              <a:spcPct val="0"/>
-            </a:spcBef>
-            <a:spcAft>
-              <a:spcPct val="15000"/>
-            </a:spcAft>
-            <a:buChar char="•"/>
-          </a:pPr>
-          <a:r>
-            <a:rPr lang="de-DE" sz="1100" kern="1200" noProof="0"/>
-            <a:t>Seiltaschen	</a:t>
-          </a:r>
-        </a:p>
-        <a:p>
-          <a:pPr marL="57150" lvl="1" indent="-57150" algn="l" defTabSz="488950">
-            <a:lnSpc>
-              <a:spcPct val="90000"/>
-            </a:lnSpc>
-            <a:spcBef>
-              <a:spcPct val="0"/>
-            </a:spcBef>
-            <a:spcAft>
-              <a:spcPct val="15000"/>
-            </a:spcAft>
-            <a:buChar char="•"/>
-          </a:pPr>
-          <a:r>
-            <a:rPr lang="de-DE" sz="1100" kern="1200" noProof="0"/>
-            <a:t>Karabinerhaken</a:t>
-          </a:r>
-        </a:p>
-        <a:p>
-          <a:pPr marL="57150" lvl="1" indent="-57150" algn="l" defTabSz="488950">
-            <a:lnSpc>
-              <a:spcPct val="90000"/>
-            </a:lnSpc>
-            <a:spcBef>
-              <a:spcPct val="0"/>
-            </a:spcBef>
-            <a:spcAft>
-              <a:spcPct val="15000"/>
-            </a:spcAft>
-            <a:buChar char="•"/>
-          </a:pPr>
-          <a:r>
-            <a:rPr lang="de-DE" sz="1100" kern="1200" noProof="0" dirty="0"/>
-            <a:t>Gamaschen</a:t>
-          </a:r>
-        </a:p>
-      </dsp:txBody>
-      <dsp:txXfrm rot="10800000">
-        <a:off x="1928422" y="2109329"/>
-        <a:ext cx="4025740" cy="1624279"/>
-      </dsp:txXfrm>
-    </dsp:sp>
-    <dsp:sp modelId="{26064293-6726-495D-A37B-FE80A76B44D8}">
-      <dsp:nvSpPr>
-        <dsp:cNvPr id="0" name=""/>
-        <dsp:cNvSpPr/>
-      </dsp:nvSpPr>
-      <dsp:spPr>
-        <a:xfrm>
-          <a:off x="710213" y="2109329"/>
-          <a:ext cx="1624279" cy="1624279"/>
-        </a:xfrm>
-        <a:prstGeom prst="ellipse">
-          <a:avLst/>
-        </a:prstGeom>
-        <a:solidFill>
-          <a:schemeClr val="accent1">
-            <a:tint val="50000"/>
-            <a:hueOff val="0"/>
-            <a:satOff val="0"/>
-            <a:lumOff val="0"/>
-            <a:alphaOff val="0"/>
-          </a:schemeClr>
-        </a:solidFill>
-        <a:ln w="9525" cap="flat" cmpd="sng" algn="ctr">
-          <a:solidFill>
-            <a:schemeClr val="lt1">
-              <a:hueOff val="0"/>
-              <a:satOff val="0"/>
-              <a:lumOff val="0"/>
-              <a:alphaOff val="0"/>
-            </a:schemeClr>
-          </a:solidFill>
-          <a:prstDash val="solid"/>
-        </a:ln>
-        <a:effectLst>
-          <a:outerShdw blurRad="63500" dist="25400" dir="14700000" algn="t" rotWithShape="0">
-            <a:srgbClr val="000000">
-              <a:alpha val="50000"/>
-            </a:srgbClr>
-          </a:outerShdw>
-        </a:effectLst>
-      </dsp:spPr>
-      <dsp:style>
-        <a:lnRef idx="1">
-          <a:scrgbClr r="0" g="0" b="0"/>
-        </a:lnRef>
-        <a:fillRef idx="1">
-          <a:scrgbClr r="0" g="0" b="0"/>
-        </a:fillRef>
-        <a:effectRef idx="1">
-          <a:scrgbClr r="0" g="0" b="0"/>
-        </a:effectRef>
-        <a:fontRef idx="minor"/>
-      </dsp:style>
-    </dsp:sp>
-  </dsp:spTree>
-</dsp:drawing>
-</file>
-
-<file path=ppt/diagrams/drawing5.xml><?xml version="1.0" encoding="utf-8"?>
-<dsp:drawing xmlns:dgm="http://schemas.openxmlformats.org/drawingml/2006/diagram" xmlns:dsp="http://schemas.microsoft.com/office/drawing/2008/diagram" xmlns:a="http://schemas.openxmlformats.org/drawingml/2006/main">
-  <dsp:spTree>
-    <dsp:nvGrpSpPr>
-      <dsp:cNvPr id="0" name=""/>
-      <dsp:cNvGrpSpPr/>
-    </dsp:nvGrpSpPr>
-    <dsp:grpSpPr/>
     <dsp:sp modelId="{7F288B2D-BD15-48FC-9D49-68210D6CA131}">
       <dsp:nvSpPr>
         <dsp:cNvPr id="0" name=""/>
@@ -10719,7 +8695,7 @@
 </dsp:drawing>
 </file>
 
-<file path=ppt/diagrams/drawing6.xml><?xml version="1.0" encoding="utf-8"?>
+<file path=ppt/diagrams/drawing5.xml><?xml version="1.0" encoding="utf-8"?>
 <dsp:drawing xmlns:dgm="http://schemas.openxmlformats.org/drawingml/2006/diagram" xmlns:dsp="http://schemas.microsoft.com/office/drawing/2008/diagram" xmlns:a="http://schemas.openxmlformats.org/drawingml/2006/main">
   <dsp:spTree>
     <dsp:nvGrpSpPr>
@@ -14061,169 +12037,6 @@
 </file>
 
 <file path=ppt/diagrams/layout4.xml><?xml version="1.0" encoding="utf-8"?>
-<dgm:layoutDef xmlns:dgm="http://schemas.openxmlformats.org/drawingml/2006/diagram" xmlns:a="http://schemas.openxmlformats.org/drawingml/2006/main" uniqueId="urn:microsoft.com/office/officeart/2005/8/layout/vList3">
-  <dgm:title val=""/>
-  <dgm:desc val=""/>
-  <dgm:catLst>
-    <dgm:cat type="list" pri="14000"/>
-    <dgm:cat type="convert" pri="3000"/>
-    <dgm:cat type="picture" pri="27000"/>
-    <dgm:cat type="pictureconvert" pri="27000"/>
-  </dgm:catLst>
-  <dgm:sampData useDef="1">
-    <dgm:dataModel>
-      <dgm:ptLst/>
-      <dgm:bg/>
-      <dgm:whole/>
-    </dgm:dataModel>
-  </dgm:sampData>
-  <dgm:styleData>
-    <dgm:dataModel>
-      <dgm:ptLst>
-        <dgm:pt modelId="0" type="doc"/>
-        <dgm:pt modelId="1"/>
-        <dgm:pt modelId="2"/>
-      </dgm:ptLst>
-      <dgm:cxnLst>
-        <dgm:cxn modelId="3" srcId="0" destId="1" srcOrd="0" destOrd="0"/>
-        <dgm:cxn modelId="4" srcId="0" destId="2" srcOrd="1" destOrd="0"/>
-      </dgm:cxnLst>
-      <dgm:bg/>
-      <dgm:whole/>
-    </dgm:dataModel>
-  </dgm:styleData>
-  <dgm:clrData>
-    <dgm:dataModel>
-      <dgm:ptLst>
-        <dgm:pt modelId="0" type="doc"/>
-        <dgm:pt modelId="1"/>
-        <dgm:pt modelId="2"/>
-        <dgm:pt modelId="3"/>
-        <dgm:pt modelId="4"/>
-      </dgm:ptLst>
-      <dgm:cxnLst>
-        <dgm:cxn modelId="5" srcId="0" destId="1" srcOrd="0" destOrd="0"/>
-        <dgm:cxn modelId="6" srcId="0" destId="2" srcOrd="1" destOrd="0"/>
-        <dgm:cxn modelId="7" srcId="0" destId="3" srcOrd="2" destOrd="0"/>
-        <dgm:cxn modelId="8" srcId="0" destId="4" srcOrd="3" destOrd="0"/>
-      </dgm:cxnLst>
-      <dgm:bg/>
-      <dgm:whole/>
-    </dgm:dataModel>
-  </dgm:clrData>
-  <dgm:layoutNode name="linearFlow">
-    <dgm:varLst>
-      <dgm:dir/>
-      <dgm:resizeHandles val="exact"/>
-    </dgm:varLst>
-    <dgm:alg type="lin">
-      <dgm:param type="linDir" val="fromT"/>
-      <dgm:param type="vertAlign" val="mid"/>
-      <dgm:param type="horzAlign" val="ctr"/>
-    </dgm:alg>
-    <dgm:shape xmlns:r="http://schemas.openxmlformats.org/officeDocument/2006/relationships" r:blip="">
-      <dgm:adjLst/>
-    </dgm:shape>
-    <dgm:presOf/>
-    <dgm:constrLst>
-      <dgm:constr type="w" for="ch" forName="composite" refType="w"/>
-      <dgm:constr type="h" for="ch" forName="composite" refType="h"/>
-      <dgm:constr type="h" for="ch" forName="spacing" refType="h" refFor="ch" refForName="composite" fact="0.25"/>
-      <dgm:constr type="h" for="ch" forName="spacing" refType="w" op="lte" fact="0.1"/>
-      <dgm:constr type="primFontSz" for="des" ptType="node" op="equ" val="65"/>
-    </dgm:constrLst>
-    <dgm:ruleLst/>
-    <dgm:forEach name="Name0" axis="ch" ptType="node">
-      <dgm:layoutNode name="composite">
-        <dgm:alg type="composite"/>
-        <dgm:shape xmlns:r="http://schemas.openxmlformats.org/officeDocument/2006/relationships" r:blip="">
-          <dgm:adjLst/>
-        </dgm:shape>
-        <dgm:presOf/>
-        <dgm:choose name="Name1">
-          <dgm:if name="Name2" func="var" arg="dir" op="equ" val="norm">
-            <dgm:constrLst>
-              <dgm:constr type="w" for="ch" forName="imgShp" refType="w" fact="0.335"/>
-              <dgm:constr type="h" for="ch" forName="imgShp" refType="w" refFor="ch" refForName="imgShp" op="equ"/>
-              <dgm:constr type="h" for="ch" forName="imgShp" refType="h" op="lte"/>
-              <dgm:constr type="ctrY" for="ch" forName="imgShp" refType="h" fact="0.5"/>
-              <dgm:constr type="l" for="ch" forName="imgShp"/>
-              <dgm:constr type="w" for="ch" forName="txShp" refType="w" op="equ" fact="0.665"/>
-              <dgm:constr type="h" for="ch" forName="txShp" refType="h" refFor="ch" refForName="imgShp" op="equ"/>
-              <dgm:constr type="ctrY" for="ch" forName="txShp" refType="h" fact="0.5"/>
-              <dgm:constr type="l" for="ch" forName="txShp" refType="w" refFor="ch" refForName="imgShp" fact="0.5"/>
-              <dgm:constr type="lMarg" for="ch" forName="txShp" refType="w" refFor="ch" refForName="imgShp" fact="1.25"/>
-            </dgm:constrLst>
-          </dgm:if>
-          <dgm:else name="Name3">
-            <dgm:constrLst>
-              <dgm:constr type="w" for="ch" forName="imgShp" refType="w" fact="0.335"/>
-              <dgm:constr type="h" for="ch" forName="imgShp" refType="w" refFor="ch" refForName="imgShp" op="equ"/>
-              <dgm:constr type="h" for="ch" forName="imgShp" refType="h" op="lte"/>
-              <dgm:constr type="ctrY" for="ch" forName="imgShp" refType="h" fact="0.5"/>
-              <dgm:constr type="r" for="ch" forName="imgShp" refType="w"/>
-              <dgm:constr type="w" for="ch" forName="txShp" refType="w" op="equ" fact="0.665"/>
-              <dgm:constr type="h" for="ch" forName="txShp" refType="h" refFor="ch" refForName="imgShp" op="equ"/>
-              <dgm:constr type="ctrY" for="ch" forName="txShp" refType="h" fact="0.5"/>
-              <dgm:constr type="r" for="ch" forName="txShp" refType="ctrX" refFor="ch" refForName="imgShp"/>
-              <dgm:constr type="rMarg" for="ch" forName="txShp" refType="w" refFor="ch" refForName="imgShp" fact="1.25"/>
-            </dgm:constrLst>
-          </dgm:else>
-        </dgm:choose>
-        <dgm:ruleLst/>
-        <dgm:layoutNode name="imgShp" styleLbl="fgImgPlace1">
-          <dgm:alg type="sp"/>
-          <dgm:shape xmlns:r="http://schemas.openxmlformats.org/officeDocument/2006/relationships" type="ellipse" r:blip="" blipPhldr="1">
-            <dgm:adjLst/>
-          </dgm:shape>
-          <dgm:presOf/>
-          <dgm:constrLst/>
-          <dgm:ruleLst/>
-        </dgm:layoutNode>
-        <dgm:layoutNode name="txShp">
-          <dgm:varLst>
-            <dgm:bulletEnabled val="1"/>
-          </dgm:varLst>
-          <dgm:alg type="tx"/>
-          <dgm:choose name="Name4">
-            <dgm:if name="Name5" func="var" arg="dir" op="equ" val="norm">
-              <dgm:shape xmlns:r="http://schemas.openxmlformats.org/officeDocument/2006/relationships" rot="180" type="homePlate" r:blip="" zOrderOff="-1">
-                <dgm:adjLst/>
-              </dgm:shape>
-            </dgm:if>
-            <dgm:else name="Name6">
-              <dgm:shape xmlns:r="http://schemas.openxmlformats.org/officeDocument/2006/relationships" type="homePlate" r:blip="" zOrderOff="-1">
-                <dgm:adjLst/>
-              </dgm:shape>
-            </dgm:else>
-          </dgm:choose>
-          <dgm:presOf axis="desOrSelf" ptType="node"/>
-          <dgm:constrLst>
-            <dgm:constr type="tMarg" refType="primFontSz" fact="0.3"/>
-            <dgm:constr type="bMarg" refType="primFontSz" fact="0.3"/>
-          </dgm:constrLst>
-          <dgm:ruleLst>
-            <dgm:rule type="primFontSz" val="5" fact="NaN" max="NaN"/>
-          </dgm:ruleLst>
-        </dgm:layoutNode>
-      </dgm:layoutNode>
-      <dgm:forEach name="Name7" axis="followSib" ptType="sibTrans" cnt="1">
-        <dgm:layoutNode name="spacing">
-          <dgm:alg type="sp"/>
-          <dgm:shape xmlns:r="http://schemas.openxmlformats.org/officeDocument/2006/relationships" r:blip="">
-            <dgm:adjLst/>
-          </dgm:shape>
-          <dgm:presOf axis="self"/>
-          <dgm:constrLst/>
-          <dgm:ruleLst/>
-        </dgm:layoutNode>
-      </dgm:forEach>
-    </dgm:forEach>
-  </dgm:layoutNode>
-</dgm:layoutDef>
-</file>
-
-<file path=ppt/diagrams/layout5.xml><?xml version="1.0" encoding="utf-8"?>
 <dgm:layoutDef xmlns:dgm="http://schemas.openxmlformats.org/drawingml/2006/diagram" xmlns:a="http://schemas.openxmlformats.org/drawingml/2006/main" uniqueId="urn:microsoft.com/office/officeart/2005/8/layout/default">
   <dgm:title val=""/>
   <dgm:desc val=""/>
@@ -14370,7 +12183,7 @@
 </dgm:layoutDef>
 </file>
 
-<file path=ppt/diagrams/layout6.xml><?xml version="1.0" encoding="utf-8"?>
+<file path=ppt/diagrams/layout5.xml><?xml version="1.0" encoding="utf-8"?>
 <dgm:layoutDef xmlns:dgm="http://schemas.openxmlformats.org/drawingml/2006/diagram" xmlns:a="http://schemas.openxmlformats.org/drawingml/2006/main" uniqueId="urn:microsoft.com/office/officeart/2005/8/layout/hProcess9">
   <dgm:title val=""/>
   <dgm:desc val=""/>
@@ -19824,1066 +17637,6 @@
 </dgm:styleDef>
 </file>
 
-<file path=ppt/diagrams/quickStyle6.xml><?xml version="1.0" encoding="utf-8"?>
-<dgm:styleDef xmlns:dgm="http://schemas.openxmlformats.org/drawingml/2006/diagram" xmlns:a="http://schemas.openxmlformats.org/drawingml/2006/main" uniqueId="urn:microsoft.com/office/officeart/2005/8/quickstyle/simple3">
-  <dgm:title val=""/>
-  <dgm:desc val=""/>
-  <dgm:catLst>
-    <dgm:cat type="simple" pri="10300"/>
-  </dgm:catLst>
-  <dgm:scene3d>
-    <a:camera prst="orthographicFront"/>
-    <a:lightRig rig="threePt" dir="t"/>
-  </dgm:scene3d>
-  <dgm:styleLbl name="node0">
-    <dgm:scene3d>
-      <a:camera prst="orthographicFront"/>
-      <a:lightRig rig="flat" dir="t"/>
-    </dgm:scene3d>
-    <dgm:sp3d prstMaterial="dkEdge">
-      <a:bevelT w="8200" h="38100"/>
-    </dgm:sp3d>
-    <dgm:txPr/>
-    <dgm:style>
-      <a:lnRef idx="0">
-        <a:scrgbClr r="0" g="0" b="0"/>
-      </a:lnRef>
-      <a:fillRef idx="2">
-        <a:scrgbClr r="0" g="0" b="0"/>
-      </a:fillRef>
-      <a:effectRef idx="1">
-        <a:scrgbClr r="0" g="0" b="0"/>
-      </a:effectRef>
-      <a:fontRef idx="minor">
-        <a:schemeClr val="dk1"/>
-      </a:fontRef>
-    </dgm:style>
-  </dgm:styleLbl>
-  <dgm:styleLbl name="lnNode1">
-    <dgm:scene3d>
-      <a:camera prst="orthographicFront"/>
-      <a:lightRig rig="flat" dir="t"/>
-    </dgm:scene3d>
-    <dgm:sp3d prstMaterial="dkEdge">
-      <a:bevelT w="8200" h="38100"/>
-    </dgm:sp3d>
-    <dgm:txPr/>
-    <dgm:style>
-      <a:lnRef idx="1">
-        <a:scrgbClr r="0" g="0" b="0"/>
-      </a:lnRef>
-      <a:fillRef idx="2">
-        <a:scrgbClr r="0" g="0" b="0"/>
-      </a:fillRef>
-      <a:effectRef idx="0">
-        <a:scrgbClr r="0" g="0" b="0"/>
-      </a:effectRef>
-      <a:fontRef idx="minor">
-        <a:schemeClr val="dk1"/>
-      </a:fontRef>
-    </dgm:style>
-  </dgm:styleLbl>
-  <dgm:styleLbl name="vennNode1">
-    <dgm:scene3d>
-      <a:camera prst="orthographicFront"/>
-      <a:lightRig rig="flat" dir="t"/>
-    </dgm:scene3d>
-    <dgm:sp3d prstMaterial="dkEdge">
-      <a:bevelT w="8200" h="38100"/>
-    </dgm:sp3d>
-    <dgm:txPr/>
-    <dgm:style>
-      <a:lnRef idx="0">
-        <a:scrgbClr r="0" g="0" b="0"/>
-      </a:lnRef>
-      <a:fillRef idx="2">
-        <a:scrgbClr r="0" g="0" b="0"/>
-      </a:fillRef>
-      <a:effectRef idx="0">
-        <a:scrgbClr r="0" g="0" b="0"/>
-      </a:effectRef>
-      <a:fontRef idx="minor">
-        <a:schemeClr val="tx1"/>
-      </a:fontRef>
-    </dgm:style>
-  </dgm:styleLbl>
-  <dgm:styleLbl name="alignNode1">
-    <dgm:scene3d>
-      <a:camera prst="orthographicFront"/>
-      <a:lightRig rig="threePt" dir="t"/>
-    </dgm:scene3d>
-    <dgm:sp3d/>
-    <dgm:txPr/>
-    <dgm:style>
-      <a:lnRef idx="1">
-        <a:scrgbClr r="0" g="0" b="0"/>
-      </a:lnRef>
-      <a:fillRef idx="2">
-        <a:scrgbClr r="0" g="0" b="0"/>
-      </a:fillRef>
-      <a:effectRef idx="1">
-        <a:scrgbClr r="0" g="0" b="0"/>
-      </a:effectRef>
-      <a:fontRef idx="minor">
-        <a:schemeClr val="dk1"/>
-      </a:fontRef>
-    </dgm:style>
-  </dgm:styleLbl>
-  <dgm:styleLbl name="node1">
-    <dgm:scene3d>
-      <a:camera prst="orthographicFront"/>
-      <a:lightRig rig="flat" dir="t"/>
-    </dgm:scene3d>
-    <dgm:sp3d prstMaterial="dkEdge">
-      <a:bevelT w="8200" h="38100"/>
-    </dgm:sp3d>
-    <dgm:txPr/>
-    <dgm:style>
-      <a:lnRef idx="0">
-        <a:scrgbClr r="0" g="0" b="0"/>
-      </a:lnRef>
-      <a:fillRef idx="2">
-        <a:scrgbClr r="0" g="0" b="0"/>
-      </a:fillRef>
-      <a:effectRef idx="1">
-        <a:scrgbClr r="0" g="0" b="0"/>
-      </a:effectRef>
-      <a:fontRef idx="minor">
-        <a:schemeClr val="dk1"/>
-      </a:fontRef>
-    </dgm:style>
-  </dgm:styleLbl>
-  <dgm:styleLbl name="node2">
-    <dgm:scene3d>
-      <a:camera prst="orthographicFront"/>
-      <a:lightRig rig="flat" dir="t"/>
-    </dgm:scene3d>
-    <dgm:sp3d prstMaterial="dkEdge">
-      <a:bevelT w="8200" h="38100"/>
-    </dgm:sp3d>
-    <dgm:txPr/>
-    <dgm:style>
-      <a:lnRef idx="0">
-        <a:scrgbClr r="0" g="0" b="0"/>
-      </a:lnRef>
-      <a:fillRef idx="2">
-        <a:scrgbClr r="0" g="0" b="0"/>
-      </a:fillRef>
-      <a:effectRef idx="1">
-        <a:scrgbClr r="0" g="0" b="0"/>
-      </a:effectRef>
-      <a:fontRef idx="minor">
-        <a:schemeClr val="dk1"/>
-      </a:fontRef>
-    </dgm:style>
-  </dgm:styleLbl>
-  <dgm:styleLbl name="node3">
-    <dgm:scene3d>
-      <a:camera prst="orthographicFront"/>
-      <a:lightRig rig="flat" dir="t"/>
-    </dgm:scene3d>
-    <dgm:sp3d prstMaterial="dkEdge">
-      <a:bevelT w="8200" h="38100"/>
-    </dgm:sp3d>
-    <dgm:txPr/>
-    <dgm:style>
-      <a:lnRef idx="0">
-        <a:scrgbClr r="0" g="0" b="0"/>
-      </a:lnRef>
-      <a:fillRef idx="2">
-        <a:scrgbClr r="0" g="0" b="0"/>
-      </a:fillRef>
-      <a:effectRef idx="1">
-        <a:scrgbClr r="0" g="0" b="0"/>
-      </a:effectRef>
-      <a:fontRef idx="minor">
-        <a:schemeClr val="dk1"/>
-      </a:fontRef>
-    </dgm:style>
-  </dgm:styleLbl>
-  <dgm:styleLbl name="node4">
-    <dgm:scene3d>
-      <a:camera prst="orthographicFront"/>
-      <a:lightRig rig="flat" dir="t"/>
-    </dgm:scene3d>
-    <dgm:sp3d prstMaterial="dkEdge">
-      <a:bevelT w="8200" h="38100"/>
-    </dgm:sp3d>
-    <dgm:txPr/>
-    <dgm:style>
-      <a:lnRef idx="0">
-        <a:scrgbClr r="0" g="0" b="0"/>
-      </a:lnRef>
-      <a:fillRef idx="2">
-        <a:scrgbClr r="0" g="0" b="0"/>
-      </a:fillRef>
-      <a:effectRef idx="1">
-        <a:scrgbClr r="0" g="0" b="0"/>
-      </a:effectRef>
-      <a:fontRef idx="minor">
-        <a:schemeClr val="dk1"/>
-      </a:fontRef>
-    </dgm:style>
-  </dgm:styleLbl>
-  <dgm:styleLbl name="fgImgPlace1">
-    <dgm:scene3d>
-      <a:camera prst="orthographicFront"/>
-      <a:lightRig rig="threePt" dir="t"/>
-    </dgm:scene3d>
-    <dgm:sp3d/>
-    <dgm:txPr/>
-    <dgm:style>
-      <a:lnRef idx="1">
-        <a:scrgbClr r="0" g="0" b="0"/>
-      </a:lnRef>
-      <a:fillRef idx="1">
-        <a:scrgbClr r="0" g="0" b="0"/>
-      </a:fillRef>
-      <a:effectRef idx="1">
-        <a:scrgbClr r="0" g="0" b="0"/>
-      </a:effectRef>
-      <a:fontRef idx="minor"/>
-    </dgm:style>
-  </dgm:styleLbl>
-  <dgm:styleLbl name="alignImgPlace1">
-    <dgm:scene3d>
-      <a:camera prst="orthographicFront"/>
-      <a:lightRig rig="threePt" dir="t"/>
-    </dgm:scene3d>
-    <dgm:sp3d/>
-    <dgm:txPr/>
-    <dgm:style>
-      <a:lnRef idx="1">
-        <a:scrgbClr r="0" g="0" b="0"/>
-      </a:lnRef>
-      <a:fillRef idx="1">
-        <a:scrgbClr r="0" g="0" b="0"/>
-      </a:fillRef>
-      <a:effectRef idx="1">
-        <a:scrgbClr r="0" g="0" b="0"/>
-      </a:effectRef>
-      <a:fontRef idx="minor"/>
-    </dgm:style>
-  </dgm:styleLbl>
-  <dgm:styleLbl name="bgImgPlace1">
-    <dgm:scene3d>
-      <a:camera prst="orthographicFront"/>
-      <a:lightRig rig="threePt" dir="t"/>
-    </dgm:scene3d>
-    <dgm:sp3d/>
-    <dgm:txPr/>
-    <dgm:style>
-      <a:lnRef idx="1">
-        <a:scrgbClr r="0" g="0" b="0"/>
-      </a:lnRef>
-      <a:fillRef idx="1">
-        <a:scrgbClr r="0" g="0" b="0"/>
-      </a:fillRef>
-      <a:effectRef idx="1">
-        <a:scrgbClr r="0" g="0" b="0"/>
-      </a:effectRef>
-      <a:fontRef idx="minor"/>
-    </dgm:style>
-  </dgm:styleLbl>
-  <dgm:styleLbl name="sibTrans2D1">
-    <dgm:scene3d>
-      <a:camera prst="orthographicFront"/>
-      <a:lightRig rig="threePt" dir="t"/>
-    </dgm:scene3d>
-    <dgm:sp3d/>
-    <dgm:txPr/>
-    <dgm:style>
-      <a:lnRef idx="0">
-        <a:scrgbClr r="0" g="0" b="0"/>
-      </a:lnRef>
-      <a:fillRef idx="2">
-        <a:scrgbClr r="0" g="0" b="0"/>
-      </a:fillRef>
-      <a:effectRef idx="1">
-        <a:scrgbClr r="0" g="0" b="0"/>
-      </a:effectRef>
-      <a:fontRef idx="minor">
-        <a:schemeClr val="dk1"/>
-      </a:fontRef>
-    </dgm:style>
-  </dgm:styleLbl>
-  <dgm:styleLbl name="fgSibTrans2D1">
-    <dgm:scene3d>
-      <a:camera prst="orthographicFront"/>
-      <a:lightRig rig="threePt" dir="t"/>
-    </dgm:scene3d>
-    <dgm:sp3d/>
-    <dgm:txPr/>
-    <dgm:style>
-      <a:lnRef idx="0">
-        <a:scrgbClr r="0" g="0" b="0"/>
-      </a:lnRef>
-      <a:fillRef idx="2">
-        <a:scrgbClr r="0" g="0" b="0"/>
-      </a:fillRef>
-      <a:effectRef idx="1">
-        <a:scrgbClr r="0" g="0" b="0"/>
-      </a:effectRef>
-      <a:fontRef idx="minor">
-        <a:schemeClr val="dk1"/>
-      </a:fontRef>
-    </dgm:style>
-  </dgm:styleLbl>
-  <dgm:styleLbl name="bgSibTrans2D1">
-    <dgm:scene3d>
-      <a:camera prst="orthographicFront"/>
-      <a:lightRig rig="threePt" dir="t"/>
-    </dgm:scene3d>
-    <dgm:sp3d/>
-    <dgm:txPr/>
-    <dgm:style>
-      <a:lnRef idx="0">
-        <a:scrgbClr r="0" g="0" b="0"/>
-      </a:lnRef>
-      <a:fillRef idx="2">
-        <a:scrgbClr r="0" g="0" b="0"/>
-      </a:fillRef>
-      <a:effectRef idx="1">
-        <a:scrgbClr r="0" g="0" b="0"/>
-      </a:effectRef>
-      <a:fontRef idx="minor">
-        <a:schemeClr val="dk1"/>
-      </a:fontRef>
-    </dgm:style>
-  </dgm:styleLbl>
-  <dgm:styleLbl name="sibTrans1D1">
-    <dgm:scene3d>
-      <a:camera prst="orthographicFront"/>
-      <a:lightRig rig="threePt" dir="t"/>
-    </dgm:scene3d>
-    <dgm:sp3d/>
-    <dgm:txPr/>
-    <dgm:style>
-      <a:lnRef idx="1">
-        <a:scrgbClr r="0" g="0" b="0"/>
-      </a:lnRef>
-      <a:fillRef idx="0">
-        <a:scrgbClr r="0" g="0" b="0"/>
-      </a:fillRef>
-      <a:effectRef idx="0">
-        <a:scrgbClr r="0" g="0" b="0"/>
-      </a:effectRef>
-      <a:fontRef idx="minor"/>
-    </dgm:style>
-  </dgm:styleLbl>
-  <dgm:styleLbl name="callout">
-    <dgm:scene3d>
-      <a:camera prst="orthographicFront"/>
-      <a:lightRig rig="threePt" dir="t"/>
-    </dgm:scene3d>
-    <dgm:sp3d/>
-    <dgm:txPr/>
-    <dgm:style>
-      <a:lnRef idx="1">
-        <a:scrgbClr r="0" g="0" b="0"/>
-      </a:lnRef>
-      <a:fillRef idx="2">
-        <a:scrgbClr r="0" g="0" b="0"/>
-      </a:fillRef>
-      <a:effectRef idx="1">
-        <a:scrgbClr r="0" g="0" b="0"/>
-      </a:effectRef>
-      <a:fontRef idx="minor"/>
-    </dgm:style>
-  </dgm:styleLbl>
-  <dgm:styleLbl name="asst0">
-    <dgm:scene3d>
-      <a:camera prst="orthographicFront"/>
-      <a:lightRig rig="flat" dir="t"/>
-    </dgm:scene3d>
-    <dgm:sp3d prstMaterial="dkEdge">
-      <a:bevelT w="8200" h="38100"/>
-    </dgm:sp3d>
-    <dgm:txPr/>
-    <dgm:style>
-      <a:lnRef idx="0">
-        <a:scrgbClr r="0" g="0" b="0"/>
-      </a:lnRef>
-      <a:fillRef idx="2">
-        <a:scrgbClr r="0" g="0" b="0"/>
-      </a:fillRef>
-      <a:effectRef idx="1">
-        <a:scrgbClr r="0" g="0" b="0"/>
-      </a:effectRef>
-      <a:fontRef idx="minor">
-        <a:schemeClr val="dk1"/>
-      </a:fontRef>
-    </dgm:style>
-  </dgm:styleLbl>
-  <dgm:styleLbl name="asst1">
-    <dgm:scene3d>
-      <a:camera prst="orthographicFront"/>
-      <a:lightRig rig="flat" dir="t"/>
-    </dgm:scene3d>
-    <dgm:sp3d prstMaterial="dkEdge">
-      <a:bevelT w="8200" h="38100"/>
-    </dgm:sp3d>
-    <dgm:txPr/>
-    <dgm:style>
-      <a:lnRef idx="0">
-        <a:scrgbClr r="0" g="0" b="0"/>
-      </a:lnRef>
-      <a:fillRef idx="2">
-        <a:scrgbClr r="0" g="0" b="0"/>
-      </a:fillRef>
-      <a:effectRef idx="1">
-        <a:scrgbClr r="0" g="0" b="0"/>
-      </a:effectRef>
-      <a:fontRef idx="minor">
-        <a:schemeClr val="dk1"/>
-      </a:fontRef>
-    </dgm:style>
-  </dgm:styleLbl>
-  <dgm:styleLbl name="asst2">
-    <dgm:scene3d>
-      <a:camera prst="orthographicFront"/>
-      <a:lightRig rig="flat" dir="t"/>
-    </dgm:scene3d>
-    <dgm:sp3d prstMaterial="dkEdge">
-      <a:bevelT w="8200" h="38100"/>
-    </dgm:sp3d>
-    <dgm:txPr/>
-    <dgm:style>
-      <a:lnRef idx="0">
-        <a:scrgbClr r="0" g="0" b="0"/>
-      </a:lnRef>
-      <a:fillRef idx="2">
-        <a:scrgbClr r="0" g="0" b="0"/>
-      </a:fillRef>
-      <a:effectRef idx="1">
-        <a:scrgbClr r="0" g="0" b="0"/>
-      </a:effectRef>
-      <a:fontRef idx="minor">
-        <a:schemeClr val="dk1"/>
-      </a:fontRef>
-    </dgm:style>
-  </dgm:styleLbl>
-  <dgm:styleLbl name="asst3">
-    <dgm:scene3d>
-      <a:camera prst="orthographicFront"/>
-      <a:lightRig rig="flat" dir="t"/>
-    </dgm:scene3d>
-    <dgm:sp3d prstMaterial="dkEdge">
-      <a:bevelT w="8200" h="38100"/>
-    </dgm:sp3d>
-    <dgm:txPr/>
-    <dgm:style>
-      <a:lnRef idx="0">
-        <a:scrgbClr r="0" g="0" b="0"/>
-      </a:lnRef>
-      <a:fillRef idx="2">
-        <a:scrgbClr r="0" g="0" b="0"/>
-      </a:fillRef>
-      <a:effectRef idx="1">
-        <a:scrgbClr r="0" g="0" b="0"/>
-      </a:effectRef>
-      <a:fontRef idx="minor">
-        <a:schemeClr val="dk1"/>
-      </a:fontRef>
-    </dgm:style>
-  </dgm:styleLbl>
-  <dgm:styleLbl name="asst4">
-    <dgm:scene3d>
-      <a:camera prst="orthographicFront"/>
-      <a:lightRig rig="flat" dir="t"/>
-    </dgm:scene3d>
-    <dgm:sp3d prstMaterial="dkEdge">
-      <a:bevelT w="8200" h="38100"/>
-    </dgm:sp3d>
-    <dgm:txPr/>
-    <dgm:style>
-      <a:lnRef idx="0">
-        <a:scrgbClr r="0" g="0" b="0"/>
-      </a:lnRef>
-      <a:fillRef idx="2">
-        <a:scrgbClr r="0" g="0" b="0"/>
-      </a:fillRef>
-      <a:effectRef idx="1">
-        <a:scrgbClr r="0" g="0" b="0"/>
-      </a:effectRef>
-      <a:fontRef idx="minor">
-        <a:schemeClr val="dk1"/>
-      </a:fontRef>
-    </dgm:style>
-  </dgm:styleLbl>
-  <dgm:styleLbl name="parChTrans2D1">
-    <dgm:scene3d>
-      <a:camera prst="orthographicFront"/>
-      <a:lightRig rig="threePt" dir="t"/>
-    </dgm:scene3d>
-    <dgm:sp3d/>
-    <dgm:txPr/>
-    <dgm:style>
-      <a:lnRef idx="1">
-        <a:scrgbClr r="0" g="0" b="0"/>
-      </a:lnRef>
-      <a:fillRef idx="2">
-        <a:scrgbClr r="0" g="0" b="0"/>
-      </a:fillRef>
-      <a:effectRef idx="1">
-        <a:scrgbClr r="0" g="0" b="0"/>
-      </a:effectRef>
-      <a:fontRef idx="minor">
-        <a:schemeClr val="dk1"/>
-      </a:fontRef>
-    </dgm:style>
-  </dgm:styleLbl>
-  <dgm:styleLbl name="parChTrans2D2">
-    <dgm:scene3d>
-      <a:camera prst="orthographicFront"/>
-      <a:lightRig rig="threePt" dir="t"/>
-    </dgm:scene3d>
-    <dgm:sp3d/>
-    <dgm:txPr/>
-    <dgm:style>
-      <a:lnRef idx="1">
-        <a:scrgbClr r="0" g="0" b="0"/>
-      </a:lnRef>
-      <a:fillRef idx="2">
-        <a:scrgbClr r="0" g="0" b="0"/>
-      </a:fillRef>
-      <a:effectRef idx="1">
-        <a:scrgbClr r="0" g="0" b="0"/>
-      </a:effectRef>
-      <a:fontRef idx="minor">
-        <a:schemeClr val="dk1"/>
-      </a:fontRef>
-    </dgm:style>
-  </dgm:styleLbl>
-  <dgm:styleLbl name="parChTrans2D3">
-    <dgm:scene3d>
-      <a:camera prst="orthographicFront"/>
-      <a:lightRig rig="threePt" dir="t"/>
-    </dgm:scene3d>
-    <dgm:sp3d/>
-    <dgm:txPr/>
-    <dgm:style>
-      <a:lnRef idx="1">
-        <a:scrgbClr r="0" g="0" b="0"/>
-      </a:lnRef>
-      <a:fillRef idx="2">
-        <a:scrgbClr r="0" g="0" b="0"/>
-      </a:fillRef>
-      <a:effectRef idx="1">
-        <a:scrgbClr r="0" g="0" b="0"/>
-      </a:effectRef>
-      <a:fontRef idx="minor">
-        <a:schemeClr val="dk1"/>
-      </a:fontRef>
-    </dgm:style>
-  </dgm:styleLbl>
-  <dgm:styleLbl name="parChTrans2D4">
-    <dgm:scene3d>
-      <a:camera prst="orthographicFront"/>
-      <a:lightRig rig="threePt" dir="t"/>
-    </dgm:scene3d>
-    <dgm:sp3d/>
-    <dgm:txPr/>
-    <dgm:style>
-      <a:lnRef idx="1">
-        <a:scrgbClr r="0" g="0" b="0"/>
-      </a:lnRef>
-      <a:fillRef idx="2">
-        <a:scrgbClr r="0" g="0" b="0"/>
-      </a:fillRef>
-      <a:effectRef idx="1">
-        <a:scrgbClr r="0" g="0" b="0"/>
-      </a:effectRef>
-      <a:fontRef idx="minor">
-        <a:schemeClr val="dk1"/>
-      </a:fontRef>
-    </dgm:style>
-  </dgm:styleLbl>
-  <dgm:styleLbl name="parChTrans1D1">
-    <dgm:scene3d>
-      <a:camera prst="orthographicFront"/>
-      <a:lightRig rig="threePt" dir="t"/>
-    </dgm:scene3d>
-    <dgm:sp3d/>
-    <dgm:txPr/>
-    <dgm:style>
-      <a:lnRef idx="2">
-        <a:scrgbClr r="0" g="0" b="0"/>
-      </a:lnRef>
-      <a:fillRef idx="0">
-        <a:scrgbClr r="0" g="0" b="0"/>
-      </a:fillRef>
-      <a:effectRef idx="0">
-        <a:scrgbClr r="0" g="0" b="0"/>
-      </a:effectRef>
-      <a:fontRef idx="minor"/>
-    </dgm:style>
-  </dgm:styleLbl>
-  <dgm:styleLbl name="parChTrans1D2">
-    <dgm:scene3d>
-      <a:camera prst="orthographicFront"/>
-      <a:lightRig rig="threePt" dir="t"/>
-    </dgm:scene3d>
-    <dgm:sp3d/>
-    <dgm:txPr/>
-    <dgm:style>
-      <a:lnRef idx="2">
-        <a:scrgbClr r="0" g="0" b="0"/>
-      </a:lnRef>
-      <a:fillRef idx="0">
-        <a:scrgbClr r="0" g="0" b="0"/>
-      </a:fillRef>
-      <a:effectRef idx="0">
-        <a:scrgbClr r="0" g="0" b="0"/>
-      </a:effectRef>
-      <a:fontRef idx="minor"/>
-    </dgm:style>
-  </dgm:styleLbl>
-  <dgm:styleLbl name="parChTrans1D3">
-    <dgm:scene3d>
-      <a:camera prst="orthographicFront"/>
-      <a:lightRig rig="threePt" dir="t"/>
-    </dgm:scene3d>
-    <dgm:sp3d/>
-    <dgm:txPr/>
-    <dgm:style>
-      <a:lnRef idx="2">
-        <a:scrgbClr r="0" g="0" b="0"/>
-      </a:lnRef>
-      <a:fillRef idx="0">
-        <a:scrgbClr r="0" g="0" b="0"/>
-      </a:fillRef>
-      <a:effectRef idx="0">
-        <a:scrgbClr r="0" g="0" b="0"/>
-      </a:effectRef>
-      <a:fontRef idx="minor"/>
-    </dgm:style>
-  </dgm:styleLbl>
-  <dgm:styleLbl name="parChTrans1D4">
-    <dgm:scene3d>
-      <a:camera prst="orthographicFront"/>
-      <a:lightRig rig="threePt" dir="t"/>
-    </dgm:scene3d>
-    <dgm:sp3d/>
-    <dgm:txPr/>
-    <dgm:style>
-      <a:lnRef idx="2">
-        <a:scrgbClr r="0" g="0" b="0"/>
-      </a:lnRef>
-      <a:fillRef idx="0">
-        <a:scrgbClr r="0" g="0" b="0"/>
-      </a:fillRef>
-      <a:effectRef idx="0">
-        <a:scrgbClr r="0" g="0" b="0"/>
-      </a:effectRef>
-      <a:fontRef idx="minor"/>
-    </dgm:style>
-  </dgm:styleLbl>
-  <dgm:styleLbl name="fgAcc1">
-    <dgm:scene3d>
-      <a:camera prst="orthographicFront"/>
-      <a:lightRig rig="threePt" dir="t"/>
-    </dgm:scene3d>
-    <dgm:sp3d/>
-    <dgm:txPr/>
-    <dgm:style>
-      <a:lnRef idx="1">
-        <a:scrgbClr r="0" g="0" b="0"/>
-      </a:lnRef>
-      <a:fillRef idx="1">
-        <a:scrgbClr r="0" g="0" b="0"/>
-      </a:fillRef>
-      <a:effectRef idx="0">
-        <a:scrgbClr r="0" g="0" b="0"/>
-      </a:effectRef>
-      <a:fontRef idx="minor"/>
-    </dgm:style>
-  </dgm:styleLbl>
-  <dgm:styleLbl name="conFgAcc1">
-    <dgm:scene3d>
-      <a:camera prst="orthographicFront"/>
-      <a:lightRig rig="threePt" dir="t"/>
-    </dgm:scene3d>
-    <dgm:sp3d/>
-    <dgm:txPr/>
-    <dgm:style>
-      <a:lnRef idx="1">
-        <a:scrgbClr r="0" g="0" b="0"/>
-      </a:lnRef>
-      <a:fillRef idx="1">
-        <a:scrgbClr r="0" g="0" b="0"/>
-      </a:fillRef>
-      <a:effectRef idx="0">
-        <a:scrgbClr r="0" g="0" b="0"/>
-      </a:effectRef>
-      <a:fontRef idx="minor"/>
-    </dgm:style>
-  </dgm:styleLbl>
-  <dgm:styleLbl name="alignAcc1">
-    <dgm:scene3d>
-      <a:camera prst="orthographicFront"/>
-      <a:lightRig rig="threePt" dir="t"/>
-    </dgm:scene3d>
-    <dgm:sp3d/>
-    <dgm:txPr/>
-    <dgm:style>
-      <a:lnRef idx="1">
-        <a:scrgbClr r="0" g="0" b="0"/>
-      </a:lnRef>
-      <a:fillRef idx="1">
-        <a:scrgbClr r="0" g="0" b="0"/>
-      </a:fillRef>
-      <a:effectRef idx="0">
-        <a:scrgbClr r="0" g="0" b="0"/>
-      </a:effectRef>
-      <a:fontRef idx="minor"/>
-    </dgm:style>
-  </dgm:styleLbl>
-  <dgm:styleLbl name="trAlignAcc1">
-    <dgm:scene3d>
-      <a:camera prst="orthographicFront"/>
-      <a:lightRig rig="threePt" dir="t"/>
-    </dgm:scene3d>
-    <dgm:sp3d/>
-    <dgm:txPr/>
-    <dgm:style>
-      <a:lnRef idx="1">
-        <a:scrgbClr r="0" g="0" b="0"/>
-      </a:lnRef>
-      <a:fillRef idx="1">
-        <a:scrgbClr r="0" g="0" b="0"/>
-      </a:fillRef>
-      <a:effectRef idx="0">
-        <a:scrgbClr r="0" g="0" b="0"/>
-      </a:effectRef>
-      <a:fontRef idx="minor"/>
-    </dgm:style>
-  </dgm:styleLbl>
-  <dgm:styleLbl name="bgAcc1">
-    <dgm:scene3d>
-      <a:camera prst="orthographicFront"/>
-      <a:lightRig rig="threePt" dir="t"/>
-    </dgm:scene3d>
-    <dgm:sp3d/>
-    <dgm:txPr/>
-    <dgm:style>
-      <a:lnRef idx="1">
-        <a:scrgbClr r="0" g="0" b="0"/>
-      </a:lnRef>
-      <a:fillRef idx="1">
-        <a:scrgbClr r="0" g="0" b="0"/>
-      </a:fillRef>
-      <a:effectRef idx="0">
-        <a:scrgbClr r="0" g="0" b="0"/>
-      </a:effectRef>
-      <a:fontRef idx="minor"/>
-    </dgm:style>
-  </dgm:styleLbl>
-  <dgm:styleLbl name="solidFgAcc1">
-    <dgm:scene3d>
-      <a:camera prst="orthographicFront"/>
-      <a:lightRig rig="threePt" dir="t"/>
-    </dgm:scene3d>
-    <dgm:sp3d/>
-    <dgm:txPr/>
-    <dgm:style>
-      <a:lnRef idx="1">
-        <a:scrgbClr r="0" g="0" b="0"/>
-      </a:lnRef>
-      <a:fillRef idx="2">
-        <a:scrgbClr r="0" g="0" b="0"/>
-      </a:fillRef>
-      <a:effectRef idx="0">
-        <a:scrgbClr r="0" g="0" b="0"/>
-      </a:effectRef>
-      <a:fontRef idx="minor"/>
-    </dgm:style>
-  </dgm:styleLbl>
-  <dgm:styleLbl name="solidAlignAcc1">
-    <dgm:scene3d>
-      <a:camera prst="orthographicFront"/>
-      <a:lightRig rig="threePt" dir="t"/>
-    </dgm:scene3d>
-    <dgm:sp3d/>
-    <dgm:txPr/>
-    <dgm:style>
-      <a:lnRef idx="1">
-        <a:scrgbClr r="0" g="0" b="0"/>
-      </a:lnRef>
-      <a:fillRef idx="1">
-        <a:scrgbClr r="0" g="0" b="0"/>
-      </a:fillRef>
-      <a:effectRef idx="0">
-        <a:scrgbClr r="0" g="0" b="0"/>
-      </a:effectRef>
-      <a:fontRef idx="minor"/>
-    </dgm:style>
-  </dgm:styleLbl>
-  <dgm:styleLbl name="solidBgAcc1">
-    <dgm:scene3d>
-      <a:camera prst="orthographicFront"/>
-      <a:lightRig rig="threePt" dir="t"/>
-    </dgm:scene3d>
-    <dgm:sp3d/>
-    <dgm:txPr/>
-    <dgm:style>
-      <a:lnRef idx="1">
-        <a:scrgbClr r="0" g="0" b="0"/>
-      </a:lnRef>
-      <a:fillRef idx="1">
-        <a:scrgbClr r="0" g="0" b="0"/>
-      </a:fillRef>
-      <a:effectRef idx="0">
-        <a:scrgbClr r="0" g="0" b="0"/>
-      </a:effectRef>
-      <a:fontRef idx="minor"/>
-    </dgm:style>
-  </dgm:styleLbl>
-  <dgm:styleLbl name="fgAccFollowNode1">
-    <dgm:scene3d>
-      <a:camera prst="orthographicFront"/>
-      <a:lightRig rig="threePt" dir="t"/>
-    </dgm:scene3d>
-    <dgm:sp3d/>
-    <dgm:txPr/>
-    <dgm:style>
-      <a:lnRef idx="1">
-        <a:scrgbClr r="0" g="0" b="0"/>
-      </a:lnRef>
-      <a:fillRef idx="1">
-        <a:scrgbClr r="0" g="0" b="0"/>
-      </a:fillRef>
-      <a:effectRef idx="0">
-        <a:scrgbClr r="0" g="0" b="0"/>
-      </a:effectRef>
-      <a:fontRef idx="minor"/>
-    </dgm:style>
-  </dgm:styleLbl>
-  <dgm:styleLbl name="alignAccFollowNode1">
-    <dgm:scene3d>
-      <a:camera prst="orthographicFront"/>
-      <a:lightRig rig="threePt" dir="t"/>
-    </dgm:scene3d>
-    <dgm:sp3d/>
-    <dgm:txPr/>
-    <dgm:style>
-      <a:lnRef idx="1">
-        <a:scrgbClr r="0" g="0" b="0"/>
-      </a:lnRef>
-      <a:fillRef idx="1">
-        <a:scrgbClr r="0" g="0" b="0"/>
-      </a:fillRef>
-      <a:effectRef idx="0">
-        <a:scrgbClr r="0" g="0" b="0"/>
-      </a:effectRef>
-      <a:fontRef idx="minor"/>
-    </dgm:style>
-  </dgm:styleLbl>
-  <dgm:styleLbl name="bgAccFollowNode1">
-    <dgm:scene3d>
-      <a:camera prst="orthographicFront"/>
-      <a:lightRig rig="threePt" dir="t"/>
-    </dgm:scene3d>
-    <dgm:sp3d/>
-    <dgm:txPr/>
-    <dgm:style>
-      <a:lnRef idx="1">
-        <a:scrgbClr r="0" g="0" b="0"/>
-      </a:lnRef>
-      <a:fillRef idx="1">
-        <a:scrgbClr r="0" g="0" b="0"/>
-      </a:fillRef>
-      <a:effectRef idx="0">
-        <a:scrgbClr r="0" g="0" b="0"/>
-      </a:effectRef>
-      <a:fontRef idx="minor"/>
-    </dgm:style>
-  </dgm:styleLbl>
-  <dgm:styleLbl name="fgAcc0">
-    <dgm:scene3d>
-      <a:camera prst="orthographicFront"/>
-      <a:lightRig rig="threePt" dir="t"/>
-    </dgm:scene3d>
-    <dgm:sp3d/>
-    <dgm:txPr/>
-    <dgm:style>
-      <a:lnRef idx="1">
-        <a:scrgbClr r="0" g="0" b="0"/>
-      </a:lnRef>
-      <a:fillRef idx="1">
-        <a:scrgbClr r="0" g="0" b="0"/>
-      </a:fillRef>
-      <a:effectRef idx="0">
-        <a:scrgbClr r="0" g="0" b="0"/>
-      </a:effectRef>
-      <a:fontRef idx="minor"/>
-    </dgm:style>
-  </dgm:styleLbl>
-  <dgm:styleLbl name="fgAcc2">
-    <dgm:scene3d>
-      <a:camera prst="orthographicFront"/>
-      <a:lightRig rig="threePt" dir="t"/>
-    </dgm:scene3d>
-    <dgm:sp3d/>
-    <dgm:txPr/>
-    <dgm:style>
-      <a:lnRef idx="1">
-        <a:scrgbClr r="0" g="0" b="0"/>
-      </a:lnRef>
-      <a:fillRef idx="1">
-        <a:scrgbClr r="0" g="0" b="0"/>
-      </a:fillRef>
-      <a:effectRef idx="0">
-        <a:scrgbClr r="0" g="0" b="0"/>
-      </a:effectRef>
-      <a:fontRef idx="minor"/>
-    </dgm:style>
-  </dgm:styleLbl>
-  <dgm:styleLbl name="fgAcc3">
-    <dgm:scene3d>
-      <a:camera prst="orthographicFront"/>
-      <a:lightRig rig="threePt" dir="t"/>
-    </dgm:scene3d>
-    <dgm:sp3d/>
-    <dgm:txPr/>
-    <dgm:style>
-      <a:lnRef idx="1">
-        <a:scrgbClr r="0" g="0" b="0"/>
-      </a:lnRef>
-      <a:fillRef idx="1">
-        <a:scrgbClr r="0" g="0" b="0"/>
-      </a:fillRef>
-      <a:effectRef idx="0">
-        <a:scrgbClr r="0" g="0" b="0"/>
-      </a:effectRef>
-      <a:fontRef idx="minor"/>
-    </dgm:style>
-  </dgm:styleLbl>
-  <dgm:styleLbl name="fgAcc4">
-    <dgm:scene3d>
-      <a:camera prst="orthographicFront"/>
-      <a:lightRig rig="threePt" dir="t"/>
-    </dgm:scene3d>
-    <dgm:sp3d/>
-    <dgm:txPr/>
-    <dgm:style>
-      <a:lnRef idx="1">
-        <a:scrgbClr r="0" g="0" b="0"/>
-      </a:lnRef>
-      <a:fillRef idx="1">
-        <a:scrgbClr r="0" g="0" b="0"/>
-      </a:fillRef>
-      <a:effectRef idx="0">
-        <a:scrgbClr r="0" g="0" b="0"/>
-      </a:effectRef>
-      <a:fontRef idx="minor"/>
-    </dgm:style>
-  </dgm:styleLbl>
-  <dgm:styleLbl name="bgShp">
-    <dgm:scene3d>
-      <a:camera prst="orthographicFront"/>
-      <a:lightRig rig="threePt" dir="t"/>
-    </dgm:scene3d>
-    <dgm:sp3d/>
-    <dgm:txPr/>
-    <dgm:style>
-      <a:lnRef idx="0">
-        <a:scrgbClr r="0" g="0" b="0"/>
-      </a:lnRef>
-      <a:fillRef idx="1">
-        <a:scrgbClr r="0" g="0" b="0"/>
-      </a:fillRef>
-      <a:effectRef idx="1">
-        <a:scrgbClr r="0" g="0" b="0"/>
-      </a:effectRef>
-      <a:fontRef idx="minor"/>
-    </dgm:style>
-  </dgm:styleLbl>
-  <dgm:styleLbl name="dkBgShp">
-    <dgm:scene3d>
-      <a:camera prst="orthographicFront"/>
-      <a:lightRig rig="threePt" dir="t"/>
-    </dgm:scene3d>
-    <dgm:sp3d/>
-    <dgm:txPr/>
-    <dgm:style>
-      <a:lnRef idx="0">
-        <a:scrgbClr r="0" g="0" b="0"/>
-      </a:lnRef>
-      <a:fillRef idx="1">
-        <a:scrgbClr r="0" g="0" b="0"/>
-      </a:fillRef>
-      <a:effectRef idx="1">
-        <a:scrgbClr r="0" g="0" b="0"/>
-      </a:effectRef>
-      <a:fontRef idx="minor"/>
-    </dgm:style>
-  </dgm:styleLbl>
-  <dgm:styleLbl name="trBgShp">
-    <dgm:scene3d>
-      <a:camera prst="orthographicFront"/>
-      <a:lightRig rig="threePt" dir="t"/>
-    </dgm:scene3d>
-    <dgm:sp3d/>
-    <dgm:txPr/>
-    <dgm:style>
-      <a:lnRef idx="0">
-        <a:scrgbClr r="0" g="0" b="0"/>
-      </a:lnRef>
-      <a:fillRef idx="1">
-        <a:scrgbClr r="0" g="0" b="0"/>
-      </a:fillRef>
-      <a:effectRef idx="0">
-        <a:scrgbClr r="0" g="0" b="0"/>
-      </a:effectRef>
-      <a:fontRef idx="minor"/>
-    </dgm:style>
-  </dgm:styleLbl>
-  <dgm:styleLbl name="fgShp">
-    <dgm:scene3d>
-      <a:camera prst="orthographicFront"/>
-      <a:lightRig rig="flat" dir="t"/>
-    </dgm:scene3d>
-    <dgm:sp3d prstMaterial="dkEdge">
-      <a:bevelT w="8200" h="38100"/>
-    </dgm:sp3d>
-    <dgm:txPr/>
-    <dgm:style>
-      <a:lnRef idx="1">
-        <a:scrgbClr r="0" g="0" b="0"/>
-      </a:lnRef>
-      <a:fillRef idx="2">
-        <a:scrgbClr r="0" g="0" b="0"/>
-      </a:fillRef>
-      <a:effectRef idx="1">
-        <a:scrgbClr r="0" g="0" b="0"/>
-      </a:effectRef>
-      <a:fontRef idx="minor"/>
-    </dgm:style>
-  </dgm:styleLbl>
-  <dgm:styleLbl name="revTx">
-    <dgm:scene3d>
-      <a:camera prst="orthographicFront"/>
-      <a:lightRig rig="threePt" dir="t"/>
-    </dgm:scene3d>
-    <dgm:sp3d/>
-    <dgm:txPr/>
-    <dgm:style>
-      <a:lnRef idx="0">
-        <a:scrgbClr r="0" g="0" b="0"/>
-      </a:lnRef>
-      <a:fillRef idx="0">
-        <a:scrgbClr r="0" g="0" b="0"/>
-      </a:fillRef>
-      <a:effectRef idx="0">
-        <a:scrgbClr r="0" g="0" b="0"/>
-      </a:effectRef>
-      <a:fontRef idx="minor"/>
-    </dgm:style>
-  </dgm:styleLbl>
-</dgm:styleDef>
-</file>
-
 <file path=ppt/notesMasters/notesMaster1.xml><?xml version="1.0" encoding="utf-8"?>
 <p:notesMaster xmlns:a="http://schemas.openxmlformats.org/drawingml/2006/main" xmlns:r="http://schemas.openxmlformats.org/officeDocument/2006/relationships" xmlns:p="http://schemas.openxmlformats.org/presentationml/2006/main">
   <p:cSld>
@@ -20967,7 +17720,7 @@
             <a:fld id="{6DCC9987-AE10-4685-9B5B-4577F1D5BB4C}" type="datetimeFigureOut">
               <a:rPr lang="en-US" smtClean="0"/>
               <a:pPr/>
-              <a:t>4/26/2023</a:t>
+              <a:t>4/27/2023</a:t>
             </a:fld>
             <a:endParaRPr lang="en-US"/>
           </a:p>
@@ -21471,6 +18224,11 @@
         </p:txBody>
       </p:sp>
     </p:spTree>
+    <p:extLst>
+      <p:ext uri="{BB962C8B-B14F-4D97-AF65-F5344CB8AC3E}">
+        <p14:creationId xmlns:p14="http://schemas.microsoft.com/office/powerpoint/2010/main" val="3026240974"/>
+      </p:ext>
+    </p:extLst>
   </p:cSld>
   <p:clrMapOvr>
     <a:masterClrMapping/>
@@ -21546,7 +18304,7 @@
             <a:fld id="{77D8454A-404F-4DF1-8F43-7DDF83BF3B63}" type="slidenum">
               <a:rPr lang="en-US" smtClean="0"/>
               <a:pPr/>
-              <a:t>8</a:t>
+              <a:t>4</a:t>
             </a:fld>
             <a:endParaRPr lang="en-US"/>
           </a:p>
@@ -21628,7 +18386,7 @@
             <a:fld id="{77D8454A-404F-4DF1-8F43-7DDF83BF3B63}" type="slidenum">
               <a:rPr lang="en-US" smtClean="0"/>
               <a:pPr/>
-              <a:t>9</a:t>
+              <a:t>12</a:t>
             </a:fld>
             <a:endParaRPr lang="en-US"/>
           </a:p>
@@ -21710,7 +18468,7 @@
             <a:fld id="{77D8454A-404F-4DF1-8F43-7DDF83BF3B63}" type="slidenum">
               <a:rPr lang="en-US" smtClean="0"/>
               <a:pPr/>
-              <a:t>10</a:t>
+              <a:t>13</a:t>
             </a:fld>
             <a:endParaRPr lang="en-US"/>
           </a:p>
@@ -21792,7 +18550,89 @@
             <a:fld id="{77D8454A-404F-4DF1-8F43-7DDF83BF3B63}" type="slidenum">
               <a:rPr lang="en-US" smtClean="0"/>
               <a:pPr/>
-              <a:t>11</a:t>
+              <a:t>14</a:t>
+            </a:fld>
+            <a:endParaRPr lang="en-US"/>
+          </a:p>
+        </p:txBody>
+      </p:sp>
+    </p:spTree>
+  </p:cSld>
+  <p:clrMapOvr>
+    <a:masterClrMapping/>
+  </p:clrMapOvr>
+</p:notes>
+</file>
+
+<file path=ppt/notesSlides/notesSlide8.xml><?xml version="1.0" encoding="utf-8"?>
+<p:notes xmlns:a="http://schemas.openxmlformats.org/drawingml/2006/main" xmlns:r="http://schemas.openxmlformats.org/officeDocument/2006/relationships" xmlns:p="http://schemas.openxmlformats.org/presentationml/2006/main">
+  <p:cSld>
+    <p:spTree>
+      <p:nvGrpSpPr>
+        <p:cNvPr id="1" name=""/>
+        <p:cNvGrpSpPr/>
+        <p:nvPr/>
+      </p:nvGrpSpPr>
+      <p:grpSpPr>
+        <a:xfrm>
+          <a:off x="0" y="0"/>
+          <a:ext cx="0" cy="0"/>
+          <a:chOff x="0" y="0"/>
+          <a:chExt cx="0" cy="0"/>
+        </a:xfrm>
+      </p:grpSpPr>
+      <p:sp>
+        <p:nvSpPr>
+          <p:cNvPr id="2" name="Slide Image Placeholder 1"/>
+          <p:cNvSpPr>
+            <a:spLocks noGrp="1" noRot="1" noChangeAspect="1"/>
+          </p:cNvSpPr>
+          <p:nvPr>
+            <p:ph type="sldImg"/>
+          </p:nvPr>
+        </p:nvSpPr>
+        <p:spPr/>
+      </p:sp>
+      <p:sp>
+        <p:nvSpPr>
+          <p:cNvPr id="3" name="Notes Placeholder 2"/>
+          <p:cNvSpPr>
+            <a:spLocks noGrp="1"/>
+          </p:cNvSpPr>
+          <p:nvPr>
+            <p:ph type="body" idx="1"/>
+          </p:nvPr>
+        </p:nvSpPr>
+        <p:spPr/>
+        <p:txBody>
+          <a:bodyPr>
+            <a:normAutofit/>
+          </a:bodyPr>
+          <a:lstStyle/>
+          <a:p>
+            <a:endParaRPr lang="en-US"/>
+          </a:p>
+        </p:txBody>
+      </p:sp>
+      <p:sp>
+        <p:nvSpPr>
+          <p:cNvPr id="4" name="Slide Number Placeholder 3"/>
+          <p:cNvSpPr>
+            <a:spLocks noGrp="1"/>
+          </p:cNvSpPr>
+          <p:nvPr>
+            <p:ph type="sldNum" sz="quarter" idx="10"/>
+          </p:nvPr>
+        </p:nvSpPr>
+        <p:spPr/>
+        <p:txBody>
+          <a:bodyPr/>
+          <a:lstStyle/>
+          <a:p>
+            <a:fld id="{77D8454A-404F-4DF1-8F43-7DDF83BF3B63}" type="slidenum">
+              <a:rPr lang="en-US" smtClean="0"/>
+              <a:pPr/>
+              <a:t>15</a:t>
             </a:fld>
             <a:endParaRPr lang="en-US"/>
           </a:p>
@@ -22027,7 +18867,7 @@
             <a:fld id="{71BF1CCF-7666-4D44-83CF-B1D9081B196F}" type="datetime1">
               <a:rPr lang="en-US" smtClean="0"/>
               <a:pPr/>
-              <a:t>4/26/2023</a:t>
+              <a:t>4/27/2023</a:t>
             </a:fld>
             <a:endParaRPr lang="en-US"/>
           </a:p>
@@ -22197,7 +19037,7 @@
             <a:fld id="{6D6514FD-1763-45C1-AED0-FF855CD2E095}" type="datetime1">
               <a:rPr lang="en-US" smtClean="0"/>
               <a:pPr/>
-              <a:t>4/26/2023</a:t>
+              <a:t>4/27/2023</a:t>
             </a:fld>
             <a:endParaRPr lang="en-US"/>
           </a:p>
@@ -22378,7 +19218,7 @@
             <a:fld id="{9601B317-6CCF-44A4-B99C-75730E0DA706}" type="datetime1">
               <a:rPr lang="en-US" smtClean="0"/>
               <a:pPr/>
-              <a:t>4/26/2023</a:t>
+              <a:t>4/27/2023</a:t>
             </a:fld>
             <a:endParaRPr lang="en-US"/>
           </a:p>
@@ -22554,7 +19394,7 @@
             <a:fld id="{075BA6BE-7F97-411F-9CC5-5AB35133F2B3}" type="datetime1">
               <a:rPr lang="en-US" smtClean="0"/>
               <a:pPr/>
-              <a:t>4/26/2023</a:t>
+              <a:t>4/27/2023</a:t>
             </a:fld>
             <a:endParaRPr lang="en-US"/>
           </a:p>
@@ -22797,7 +19637,7 @@
             <a:fld id="{4C3E4E52-550E-4B84-9D4F-14979F5A0D6E}" type="datetime1">
               <a:rPr lang="en-US" smtClean="0"/>
               <a:pPr/>
-              <a:t>4/26/2023</a:t>
+              <a:t>4/27/2023</a:t>
             </a:fld>
             <a:endParaRPr lang="en-US"/>
           </a:p>
@@ -23268,7 +20108,7 @@
             <a:fld id="{BB81A9FF-1E9C-4B66-B4A0-EADB765782FB}" type="datetime1">
               <a:rPr lang="en-US" smtClean="0"/>
               <a:pPr/>
-              <a:t>4/26/2023</a:t>
+              <a:t>4/27/2023</a:t>
             </a:fld>
             <a:endParaRPr lang="en-US"/>
           </a:p>
@@ -23669,7 +20509,7 @@
             <a:fld id="{7D96A02F-3A95-4944-9ABC-E1DA10A11467}" type="datetime1">
               <a:rPr lang="en-US" smtClean="0"/>
               <a:pPr/>
-              <a:t>4/26/2023</a:t>
+              <a:t>4/27/2023</a:t>
             </a:fld>
             <a:endParaRPr lang="en-US"/>
           </a:p>
@@ -23792,7 +20632,7 @@
             <a:fld id="{EB627A8D-4D3E-4B4C-B199-3FF96543B789}" type="datetime1">
               <a:rPr lang="en-US" smtClean="0"/>
               <a:pPr/>
-              <a:t>4/26/2023</a:t>
+              <a:t>4/27/2023</a:t>
             </a:fld>
             <a:endParaRPr lang="en-US"/>
           </a:p>
@@ -23888,7 +20728,7 @@
             <a:fld id="{6AC67121-7AB3-44A9-B455-30D9FB40A79E}" type="datetime1">
               <a:rPr lang="en-US" smtClean="0"/>
               <a:pPr/>
-              <a:t>4/26/2023</a:t>
+              <a:t>4/27/2023</a:t>
             </a:fld>
             <a:endParaRPr lang="en-US"/>
           </a:p>
@@ -24148,7 +20988,7 @@
             <a:fld id="{69E77799-E3A9-4516-B428-D2DCE16620CD}" type="datetime1">
               <a:rPr lang="en-US" smtClean="0"/>
               <a:pPr/>
-              <a:t>4/26/2023</a:t>
+              <a:t>4/27/2023</a:t>
             </a:fld>
             <a:endParaRPr lang="en-US"/>
           </a:p>
@@ -24374,7 +21214,7 @@
             <a:fld id="{7306688B-20E5-4279-9389-143F269CFCDC}" type="datetime1">
               <a:rPr lang="en-US" smtClean="0"/>
               <a:pPr/>
-              <a:t>4/26/2023</a:t>
+              <a:t>4/27/2023</a:t>
             </a:fld>
             <a:endParaRPr lang="en-US"/>
           </a:p>
@@ -24734,7 +21574,7 @@
             <a:fld id="{0ABAC977-30FA-477C-9A84-AFCB3E072BCA}" type="datetime1">
               <a:rPr lang="en-US" smtClean="0"/>
               <a:pPr/>
-              <a:t>4/26/2023</a:t>
+              <a:t>4/27/2023</a:t>
             </a:fld>
             <a:endParaRPr lang="en-US"/>
           </a:p>
@@ -25158,19 +21998,25 @@
         </p:nvSpPr>
         <p:spPr>
           <a:xfrm>
-            <a:off x="-1620688" y="82699"/>
-            <a:ext cx="8062912" cy="1470025"/>
+            <a:off x="-828600" y="213136"/>
+            <a:ext cx="9289032" cy="1258069"/>
           </a:xfrm>
         </p:spPr>
         <p:txBody>
-          <a:bodyPr/>
+          <a:bodyPr>
+            <a:normAutofit/>
+          </a:bodyPr>
           <a:lstStyle/>
           <a:p>
             <a:r>
-              <a:rPr lang="de-DE" noProof="0" dirty="0" err="1"/>
+              <a:rPr lang="de-DE" sz="4000" noProof="0" dirty="0"/>
+              <a:t>Präsentation: </a:t>
+            </a:r>
+            <a:r>
+              <a:rPr lang="de-DE" sz="4000" noProof="0" dirty="0" err="1"/>
               <a:t>Shopauswertung</a:t>
             </a:r>
-            <a:endParaRPr lang="de-DE" noProof="0" dirty="0"/>
+            <a:endParaRPr lang="de-DE" sz="4000" noProof="0" dirty="0"/>
           </a:p>
         </p:txBody>
       </p:sp>
@@ -25257,7 +22103,7 @@
         <p:spPr>
           <a:xfrm>
             <a:off x="5436096" y="2599872"/>
-            <a:ext cx="2520280" cy="2308324"/>
+            <a:ext cx="2520280" cy="2031325"/>
           </a:xfrm>
           <a:prstGeom prst="rect">
             <a:avLst/>
@@ -25271,6 +22117,10 @@
           <a:lstStyle/>
           <a:p>
             <a:r>
+              <a:rPr lang="de-DE" dirty="0"/>
+              <a:t>Von </a:t>
+            </a:r>
+            <a:r>
               <a:rPr kumimoji="0" lang="de-DE" sz="1800" kern="1200" noProof="0" dirty="0">
                 <a:ln>
                   <a:noFill/>
@@ -25279,7 +22129,19 @@
                 <a:ea typeface="+mn-ea"/>
                 <a:cs typeface="+mn-cs"/>
               </a:rPr>
-              <a:t>	Svetlana</a:t>
+              <a:t>Svetlana,</a:t>
+            </a:r>
+          </a:p>
+          <a:p>
+            <a:r>
+              <a:rPr lang="de-DE" dirty="0"/>
+              <a:t>Anca</a:t>
+            </a:r>
+          </a:p>
+          <a:p>
+            <a:r>
+              <a:rPr lang="de-DE" dirty="0"/>
+              <a:t>Und Hyun</a:t>
             </a:r>
           </a:p>
           <a:p>
@@ -25295,36 +22157,8 @@
           <a:p>
             <a:r>
               <a:rPr lang="de-DE" dirty="0"/>
-              <a:t>Anca</a:t>
+              <a:t>Präsentiert am 27</a:t>
             </a:r>
-          </a:p>
-          <a:p>
-            <a:endParaRPr kumimoji="0" lang="de-DE" sz="1800" kern="1200" noProof="0" dirty="0">
-              <a:ln>
-                <a:noFill/>
-              </a:ln>
-              <a:latin typeface="+mn-lt"/>
-              <a:ea typeface="+mn-ea"/>
-              <a:cs typeface="+mn-cs"/>
-            </a:endParaRPr>
-          </a:p>
-          <a:p>
-            <a:r>
-              <a:rPr lang="de-DE" dirty="0"/>
-              <a:t>	Hyun</a:t>
-            </a:r>
-          </a:p>
-          <a:p>
-            <a:endParaRPr kumimoji="0" lang="de-DE" sz="1800" kern="1200" noProof="0" dirty="0">
-              <a:ln>
-                <a:noFill/>
-              </a:ln>
-              <a:latin typeface="+mn-lt"/>
-              <a:ea typeface="+mn-ea"/>
-              <a:cs typeface="+mn-cs"/>
-            </a:endParaRPr>
-          </a:p>
-          <a:p>
             <a:r>
               <a:rPr kumimoji="0" lang="de-DE" sz="1800" kern="1200" noProof="0" dirty="0">
                 <a:ln>
@@ -25334,7 +22168,7 @@
                 <a:ea typeface="+mn-ea"/>
                 <a:cs typeface="+mn-cs"/>
               </a:rPr>
-              <a:t>26. April 2023</a:t>
+              <a:t>. April 2023</a:t>
             </a:r>
             <a:endParaRPr lang="de-DE" noProof="0" dirty="0"/>
           </a:p>
@@ -25352,6 +22186,500 @@
 </file>
 
 <file path=ppt/slides/slide10.xml><?xml version="1.0" encoding="utf-8"?>
+<p:sld xmlns:a="http://schemas.openxmlformats.org/drawingml/2006/main" xmlns:r="http://schemas.openxmlformats.org/officeDocument/2006/relationships" xmlns:p="http://schemas.openxmlformats.org/presentationml/2006/main">
+  <p:cSld>
+    <p:spTree>
+      <p:nvGrpSpPr>
+        <p:cNvPr id="1" name=""/>
+        <p:cNvGrpSpPr/>
+        <p:nvPr/>
+      </p:nvGrpSpPr>
+      <p:grpSpPr>
+        <a:xfrm>
+          <a:off x="0" y="0"/>
+          <a:ext cx="0" cy="0"/>
+          <a:chOff x="0" y="0"/>
+          <a:chExt cx="0" cy="0"/>
+        </a:xfrm>
+      </p:grpSpPr>
+      <p:pic>
+        <p:nvPicPr>
+          <p:cNvPr id="6" name="Inhaltsplatzhalter 5">
+            <a:extLst>
+              <a:ext uri="{FF2B5EF4-FFF2-40B4-BE49-F238E27FC236}">
+                <a16:creationId xmlns:a16="http://schemas.microsoft.com/office/drawing/2014/main" id="{873C483A-AE78-E248-AC33-FC295FE113F8}"/>
+              </a:ext>
+            </a:extLst>
+          </p:cNvPr>
+          <p:cNvPicPr>
+            <a:picLocks noGrp="1" noChangeAspect="1"/>
+          </p:cNvPicPr>
+          <p:nvPr>
+            <p:ph idx="1"/>
+          </p:nvPr>
+        </p:nvPicPr>
+        <p:blipFill>
+          <a:blip r:embed="rId2"/>
+          <a:stretch>
+            <a:fillRect/>
+          </a:stretch>
+        </p:blipFill>
+        <p:spPr>
+          <a:xfrm>
+            <a:off x="2566987" y="1995487"/>
+            <a:ext cx="4010025" cy="3705225"/>
+          </a:xfrm>
+        </p:spPr>
+      </p:pic>
+      <p:sp>
+        <p:nvSpPr>
+          <p:cNvPr id="3" name="Titel 2">
+            <a:extLst>
+              <a:ext uri="{FF2B5EF4-FFF2-40B4-BE49-F238E27FC236}">
+                <a16:creationId xmlns:a16="http://schemas.microsoft.com/office/drawing/2014/main" id="{5CBAE888-3D62-089B-1DA8-3A017C5F82AC}"/>
+              </a:ext>
+            </a:extLst>
+          </p:cNvPr>
+          <p:cNvSpPr>
+            <a:spLocks noGrp="1"/>
+          </p:cNvSpPr>
+          <p:nvPr>
+            <p:ph type="title"/>
+          </p:nvPr>
+        </p:nvSpPr>
+        <p:spPr/>
+        <p:txBody>
+          <a:bodyPr/>
+          <a:lstStyle/>
+          <a:p>
+            <a:r>
+              <a:rPr lang="de-DE" dirty="0"/>
+              <a:t>Umsätze in DE</a:t>
+            </a:r>
+          </a:p>
+        </p:txBody>
+      </p:sp>
+      <p:sp>
+        <p:nvSpPr>
+          <p:cNvPr id="4" name="Fußzeilenplatzhalter 3">
+            <a:extLst>
+              <a:ext uri="{FF2B5EF4-FFF2-40B4-BE49-F238E27FC236}">
+                <a16:creationId xmlns:a16="http://schemas.microsoft.com/office/drawing/2014/main" id="{D38A0283-741B-2D5B-E225-8B1948D32A3C}"/>
+              </a:ext>
+            </a:extLst>
+          </p:cNvPr>
+          <p:cNvSpPr>
+            <a:spLocks noGrp="1"/>
+          </p:cNvSpPr>
+          <p:nvPr>
+            <p:ph type="ftr" sz="quarter" idx="12"/>
+          </p:nvPr>
+        </p:nvSpPr>
+        <p:spPr/>
+        <p:txBody>
+          <a:bodyPr/>
+          <a:lstStyle/>
+          <a:p>
+            <a:r>
+              <a:rPr lang="en-US"/>
+              <a:t>Your logo here</a:t>
+            </a:r>
+            <a:endParaRPr lang="en-US" dirty="0"/>
+          </a:p>
+        </p:txBody>
+      </p:sp>
+    </p:spTree>
+    <p:extLst>
+      <p:ext uri="{BB962C8B-B14F-4D97-AF65-F5344CB8AC3E}">
+        <p14:creationId xmlns:p14="http://schemas.microsoft.com/office/powerpoint/2010/main" val="2720177661"/>
+      </p:ext>
+    </p:extLst>
+  </p:cSld>
+  <p:clrMapOvr>
+    <a:masterClrMapping/>
+  </p:clrMapOvr>
+</p:sld>
+</file>
+
+<file path=ppt/slides/slide11.xml><?xml version="1.0" encoding="utf-8"?>
+<p:sld xmlns:a="http://schemas.openxmlformats.org/drawingml/2006/main" xmlns:r="http://schemas.openxmlformats.org/officeDocument/2006/relationships" xmlns:p="http://schemas.openxmlformats.org/presentationml/2006/main">
+  <p:cSld>
+    <p:spTree>
+      <p:nvGrpSpPr>
+        <p:cNvPr id="1" name=""/>
+        <p:cNvGrpSpPr/>
+        <p:nvPr/>
+      </p:nvGrpSpPr>
+      <p:grpSpPr>
+        <a:xfrm>
+          <a:off x="0" y="0"/>
+          <a:ext cx="0" cy="0"/>
+          <a:chOff x="0" y="0"/>
+          <a:chExt cx="0" cy="0"/>
+        </a:xfrm>
+      </p:grpSpPr>
+      <p:sp>
+        <p:nvSpPr>
+          <p:cNvPr id="2" name="Inhaltsplatzhalter 1">
+            <a:extLst>
+              <a:ext uri="{FF2B5EF4-FFF2-40B4-BE49-F238E27FC236}">
+                <a16:creationId xmlns:a16="http://schemas.microsoft.com/office/drawing/2014/main" id="{BE93628E-1396-A7D1-E409-DC98C8B1307C}"/>
+              </a:ext>
+            </a:extLst>
+          </p:cNvPr>
+          <p:cNvSpPr>
+            <a:spLocks noGrp="1"/>
+          </p:cNvSpPr>
+          <p:nvPr>
+            <p:ph idx="1"/>
+          </p:nvPr>
+        </p:nvSpPr>
+        <p:spPr/>
+        <p:txBody>
+          <a:bodyPr/>
+          <a:lstStyle/>
+          <a:p>
+            <a:r>
+              <a:rPr lang="de-DE" sz="2000" dirty="0"/>
+              <a:t>Um zu bestimmen wie wichtig ein Produkt ist, kann man sich die Umsätze anschauen und den Verlauf</a:t>
+            </a:r>
+          </a:p>
+          <a:p>
+            <a:endParaRPr lang="de-DE" dirty="0"/>
+          </a:p>
+        </p:txBody>
+      </p:sp>
+      <p:sp>
+        <p:nvSpPr>
+          <p:cNvPr id="3" name="Titel 2">
+            <a:extLst>
+              <a:ext uri="{FF2B5EF4-FFF2-40B4-BE49-F238E27FC236}">
+                <a16:creationId xmlns:a16="http://schemas.microsoft.com/office/drawing/2014/main" id="{D072AAA9-271E-4320-A044-BC37FC0BCC58}"/>
+              </a:ext>
+            </a:extLst>
+          </p:cNvPr>
+          <p:cNvSpPr>
+            <a:spLocks noGrp="1"/>
+          </p:cNvSpPr>
+          <p:nvPr>
+            <p:ph type="title"/>
+          </p:nvPr>
+        </p:nvSpPr>
+        <p:spPr/>
+        <p:txBody>
+          <a:bodyPr>
+            <a:normAutofit fontScale="90000"/>
+          </a:bodyPr>
+          <a:lstStyle/>
+          <a:p>
+            <a:r>
+              <a:rPr lang="de-DE" dirty="0"/>
+              <a:t>Ist ein Produkt besonders wichtig/ unwichtig?</a:t>
+            </a:r>
+          </a:p>
+        </p:txBody>
+      </p:sp>
+      <p:sp>
+        <p:nvSpPr>
+          <p:cNvPr id="4" name="Fußzeilenplatzhalter 3">
+            <a:extLst>
+              <a:ext uri="{FF2B5EF4-FFF2-40B4-BE49-F238E27FC236}">
+                <a16:creationId xmlns:a16="http://schemas.microsoft.com/office/drawing/2014/main" id="{0ACD3E3C-4B4E-FB73-3B9B-58D3DB4B6191}"/>
+              </a:ext>
+            </a:extLst>
+          </p:cNvPr>
+          <p:cNvSpPr>
+            <a:spLocks noGrp="1"/>
+          </p:cNvSpPr>
+          <p:nvPr>
+            <p:ph type="ftr" sz="quarter" idx="12"/>
+          </p:nvPr>
+        </p:nvSpPr>
+        <p:spPr/>
+        <p:txBody>
+          <a:bodyPr/>
+          <a:lstStyle/>
+          <a:p>
+            <a:r>
+              <a:rPr lang="en-US"/>
+              <a:t>Your logo here</a:t>
+            </a:r>
+            <a:endParaRPr lang="en-US" dirty="0"/>
+          </a:p>
+        </p:txBody>
+      </p:sp>
+      <p:pic>
+        <p:nvPicPr>
+          <p:cNvPr id="6" name="Inhaltsplatzhalter 9" descr="Ein Bild, das Diagramm enthält.&#10;&#10;Automatisch generierte Beschreibung">
+            <a:extLst>
+              <a:ext uri="{FF2B5EF4-FFF2-40B4-BE49-F238E27FC236}">
+                <a16:creationId xmlns:a16="http://schemas.microsoft.com/office/drawing/2014/main" id="{D8F09091-2384-74F3-9711-12C1D11629D4}"/>
+              </a:ext>
+            </a:extLst>
+          </p:cNvPr>
+          <p:cNvPicPr>
+            <a:picLocks noChangeAspect="1"/>
+          </p:cNvPicPr>
+          <p:nvPr/>
+        </p:nvPicPr>
+        <p:blipFill>
+          <a:blip r:embed="rId2">
+            <a:extLst>
+              <a:ext uri="{28A0092B-C50C-407E-A947-70E740481C1C}">
+                <a14:useLocalDpi xmlns:a14="http://schemas.microsoft.com/office/drawing/2010/main" val="0"/>
+              </a:ext>
+            </a:extLst>
+          </a:blip>
+          <a:stretch>
+            <a:fillRect/>
+          </a:stretch>
+        </p:blipFill>
+        <p:spPr>
+          <a:xfrm>
+            <a:off x="1763688" y="2248583"/>
+            <a:ext cx="5724128" cy="4293096"/>
+          </a:xfrm>
+          <a:prstGeom prst="rect">
+            <a:avLst/>
+          </a:prstGeom>
+        </p:spPr>
+      </p:pic>
+    </p:spTree>
+    <p:extLst>
+      <p:ext uri="{BB962C8B-B14F-4D97-AF65-F5344CB8AC3E}">
+        <p14:creationId xmlns:p14="http://schemas.microsoft.com/office/powerpoint/2010/main" val="2189544081"/>
+      </p:ext>
+    </p:extLst>
+  </p:cSld>
+  <p:clrMapOvr>
+    <a:masterClrMapping/>
+  </p:clrMapOvr>
+</p:sld>
+</file>
+
+<file path=ppt/slides/slide12.xml><?xml version="1.0" encoding="utf-8"?>
+<p:sld xmlns:a="http://schemas.openxmlformats.org/drawingml/2006/main" xmlns:r="http://schemas.openxmlformats.org/officeDocument/2006/relationships" xmlns:p="http://schemas.openxmlformats.org/presentationml/2006/main">
+  <p:cSld>
+    <p:spTree>
+      <p:nvGrpSpPr>
+        <p:cNvPr id="1" name=""/>
+        <p:cNvGrpSpPr/>
+        <p:nvPr/>
+      </p:nvGrpSpPr>
+      <p:grpSpPr>
+        <a:xfrm>
+          <a:off x="0" y="0"/>
+          <a:ext cx="0" cy="0"/>
+          <a:chOff x="0" y="0"/>
+          <a:chExt cx="0" cy="0"/>
+        </a:xfrm>
+      </p:grpSpPr>
+      <p:graphicFrame>
+        <p:nvGraphicFramePr>
+          <p:cNvPr id="4" name="Content Placeholder 3"/>
+          <p:cNvGraphicFramePr>
+            <a:graphicFrameLocks noGrp="1"/>
+          </p:cNvGraphicFramePr>
+          <p:nvPr>
+            <p:ph idx="1"/>
+          </p:nvPr>
+        </p:nvGraphicFramePr>
+        <p:xfrm>
+          <a:off x="762000" y="1706622"/>
+          <a:ext cx="7620000" cy="4565532"/>
+        </p:xfrm>
+        <a:graphic>
+          <a:graphicData uri="http://schemas.openxmlformats.org/drawingml/2006/chart">
+            <c:chart xmlns:c="http://schemas.openxmlformats.org/drawingml/2006/chart" xmlns:r="http://schemas.openxmlformats.org/officeDocument/2006/relationships" r:id="rId3"/>
+          </a:graphicData>
+        </a:graphic>
+      </p:graphicFrame>
+      <p:sp>
+        <p:nvSpPr>
+          <p:cNvPr id="2" name="Title 1"/>
+          <p:cNvSpPr>
+            <a:spLocks noGrp="1"/>
+          </p:cNvSpPr>
+          <p:nvPr>
+            <p:ph type="title"/>
+          </p:nvPr>
+        </p:nvSpPr>
+        <p:spPr/>
+        <p:txBody>
+          <a:bodyPr>
+            <a:normAutofit fontScale="90000"/>
+          </a:bodyPr>
+          <a:lstStyle/>
+          <a:p>
+            <a:r>
+              <a:rPr kumimoji="0" lang="de-DE" sz="4200" kern="1200" noProof="0">
+                <a:ln w="6350">
+                  <a:noFill/>
+                </a:ln>
+                <a:solidFill>
+                  <a:schemeClr val="tx2"/>
+                </a:solidFill>
+                <a:effectLst/>
+                <a:latin typeface="+mj-lt"/>
+                <a:ea typeface="+mj-ea"/>
+                <a:cs typeface="+mj-cs"/>
+              </a:rPr>
+              <a:t>Prognosen für Kosten und</a:t>
+            </a:r>
+            <a:br>
+              <a:rPr lang="de-DE" noProof="0"/>
+            </a:br>
+            <a:r>
+              <a:rPr kumimoji="0" lang="de-DE" sz="4200" kern="1200" noProof="0">
+                <a:ln w="6350">
+                  <a:noFill/>
+                </a:ln>
+                <a:solidFill>
+                  <a:schemeClr val="tx2"/>
+                </a:solidFill>
+                <a:effectLst/>
+                <a:latin typeface="+mj-lt"/>
+                <a:ea typeface="+mj-ea"/>
+                <a:cs typeface="+mj-cs"/>
+              </a:rPr>
+              <a:t>Investitionserträge</a:t>
+            </a:r>
+            <a:endParaRPr lang="de-DE" noProof="0"/>
+          </a:p>
+        </p:txBody>
+      </p:sp>
+      <p:sp>
+        <p:nvSpPr>
+          <p:cNvPr id="14" name="Footer Placeholder 13"/>
+          <p:cNvSpPr>
+            <a:spLocks noGrp="1"/>
+          </p:cNvSpPr>
+          <p:nvPr>
+            <p:ph type="ftr" sz="quarter" idx="12"/>
+          </p:nvPr>
+        </p:nvSpPr>
+        <p:spPr/>
+        <p:txBody>
+          <a:bodyPr/>
+          <a:lstStyle/>
+          <a:p>
+            <a:r>
+              <a:rPr lang="de-DE" dirty="0"/>
+              <a:t>Platz für Ihr Logo</a:t>
+            </a:r>
+          </a:p>
+        </p:txBody>
+      </p:sp>
+    </p:spTree>
+  </p:cSld>
+  <p:clrMapOvr>
+    <a:masterClrMapping/>
+  </p:clrMapOvr>
+</p:sld>
+</file>
+
+<file path=ppt/slides/slide13.xml><?xml version="1.0" encoding="utf-8"?>
+<p:sld xmlns:a="http://schemas.openxmlformats.org/drawingml/2006/main" xmlns:r="http://schemas.openxmlformats.org/officeDocument/2006/relationships" xmlns:p="http://schemas.openxmlformats.org/presentationml/2006/main">
+  <p:cSld>
+    <p:spTree>
+      <p:nvGrpSpPr>
+        <p:cNvPr id="1" name=""/>
+        <p:cNvGrpSpPr/>
+        <p:nvPr/>
+      </p:nvGrpSpPr>
+      <p:grpSpPr>
+        <a:xfrm>
+          <a:off x="0" y="0"/>
+          <a:ext cx="0" cy="0"/>
+          <a:chOff x="0" y="0"/>
+          <a:chExt cx="0" cy="0"/>
+        </a:xfrm>
+      </p:grpSpPr>
+      <p:graphicFrame>
+        <p:nvGraphicFramePr>
+          <p:cNvPr id="4" name="Content Placeholder 3"/>
+          <p:cNvGraphicFramePr>
+            <a:graphicFrameLocks noGrp="1"/>
+          </p:cNvGraphicFramePr>
+          <p:nvPr>
+            <p:ph idx="1"/>
+          </p:nvPr>
+        </p:nvGraphicFramePr>
+        <p:xfrm>
+          <a:off x="214282" y="1447800"/>
+          <a:ext cx="8715436" cy="4565532"/>
+        </p:xfrm>
+        <a:graphic>
+          <a:graphicData uri="http://schemas.openxmlformats.org/drawingml/2006/diagram">
+            <dgm:relIds xmlns:dgm="http://schemas.openxmlformats.org/drawingml/2006/diagram" xmlns:r="http://schemas.openxmlformats.org/officeDocument/2006/relationships" r:dm="rId3" r:lo="rId4" r:qs="rId5" r:cs="rId6"/>
+          </a:graphicData>
+        </a:graphic>
+      </p:graphicFrame>
+      <p:sp>
+        <p:nvSpPr>
+          <p:cNvPr id="2" name="Title 1"/>
+          <p:cNvSpPr>
+            <a:spLocks noGrp="1"/>
+          </p:cNvSpPr>
+          <p:nvPr>
+            <p:ph type="title"/>
+          </p:nvPr>
+        </p:nvSpPr>
+        <p:spPr/>
+        <p:txBody>
+          <a:bodyPr/>
+          <a:lstStyle/>
+          <a:p>
+            <a:r>
+              <a:rPr kumimoji="0" lang="de-DE" sz="4200" kern="1200" noProof="0">
+                <a:ln w="6350">
+                  <a:noFill/>
+                </a:ln>
+                <a:solidFill>
+                  <a:schemeClr val="tx2"/>
+                </a:solidFill>
+                <a:effectLst/>
+                <a:latin typeface="+mj-lt"/>
+                <a:ea typeface="+mj-ea"/>
+                <a:cs typeface="+mj-cs"/>
+              </a:rPr>
+              <a:t>Vertragsbedingungen</a:t>
+            </a:r>
+            <a:endParaRPr lang="de-DE" noProof="0"/>
+          </a:p>
+        </p:txBody>
+      </p:sp>
+      <p:sp>
+        <p:nvSpPr>
+          <p:cNvPr id="11" name="Footer Placeholder 10"/>
+          <p:cNvSpPr>
+            <a:spLocks noGrp="1"/>
+          </p:cNvSpPr>
+          <p:nvPr>
+            <p:ph type="ftr" sz="quarter" idx="12"/>
+          </p:nvPr>
+        </p:nvSpPr>
+        <p:spPr/>
+        <p:txBody>
+          <a:bodyPr/>
+          <a:lstStyle/>
+          <a:p>
+            <a:r>
+              <a:rPr lang="de-DE" dirty="0"/>
+              <a:t>Platz für Ihr Logo</a:t>
+            </a:r>
+          </a:p>
+        </p:txBody>
+      </p:sp>
+    </p:spTree>
+  </p:cSld>
+  <p:clrMapOvr>
+    <a:masterClrMapping/>
+  </p:clrMapOvr>
+</p:sld>
+</file>
+
+<file path=ppt/slides/slide14.xml><?xml version="1.0" encoding="utf-8"?>
 <p:sld xmlns:a="http://schemas.openxmlformats.org/drawingml/2006/main" xmlns:r="http://schemas.openxmlformats.org/officeDocument/2006/relationships" xmlns:p="http://schemas.openxmlformats.org/presentationml/2006/main">
   <p:cSld>
     <p:spTree>
@@ -25452,7 +22780,7 @@
 </p:sld>
 </file>
 
-<file path=ppt/slides/slide11.xml><?xml version="1.0" encoding="utf-8"?>
+<file path=ppt/slides/slide15.xml><?xml version="1.0" encoding="utf-8"?>
 <p:sld xmlns:a="http://schemas.openxmlformats.org/drawingml/2006/main" xmlns:r="http://schemas.openxmlformats.org/officeDocument/2006/relationships" xmlns:p="http://schemas.openxmlformats.org/presentationml/2006/main">
   <p:cSld>
     <p:spTree>
@@ -25569,6 +22897,141 @@
           <a:chExt cx="0" cy="0"/>
         </a:xfrm>
       </p:grpSpPr>
+      <p:sp>
+        <p:nvSpPr>
+          <p:cNvPr id="2" name="Title 1"/>
+          <p:cNvSpPr>
+            <a:spLocks noGrp="1"/>
+          </p:cNvSpPr>
+          <p:nvPr>
+            <p:ph type="title"/>
+          </p:nvPr>
+        </p:nvSpPr>
+        <p:spPr/>
+        <p:txBody>
+          <a:bodyPr/>
+          <a:lstStyle/>
+          <a:p>
+            <a:r>
+              <a:rPr kumimoji="0" lang="de-DE" sz="4200" kern="1200" noProof="0" dirty="0">
+                <a:ln w="6350">
+                  <a:noFill/>
+                </a:ln>
+                <a:solidFill>
+                  <a:schemeClr val="tx2"/>
+                </a:solidFill>
+                <a:effectLst/>
+                <a:latin typeface="+mj-lt"/>
+                <a:ea typeface="+mj-ea"/>
+                <a:cs typeface="+mj-cs"/>
+              </a:rPr>
+              <a:t>Das Unternehmen (Über Uns)</a:t>
+            </a:r>
+            <a:endParaRPr lang="de-DE" noProof="0" dirty="0"/>
+          </a:p>
+        </p:txBody>
+      </p:sp>
+      <p:sp>
+        <p:nvSpPr>
+          <p:cNvPr id="19" name="Footer Placeholder 18"/>
+          <p:cNvSpPr>
+            <a:spLocks noGrp="1"/>
+          </p:cNvSpPr>
+          <p:nvPr>
+            <p:ph type="ftr" sz="quarter" idx="12"/>
+          </p:nvPr>
+        </p:nvSpPr>
+        <p:spPr/>
+        <p:txBody>
+          <a:bodyPr/>
+          <a:lstStyle/>
+          <a:p>
+            <a:r>
+              <a:rPr lang="de-DE" dirty="0"/>
+              <a:t>Platz für Ihr Logo</a:t>
+            </a:r>
+          </a:p>
+        </p:txBody>
+      </p:sp>
+      <p:sp>
+        <p:nvSpPr>
+          <p:cNvPr id="5" name="Inhaltsplatzhalter 4">
+            <a:extLst>
+              <a:ext uri="{FF2B5EF4-FFF2-40B4-BE49-F238E27FC236}">
+                <a16:creationId xmlns:a16="http://schemas.microsoft.com/office/drawing/2014/main" id="{19CDFA24-A515-5027-E1B5-0400DAD85428}"/>
+              </a:ext>
+            </a:extLst>
+          </p:cNvPr>
+          <p:cNvSpPr>
+            <a:spLocks noGrp="1"/>
+          </p:cNvSpPr>
+          <p:nvPr>
+            <p:ph idx="1"/>
+          </p:nvPr>
+        </p:nvSpPr>
+        <p:spPr/>
+        <p:txBody>
+          <a:bodyPr/>
+          <a:lstStyle/>
+          <a:p>
+            <a:r>
+              <a:rPr lang="de-DE" dirty="0"/>
+              <a:t>El-Puente ist ein Fair-Trade Dienstleister in Nordstemmen</a:t>
+            </a:r>
+          </a:p>
+          <a:p>
+            <a:r>
+              <a:rPr lang="de-DE" dirty="0"/>
+              <a:t>2 Standorte: </a:t>
+            </a:r>
+          </a:p>
+          <a:p>
+            <a:pPr marL="578358" indent="-514350">
+              <a:buFont typeface="+mj-lt"/>
+              <a:buAutoNum type="arabicPeriod"/>
+            </a:pPr>
+            <a:r>
+              <a:rPr lang="de-DE" dirty="0"/>
+              <a:t>	deutscher Standort (DE)</a:t>
+            </a:r>
+          </a:p>
+          <a:p>
+            <a:pPr marL="578358" indent="-514350">
+              <a:buFont typeface="+mj-lt"/>
+              <a:buAutoNum type="arabicPeriod"/>
+            </a:pPr>
+            <a:r>
+              <a:rPr lang="de-DE" dirty="0"/>
+              <a:t>    europäischer Standort (EU)</a:t>
+            </a:r>
+          </a:p>
+        </p:txBody>
+      </p:sp>
+    </p:spTree>
+  </p:cSld>
+  <p:clrMapOvr>
+    <a:masterClrMapping/>
+  </p:clrMapOvr>
+</p:sld>
+</file>
+
+<file path=ppt/slides/slide3.xml><?xml version="1.0" encoding="utf-8"?>
+<p:sld xmlns:a="http://schemas.openxmlformats.org/drawingml/2006/main" xmlns:r="http://schemas.openxmlformats.org/officeDocument/2006/relationships" xmlns:p="http://schemas.openxmlformats.org/presentationml/2006/main">
+  <p:cSld>
+    <p:spTree>
+      <p:nvGrpSpPr>
+        <p:cNvPr id="1" name=""/>
+        <p:cNvGrpSpPr/>
+        <p:nvPr/>
+      </p:nvGrpSpPr>
+      <p:grpSpPr>
+        <a:xfrm>
+          <a:off x="0" y="0"/>
+          <a:ext cx="0" cy="0"/>
+          <a:chOff x="0" y="0"/>
+          <a:chExt cx="0" cy="0"/>
+        </a:xfrm>
+      </p:grpSpPr>
       <p:graphicFrame>
         <p:nvGraphicFramePr>
           <p:cNvPr id="4" name="Content Placeholder 3"/>
@@ -25579,13 +23042,13 @@
             <p:ph idx="1"/>
             <p:extLst>
               <p:ext uri="{D42A27DB-BD31-4B8C-83A1-F6EECF244321}">
-                <p14:modId xmlns:p14="http://schemas.microsoft.com/office/powerpoint/2010/main" val="2029323148"/>
+                <p14:modId xmlns:p14="http://schemas.microsoft.com/office/powerpoint/2010/main" val="3338893591"/>
               </p:ext>
             </p:extLst>
           </p:nvPr>
         </p:nvGraphicFramePr>
         <p:xfrm>
-          <a:off x="1295400" y="1905000"/>
+          <a:off x="1043608" y="1772816"/>
           <a:ext cx="6359577" cy="3505200"/>
         </p:xfrm>
         <a:graphic>
@@ -25610,7 +23073,7 @@
           <a:lstStyle/>
           <a:p>
             <a:r>
-              <a:rPr kumimoji="0" lang="de-DE" sz="4200" kern="1200" noProof="0">
+              <a:rPr kumimoji="0" lang="de-DE" sz="4200" kern="1200" noProof="0" dirty="0">
                 <a:ln w="6350">
                   <a:noFill/>
                 </a:ln>
@@ -25622,9 +23085,24 @@
                 <a:ea typeface="+mj-ea"/>
                 <a:cs typeface="+mj-cs"/>
               </a:rPr>
-              <a:t>Zusammenfassung</a:t>
+              <a:t>Aufgabe: </a:t>
             </a:r>
-            <a:endParaRPr lang="de-DE" noProof="0"/>
+            <a:r>
+              <a:rPr kumimoji="0" lang="de-DE" sz="4200" kern="1200" noProof="0" dirty="0" err="1">
+                <a:ln w="6350">
+                  <a:noFill/>
+                </a:ln>
+                <a:solidFill>
+                  <a:schemeClr val="tx2"/>
+                </a:solidFill>
+                <a:effectLst/>
+                <a:latin typeface="+mj-lt"/>
+                <a:ea typeface="+mj-ea"/>
+                <a:cs typeface="+mj-cs"/>
+              </a:rPr>
+              <a:t>Shopauswertung</a:t>
+            </a:r>
+            <a:endParaRPr lang="de-DE" noProof="0" dirty="0"/>
           </a:p>
         </p:txBody>
       </p:sp>
@@ -25651,6 +23129,11 @@
         </p:txBody>
       </p:sp>
     </p:spTree>
+    <p:extLst>
+      <p:ext uri="{BB962C8B-B14F-4D97-AF65-F5344CB8AC3E}">
+        <p14:creationId xmlns:p14="http://schemas.microsoft.com/office/powerpoint/2010/main" val="1083262758"/>
+      </p:ext>
+    </p:extLst>
   </p:cSld>
   <p:clrMapOvr>
     <a:masterClrMapping/>
@@ -25658,7 +23141,7 @@
 </p:sld>
 </file>
 
-<file path=ppt/slides/slide3.xml><?xml version="1.0" encoding="utf-8"?>
+<file path=ppt/slides/slide4.xml><?xml version="1.0" encoding="utf-8"?>
 <p:sld xmlns:a="http://schemas.openxmlformats.org/drawingml/2006/main" xmlns:r="http://schemas.openxmlformats.org/officeDocument/2006/relationships" xmlns:p="http://schemas.openxmlformats.org/presentationml/2006/main">
   <p:cSld>
     <p:spTree>
@@ -25764,7 +23247,7 @@
 </p:sld>
 </file>
 
-<file path=ppt/slides/slide4.xml><?xml version="1.0" encoding="utf-8"?>
+<file path=ppt/slides/slide5.xml><?xml version="1.0" encoding="utf-8"?>
 <p:sld xmlns:a="http://schemas.openxmlformats.org/drawingml/2006/main" xmlns:r="http://schemas.openxmlformats.org/officeDocument/2006/relationships" xmlns:p="http://schemas.openxmlformats.org/presentationml/2006/main">
   <p:cSld>
     <p:spTree>
@@ -25906,7 +23389,7 @@
 </p:sld>
 </file>
 
-<file path=ppt/slides/slide5.xml><?xml version="1.0" encoding="utf-8"?>
+<file path=ppt/slides/slide6.xml><?xml version="1.0" encoding="utf-8"?>
 <p:sld xmlns:a="http://schemas.openxmlformats.org/drawingml/2006/main" xmlns:r="http://schemas.openxmlformats.org/officeDocument/2006/relationships" xmlns:p="http://schemas.openxmlformats.org/presentationml/2006/main">
   <p:cSld>
     <p:spTree>
@@ -26108,7 +23591,7 @@
 </p:sld>
 </file>
 
-<file path=ppt/slides/slide6.xml><?xml version="1.0" encoding="utf-8"?>
+<file path=ppt/slides/slide7.xml><?xml version="1.0" encoding="utf-8"?>
 <p:sld xmlns:a="http://schemas.openxmlformats.org/drawingml/2006/main" xmlns:r="http://schemas.openxmlformats.org/officeDocument/2006/relationships" xmlns:p="http://schemas.openxmlformats.org/presentationml/2006/main">
   <p:cSld>
     <p:spTree>
@@ -26227,7 +23710,7 @@
 </p:sld>
 </file>
 
-<file path=ppt/slides/slide7.xml><?xml version="1.0" encoding="utf-8"?>
+<file path=ppt/slides/slide8.xml><?xml version="1.0" encoding="utf-8"?>
 <p:sld xmlns:a="http://schemas.openxmlformats.org/drawingml/2006/main" xmlns:r="http://schemas.openxmlformats.org/officeDocument/2006/relationships" xmlns:p="http://schemas.openxmlformats.org/presentationml/2006/main">
   <p:cSld>
     <p:spTree>
@@ -26265,7 +23748,13 @@
           <a:bodyPr/>
           <a:lstStyle/>
           <a:p>
-            <a:endParaRPr lang="de-DE"/>
+            <a:r>
+              <a:rPr lang="de-DE" sz="2000" dirty="0"/>
+              <a:t>Um zu bestimmen wie wichtig ein Produkt ist, kann man sich die Umsätze anschauen und den Verlauf</a:t>
+            </a:r>
+          </a:p>
+          <a:p>
+            <a:endParaRPr lang="de-DE" dirty="0"/>
           </a:p>
         </p:txBody>
       </p:sp>
@@ -26287,12 +23776,14 @@
         </p:nvSpPr>
         <p:spPr/>
         <p:txBody>
-          <a:bodyPr/>
+          <a:bodyPr>
+            <a:normAutofit fontScale="90000"/>
+          </a:bodyPr>
           <a:lstStyle/>
           <a:p>
             <a:r>
               <a:rPr lang="de-DE" dirty="0"/>
-              <a:t>Hyun</a:t>
+              <a:t>Ist ein Produkt besonders wichtig/ unwichtig?</a:t>
             </a:r>
           </a:p>
         </p:txBody>
@@ -26326,163 +23817,48 @@
           </a:p>
         </p:txBody>
       </p:sp>
-      <p:graphicFrame>
-        <p:nvGraphicFramePr>
-          <p:cNvPr id="5" name="Content Placeholder 3">
+      <p:pic>
+        <p:nvPicPr>
+          <p:cNvPr id="6" name="Inhaltsplatzhalter 9" descr="Ein Bild, das Diagramm enthält.&#10;&#10;Automatisch generierte Beschreibung">
             <a:extLst>
               <a:ext uri="{FF2B5EF4-FFF2-40B4-BE49-F238E27FC236}">
-                <a16:creationId xmlns:a16="http://schemas.microsoft.com/office/drawing/2014/main" id="{71820EDC-ABEB-3876-2CD5-3783766D3A43}"/>
+                <a16:creationId xmlns:a16="http://schemas.microsoft.com/office/drawing/2014/main" id="{D8F09091-2384-74F3-9711-12C1D11629D4}"/>
               </a:ext>
             </a:extLst>
           </p:cNvPr>
-          <p:cNvGraphicFramePr>
-            <a:graphicFrameLocks/>
-          </p:cNvGraphicFramePr>
-          <p:nvPr>
-            <p:extLst>
-              <p:ext uri="{D42A27DB-BD31-4B8C-83A1-F6EECF244321}">
-                <p14:modId xmlns:p14="http://schemas.microsoft.com/office/powerpoint/2010/main" val="1450652935"/>
-              </p:ext>
-            </p:extLst>
-          </p:nvPr>
-        </p:nvGraphicFramePr>
-        <p:xfrm>
-          <a:off x="1143000" y="1752600"/>
-          <a:ext cx="6664377" cy="3733800"/>
-        </p:xfrm>
-        <a:graphic>
-          <a:graphicData uri="http://schemas.openxmlformats.org/drawingml/2006/diagram">
-            <dgm:relIds xmlns:dgm="http://schemas.openxmlformats.org/drawingml/2006/diagram" xmlns:r="http://schemas.openxmlformats.org/officeDocument/2006/relationships" r:dm="rId2" r:lo="rId3" r:qs="rId4" r:cs="rId5"/>
-          </a:graphicData>
-        </a:graphic>
-      </p:graphicFrame>
+          <p:cNvPicPr>
+            <a:picLocks noChangeAspect="1"/>
+          </p:cNvPicPr>
+          <p:nvPr/>
+        </p:nvPicPr>
+        <p:blipFill>
+          <a:blip r:embed="rId2">
+            <a:extLst>
+              <a:ext uri="{28A0092B-C50C-407E-A947-70E740481C1C}">
+                <a14:useLocalDpi xmlns:a14="http://schemas.microsoft.com/office/drawing/2010/main" val="0"/>
+              </a:ext>
+            </a:extLst>
+          </a:blip>
+          <a:stretch>
+            <a:fillRect/>
+          </a:stretch>
+        </p:blipFill>
+        <p:spPr>
+          <a:xfrm>
+            <a:off x="1763688" y="2248583"/>
+            <a:ext cx="5724128" cy="4293096"/>
+          </a:xfrm>
+          <a:prstGeom prst="rect">
+            <a:avLst/>
+          </a:prstGeom>
+        </p:spPr>
+      </p:pic>
     </p:spTree>
     <p:extLst>
       <p:ext uri="{BB962C8B-B14F-4D97-AF65-F5344CB8AC3E}">
         <p14:creationId xmlns:p14="http://schemas.microsoft.com/office/powerpoint/2010/main" val="2064018326"/>
       </p:ext>
     </p:extLst>
-  </p:cSld>
-  <p:clrMapOvr>
-    <a:masterClrMapping/>
-  </p:clrMapOvr>
-</p:sld>
-</file>
-
-<file path=ppt/slides/slide8.xml><?xml version="1.0" encoding="utf-8"?>
-<p:sld xmlns:a="http://schemas.openxmlformats.org/drawingml/2006/main" xmlns:r="http://schemas.openxmlformats.org/officeDocument/2006/relationships" xmlns:p="http://schemas.openxmlformats.org/presentationml/2006/main">
-  <p:cSld>
-    <p:spTree>
-      <p:nvGrpSpPr>
-        <p:cNvPr id="1" name=""/>
-        <p:cNvGrpSpPr/>
-        <p:nvPr/>
-      </p:nvGrpSpPr>
-      <p:grpSpPr>
-        <a:xfrm>
-          <a:off x="0" y="0"/>
-          <a:ext cx="0" cy="0"/>
-          <a:chOff x="0" y="0"/>
-          <a:chExt cx="0" cy="0"/>
-        </a:xfrm>
-      </p:grpSpPr>
-      <p:graphicFrame>
-        <p:nvGraphicFramePr>
-          <p:cNvPr id="4" name="Content Placeholder 3"/>
-          <p:cNvGraphicFramePr>
-            <a:graphicFrameLocks noGrp="1"/>
-          </p:cNvGraphicFramePr>
-          <p:nvPr>
-            <p:ph idx="1"/>
-          </p:nvPr>
-        </p:nvGraphicFramePr>
-        <p:xfrm>
-          <a:off x="762000" y="1706622"/>
-          <a:ext cx="7620000" cy="4565532"/>
-        </p:xfrm>
-        <a:graphic>
-          <a:graphicData uri="http://schemas.openxmlformats.org/drawingml/2006/chart">
-            <c:chart xmlns:c="http://schemas.openxmlformats.org/drawingml/2006/chart" xmlns:r="http://schemas.openxmlformats.org/officeDocument/2006/relationships" r:id="rId3"/>
-          </a:graphicData>
-        </a:graphic>
-      </p:graphicFrame>
-      <p:sp>
-        <p:nvSpPr>
-          <p:cNvPr id="2" name="Title 1"/>
-          <p:cNvSpPr>
-            <a:spLocks noGrp="1"/>
-          </p:cNvSpPr>
-          <p:nvPr>
-            <p:ph type="title"/>
-          </p:nvPr>
-        </p:nvSpPr>
-        <p:spPr/>
-        <p:txBody>
-          <a:bodyPr>
-            <a:normAutofit fontScale="90000"/>
-          </a:bodyPr>
-          <a:lstStyle/>
-          <a:p>
-            <a:r>
-              <a:rPr kumimoji="0" lang="de-DE" sz="4200" kern="1200" noProof="0">
-                <a:ln w="6350">
-                  <a:noFill/>
-                </a:ln>
-                <a:solidFill>
-                  <a:schemeClr val="tx2"/>
-                </a:solidFill>
-                <a:effectLst/>
-                <a:latin typeface="+mj-lt"/>
-                <a:ea typeface="+mj-ea"/>
-                <a:cs typeface="+mj-cs"/>
-              </a:rPr>
-              <a:t>Prognosen für Kosten und</a:t>
-            </a:r>
-            <a:br>
-              <a:rPr lang="de-DE" noProof="0"/>
-            </a:br>
-            <a:r>
-              <a:rPr kumimoji="0" lang="de-DE" sz="4200" kern="1200" noProof="0">
-                <a:ln w="6350">
-                  <a:noFill/>
-                </a:ln>
-                <a:solidFill>
-                  <a:schemeClr val="tx2"/>
-                </a:solidFill>
-                <a:effectLst/>
-                <a:latin typeface="+mj-lt"/>
-                <a:ea typeface="+mj-ea"/>
-                <a:cs typeface="+mj-cs"/>
-              </a:rPr>
-              <a:t>Investitionserträge</a:t>
-            </a:r>
-            <a:endParaRPr lang="de-DE" noProof="0"/>
-          </a:p>
-        </p:txBody>
-      </p:sp>
-      <p:sp>
-        <p:nvSpPr>
-          <p:cNvPr id="14" name="Footer Placeholder 13"/>
-          <p:cNvSpPr>
-            <a:spLocks noGrp="1"/>
-          </p:cNvSpPr>
-          <p:nvPr>
-            <p:ph type="ftr" sz="quarter" idx="12"/>
-          </p:nvPr>
-        </p:nvSpPr>
-        <p:spPr/>
-        <p:txBody>
-          <a:bodyPr/>
-          <a:lstStyle/>
-          <a:p>
-            <a:r>
-              <a:rPr lang="de-DE" dirty="0"/>
-              <a:t>Platz für Ihr Logo</a:t>
-            </a:r>
-          </a:p>
-        </p:txBody>
-      </p:sp>
-    </p:spTree>
   </p:cSld>
   <p:clrMapOvr>
     <a:masterClrMapping/>
@@ -26507,29 +23883,84 @@
           <a:chExt cx="0" cy="0"/>
         </a:xfrm>
       </p:grpSpPr>
-      <p:graphicFrame>
-        <p:nvGraphicFramePr>
-          <p:cNvPr id="4" name="Content Placeholder 3"/>
-          <p:cNvGraphicFramePr>
-            <a:graphicFrameLocks noGrp="1"/>
-          </p:cNvGraphicFramePr>
+      <p:sp>
+        <p:nvSpPr>
+          <p:cNvPr id="2" name="Inhaltsplatzhalter 1">
+            <a:extLst>
+              <a:ext uri="{FF2B5EF4-FFF2-40B4-BE49-F238E27FC236}">
+                <a16:creationId xmlns:a16="http://schemas.microsoft.com/office/drawing/2014/main" id="{BE93628E-1396-A7D1-E409-DC98C8B1307C}"/>
+              </a:ext>
+            </a:extLst>
+          </p:cNvPr>
+          <p:cNvSpPr>
+            <a:spLocks noGrp="1"/>
+          </p:cNvSpPr>
           <p:nvPr>
             <p:ph idx="1"/>
           </p:nvPr>
-        </p:nvGraphicFramePr>
-        <p:xfrm>
-          <a:off x="214282" y="1447800"/>
-          <a:ext cx="8715436" cy="4565532"/>
-        </p:xfrm>
-        <a:graphic>
-          <a:graphicData uri="http://schemas.openxmlformats.org/drawingml/2006/diagram">
-            <dgm:relIds xmlns:dgm="http://schemas.openxmlformats.org/drawingml/2006/diagram" xmlns:r="http://schemas.openxmlformats.org/officeDocument/2006/relationships" r:dm="rId3" r:lo="rId4" r:qs="rId5" r:cs="rId6"/>
-          </a:graphicData>
-        </a:graphic>
-      </p:graphicFrame>
+        </p:nvSpPr>
+        <p:spPr/>
+        <p:txBody>
+          <a:bodyPr/>
+          <a:lstStyle/>
+          <a:p>
+            <a:r>
+              <a:rPr lang="de-DE" sz="2000" dirty="0"/>
+              <a:t>Um zu bestimmen wie wichtig ein Produkt ist, kann man sich die Umsätze anschauen und den Verlauf</a:t>
+            </a:r>
+          </a:p>
+          <a:p>
+            <a:r>
+              <a:rPr lang="de-DE" sz="2000" dirty="0"/>
+              <a:t>Produkt C macht </a:t>
+            </a:r>
+            <a:r>
+              <a:rPr lang="de-DE" sz="2000"/>
+              <a:t>im DE </a:t>
+            </a:r>
+            <a:r>
+              <a:rPr lang="de-DE" sz="2000" dirty="0"/>
+              <a:t>Markt mit mehr als 75% Umsatzanteil den mit Abstand größten Anteil am Umsatz aus.</a:t>
+            </a:r>
+          </a:p>
+          <a:p>
+            <a:r>
+              <a:rPr lang="de-DE" sz="2000" dirty="0"/>
+              <a:t>Produkt A hat einen Gesamtumsatz von 201431€ in DE</a:t>
+            </a:r>
+          </a:p>
+          <a:p>
+            <a:r>
+              <a:rPr lang="de-DE" sz="2000" dirty="0"/>
+              <a:t>Produkt B hat einen Gesamtumsatz von 237166€ in DE</a:t>
+            </a:r>
+          </a:p>
+          <a:p>
+            <a:r>
+              <a:rPr lang="de-DE" sz="2000" dirty="0"/>
+              <a:t>Produkt C hat einen Gesamtumsatz von 1615731 in DE</a:t>
+            </a:r>
+          </a:p>
+          <a:p>
+            <a:r>
+              <a:rPr lang="de-DE" sz="2000" dirty="0"/>
+              <a:t>Produkt C hat sowohl in EU als auch in DE den größten Umsatz und ist somit am wichtigsten.</a:t>
+            </a:r>
+          </a:p>
+          <a:p>
+            <a:endParaRPr lang="de-DE" dirty="0"/>
+          </a:p>
+        </p:txBody>
+      </p:sp>
       <p:sp>
         <p:nvSpPr>
-          <p:cNvPr id="2" name="Title 1"/>
+          <p:cNvPr id="3" name="Titel 2">
+            <a:extLst>
+              <a:ext uri="{FF2B5EF4-FFF2-40B4-BE49-F238E27FC236}">
+                <a16:creationId xmlns:a16="http://schemas.microsoft.com/office/drawing/2014/main" id="{D072AAA9-271E-4320-A044-BC37FC0BCC58}"/>
+              </a:ext>
+            </a:extLst>
+          </p:cNvPr>
           <p:cNvSpPr>
             <a:spLocks noGrp="1"/>
           </p:cNvSpPr>
@@ -26539,31 +23970,27 @@
         </p:nvSpPr>
         <p:spPr/>
         <p:txBody>
-          <a:bodyPr/>
+          <a:bodyPr>
+            <a:normAutofit fontScale="90000"/>
+          </a:bodyPr>
           <a:lstStyle/>
           <a:p>
             <a:r>
-              <a:rPr kumimoji="0" lang="de-DE" sz="4200" kern="1200" noProof="0">
-                <a:ln w="6350">
-                  <a:noFill/>
-                </a:ln>
-                <a:solidFill>
-                  <a:schemeClr val="tx2"/>
-                </a:solidFill>
-                <a:effectLst/>
-                <a:latin typeface="+mj-lt"/>
-                <a:ea typeface="+mj-ea"/>
-                <a:cs typeface="+mj-cs"/>
-              </a:rPr>
-              <a:t>Vertragsbedingungen</a:t>
+              <a:rPr lang="de-DE" dirty="0"/>
+              <a:t>Ist ein Produkt besonders wichtig/ unwichtig?</a:t>
             </a:r>
-            <a:endParaRPr lang="de-DE" noProof="0"/>
           </a:p>
         </p:txBody>
       </p:sp>
       <p:sp>
         <p:nvSpPr>
-          <p:cNvPr id="11" name="Footer Placeholder 10"/>
+          <p:cNvPr id="4" name="Fußzeilenplatzhalter 3">
+            <a:extLst>
+              <a:ext uri="{FF2B5EF4-FFF2-40B4-BE49-F238E27FC236}">
+                <a16:creationId xmlns:a16="http://schemas.microsoft.com/office/drawing/2014/main" id="{0ACD3E3C-4B4E-FB73-3B9B-58D3DB4B6191}"/>
+              </a:ext>
+            </a:extLst>
+          </p:cNvPr>
           <p:cNvSpPr>
             <a:spLocks noGrp="1"/>
           </p:cNvSpPr>
@@ -26577,13 +24004,19 @@
           <a:lstStyle/>
           <a:p>
             <a:r>
-              <a:rPr lang="de-DE" dirty="0"/>
-              <a:t>Platz für Ihr Logo</a:t>
+              <a:rPr lang="en-US"/>
+              <a:t>Your logo here</a:t>
             </a:r>
+            <a:endParaRPr lang="en-US" dirty="0"/>
           </a:p>
         </p:txBody>
       </p:sp>
     </p:spTree>
+    <p:extLst>
+      <p:ext uri="{BB962C8B-B14F-4D97-AF65-F5344CB8AC3E}">
+        <p14:creationId xmlns:p14="http://schemas.microsoft.com/office/powerpoint/2010/main" val="4270157588"/>
+      </p:ext>
+    </p:extLst>
   </p:cSld>
   <p:clrMapOvr>
     <a:masterClrMapping/>
@@ -27157,6 +24590,15 @@
 </file>
 
 <file path=customXml/item1.xml><?xml version="1.0" encoding="utf-8"?>
+<?mso-contentType ?>
+<FormTemplates xmlns="http://schemas.microsoft.com/sharepoint/v3/contenttype/forms">
+  <Display>DocumentLibraryForm</Display>
+  <Edit>AssetEditForm</Edit>
+  <New>DocumentLibraryForm</New>
+</FormTemplates>
+</file>
+
+<file path=customXml/item2.xml><?xml version="1.0" encoding="utf-8"?>
 <p:properties xmlns:p="http://schemas.microsoft.com/office/2006/metadata/properties" xmlns:xsi="http://www.w3.org/2001/XMLSchema-instance" xmlns:pc="http://schemas.microsoft.com/office/infopath/2007/PartnerControls">
   <documentManagement>
     <DirectSourceMarket xmlns="f105ad54-119a-4495-aa55-0e28b6b4ad2f">english</DirectSourceMarket>
@@ -27294,15 +24736,6 @@
     <LocMarketGroupTiers2 xmlns="f105ad54-119a-4495-aa55-0e28b6b4ad2f" xsi:nil="true"/>
   </documentManagement>
 </p:properties>
-</file>
-
-<file path=customXml/item2.xml><?xml version="1.0" encoding="utf-8"?>
-<?mso-contentType ?>
-<FormTemplates xmlns="http://schemas.microsoft.com/sharepoint/v3/contenttype/forms">
-  <Display>DocumentLibraryForm</Display>
-  <Edit>AssetEditForm</Edit>
-  <New>DocumentLibraryForm</New>
-</FormTemplates>
 </file>
 
 <file path=customXml/item3.xml><?xml version="1.0" encoding="utf-8"?>
@@ -28365,20 +25798,20 @@
 </file>
 
 <file path=customXml/itemProps1.xml><?xml version="1.0" encoding="utf-8"?>
+<ds:datastoreItem xmlns:ds="http://schemas.openxmlformats.org/officeDocument/2006/customXml" ds:itemID="{71213854-7F56-4EAC-9937-BE23838E9135}">
+  <ds:schemaRefs>
+    <ds:schemaRef ds:uri="http://schemas.microsoft.com/sharepoint/v3/contenttype/forms"/>
+  </ds:schemaRefs>
+</ds:datastoreItem>
+</file>
+
+<file path=customXml/itemProps2.xml><?xml version="1.0" encoding="utf-8"?>
 <ds:datastoreItem xmlns:ds="http://schemas.openxmlformats.org/officeDocument/2006/customXml" ds:itemID="{BF58F6C9-A768-490A-A1CB-2E6F7482DC03}">
   <ds:schemaRefs>
     <ds:schemaRef ds:uri="http://schemas.microsoft.com/office/2006/metadata/properties"/>
     <ds:schemaRef ds:uri="http://schemas.microsoft.com/office/infopath/2007/PartnerControls"/>
     <ds:schemaRef ds:uri="f105ad54-119a-4495-aa55-0e28b6b4ad2f"/>
     <ds:schemaRef ds:uri="c7af2036-029c-470e-8042-297c68a41472"/>
-  </ds:schemaRefs>
-</ds:datastoreItem>
-</file>
-
-<file path=customXml/itemProps2.xml><?xml version="1.0" encoding="utf-8"?>
-<ds:datastoreItem xmlns:ds="http://schemas.openxmlformats.org/officeDocument/2006/customXml" ds:itemID="{71213854-7F56-4EAC-9937-BE23838E9135}">
-  <ds:schemaRefs>
-    <ds:schemaRef ds:uri="http://schemas.microsoft.com/sharepoint/v3/contenttype/forms"/>
   </ds:schemaRefs>
 </ds:datastoreItem>
 </file>

</xml_diff>

<commit_message>
Meinen Part in die Powerpoint hinzugefügt.
</commit_message>
<xml_diff>
--- a/Shopauswertung.pptx
+++ b/Shopauswertung.pptx
@@ -22202,35 +22202,6 @@
           <a:chExt cx="0" cy="0"/>
         </a:xfrm>
       </p:grpSpPr>
-      <p:pic>
-        <p:nvPicPr>
-          <p:cNvPr id="6" name="Inhaltsplatzhalter 5">
-            <a:extLst>
-              <a:ext uri="{FF2B5EF4-FFF2-40B4-BE49-F238E27FC236}">
-                <a16:creationId xmlns:a16="http://schemas.microsoft.com/office/drawing/2014/main" id="{873C483A-AE78-E248-AC33-FC295FE113F8}"/>
-              </a:ext>
-            </a:extLst>
-          </p:cNvPr>
-          <p:cNvPicPr>
-            <a:picLocks noGrp="1" noChangeAspect="1"/>
-          </p:cNvPicPr>
-          <p:nvPr>
-            <p:ph idx="1"/>
-          </p:nvPr>
-        </p:nvPicPr>
-        <p:blipFill>
-          <a:blip r:embed="rId2"/>
-          <a:stretch>
-            <a:fillRect/>
-          </a:stretch>
-        </p:blipFill>
-        <p:spPr>
-          <a:xfrm>
-            <a:off x="2566987" y="1995487"/>
-            <a:ext cx="4010025" cy="3705225"/>
-          </a:xfrm>
-        </p:spPr>
-      </p:pic>
       <p:sp>
         <p:nvSpPr>
           <p:cNvPr id="3" name="Titel 2">
@@ -22288,6 +22259,35 @@
           </a:p>
         </p:txBody>
       </p:sp>
+      <p:pic>
+        <p:nvPicPr>
+          <p:cNvPr id="10" name="Inhaltsplatzhalter 9">
+            <a:extLst>
+              <a:ext uri="{FF2B5EF4-FFF2-40B4-BE49-F238E27FC236}">
+                <a16:creationId xmlns:a16="http://schemas.microsoft.com/office/drawing/2014/main" id="{5047C581-B904-AACF-BC44-948B14E3B475}"/>
+              </a:ext>
+            </a:extLst>
+          </p:cNvPr>
+          <p:cNvPicPr>
+            <a:picLocks noGrp="1" noChangeAspect="1"/>
+          </p:cNvPicPr>
+          <p:nvPr>
+            <p:ph idx="1"/>
+          </p:nvPr>
+        </p:nvPicPr>
+        <p:blipFill>
+          <a:blip r:embed="rId2"/>
+          <a:stretch>
+            <a:fillRect/>
+          </a:stretch>
+        </p:blipFill>
+        <p:spPr>
+          <a:xfrm>
+            <a:off x="1979713" y="1452851"/>
+            <a:ext cx="5184576" cy="4790498"/>
+          </a:xfrm>
+        </p:spPr>
+      </p:pic>
     </p:spTree>
     <p:extLst>
       <p:ext uri="{BB962C8B-B14F-4D97-AF65-F5344CB8AC3E}">
@@ -23912,15 +23912,7 @@
           <a:p>
             <a:r>
               <a:rPr lang="de-DE" sz="2000" dirty="0"/>
-              <a:t>Produkt C macht </a:t>
-            </a:r>
-            <a:r>
-              <a:rPr lang="de-DE" sz="2000"/>
-              <a:t>im DE </a:t>
-            </a:r>
-            <a:r>
-              <a:rPr lang="de-DE" sz="2000" dirty="0"/>
-              <a:t>Markt mit mehr als 75% Umsatzanteil den mit Abstand größten Anteil am Umsatz aus.</a:t>
+              <a:t>Produkt C macht im DE Markt mit mehr als 75% Umsatzanteil den mit Abstand größten Anteil am Umsatz aus.</a:t>
             </a:r>
           </a:p>
           <a:p>

</xml_diff>